<commit_message>
已修改        workspace/畫圖用ppt.pptx 已修改        失敗項目分析與挽救.md Add        imges/ITTO增强.png
</commit_message>
<xml_diff>
--- a/workspace/畫圖用ppt.pptx
+++ b/workspace/畫圖用ppt.pptx
@@ -10,6 +10,7 @@
     <p:sldId id="259" r:id="rId4"/>
     <p:sldId id="257" r:id="rId5"/>
     <p:sldId id="260" r:id="rId6"/>
+    <p:sldId id="261" r:id="rId7"/>
   </p:sldIdLst>
   <p:sldSz cx="12192000" cy="6858000"/>
   <p:notesSz cx="6858000" cy="9144000"/>
@@ -108,6 +109,11 @@
       </a:defRPr>
     </a:lvl9pPr>
   </p:defaultTextStyle>
+  <p:extLst>
+    <p:ext uri="{EFAFB233-063F-42B5-8137-9DF3F51BA10A}">
+      <p15:sldGuideLst xmlns:p15="http://schemas.microsoft.com/office/powerpoint/2012/main"/>
+    </p:ext>
+  </p:extLst>
 </p:presentation>
 </file>
 
@@ -1653,6 +1659,788 @@
   <dgm:styleLbl name="fgShp">
     <dgm:fillClrLst meth="repeat">
       <a:schemeClr val="accent4">
+        <a:tint val="40000"/>
+      </a:schemeClr>
+    </dgm:fillClrLst>
+    <dgm:linClrLst meth="repeat">
+      <a:schemeClr val="lt1"/>
+    </dgm:linClrLst>
+    <dgm:effectClrLst/>
+    <dgm:txLinClrLst/>
+    <dgm:txFillClrLst meth="repeat">
+      <a:schemeClr val="dk1"/>
+    </dgm:txFillClrLst>
+    <dgm:txEffectClrLst/>
+  </dgm:styleLbl>
+  <dgm:styleLbl name="revTx">
+    <dgm:fillClrLst meth="repeat">
+      <a:schemeClr val="lt1">
+        <a:alpha val="0"/>
+      </a:schemeClr>
+    </dgm:fillClrLst>
+    <dgm:linClrLst meth="repeat">
+      <a:schemeClr val="dk1">
+        <a:alpha val="0"/>
+      </a:schemeClr>
+    </dgm:linClrLst>
+    <dgm:effectClrLst/>
+    <dgm:txLinClrLst/>
+    <dgm:txFillClrLst meth="repeat">
+      <a:schemeClr val="tx1"/>
+    </dgm:txFillClrLst>
+    <dgm:txEffectClrLst/>
+  </dgm:styleLbl>
+</dgm:colorsDef>
+</file>
+
+<file path=ppt/diagrams/colors3.xml><?xml version="1.0" encoding="utf-8"?>
+<dgm:colorsDef xmlns:dgm="http://schemas.openxmlformats.org/drawingml/2006/diagram" xmlns:a="http://schemas.openxmlformats.org/drawingml/2006/main" uniqueId="urn:microsoft.com/office/officeart/2005/8/colors/colorful5">
+  <dgm:title val=""/>
+  <dgm:desc val=""/>
+  <dgm:catLst>
+    <dgm:cat type="colorful" pri="10500"/>
+  </dgm:catLst>
+  <dgm:styleLbl name="node0">
+    <dgm:fillClrLst meth="repeat">
+      <a:schemeClr val="accent4"/>
+    </dgm:fillClrLst>
+    <dgm:linClrLst meth="repeat">
+      <a:schemeClr val="lt1"/>
+    </dgm:linClrLst>
+    <dgm:effectClrLst/>
+    <dgm:txLinClrLst/>
+    <dgm:txFillClrLst/>
+    <dgm:txEffectClrLst/>
+  </dgm:styleLbl>
+  <dgm:styleLbl name="node1">
+    <dgm:fillClrLst>
+      <a:schemeClr val="accent5"/>
+      <a:schemeClr val="accent6"/>
+    </dgm:fillClrLst>
+    <dgm:linClrLst meth="repeat">
+      <a:schemeClr val="lt1"/>
+    </dgm:linClrLst>
+    <dgm:effectClrLst/>
+    <dgm:txLinClrLst/>
+    <dgm:txFillClrLst/>
+    <dgm:txEffectClrLst/>
+  </dgm:styleLbl>
+  <dgm:styleLbl name="alignNode1">
+    <dgm:fillClrLst>
+      <a:schemeClr val="accent5"/>
+      <a:schemeClr val="accent6"/>
+    </dgm:fillClrLst>
+    <dgm:linClrLst>
+      <a:schemeClr val="accent5"/>
+      <a:schemeClr val="accent6"/>
+    </dgm:linClrLst>
+    <dgm:effectClrLst/>
+    <dgm:txLinClrLst/>
+    <dgm:txFillClrLst/>
+    <dgm:txEffectClrLst/>
+  </dgm:styleLbl>
+  <dgm:styleLbl name="lnNode1">
+    <dgm:fillClrLst>
+      <a:schemeClr val="accent5"/>
+      <a:schemeClr val="accent6"/>
+    </dgm:fillClrLst>
+    <dgm:linClrLst meth="repeat">
+      <a:schemeClr val="lt1"/>
+    </dgm:linClrLst>
+    <dgm:effectClrLst/>
+    <dgm:txLinClrLst/>
+    <dgm:txFillClrLst/>
+    <dgm:txEffectClrLst/>
+  </dgm:styleLbl>
+  <dgm:styleLbl name="vennNode1">
+    <dgm:fillClrLst>
+      <a:schemeClr val="accent5">
+        <a:alpha val="50000"/>
+      </a:schemeClr>
+      <a:schemeClr val="accent6">
+        <a:alpha val="50000"/>
+      </a:schemeClr>
+    </dgm:fillClrLst>
+    <dgm:linClrLst meth="repeat">
+      <a:schemeClr val="lt1"/>
+    </dgm:linClrLst>
+    <dgm:effectClrLst/>
+    <dgm:txLinClrLst/>
+    <dgm:txFillClrLst/>
+    <dgm:txEffectClrLst/>
+  </dgm:styleLbl>
+  <dgm:styleLbl name="node2">
+    <dgm:fillClrLst>
+      <a:schemeClr val="accent6"/>
+    </dgm:fillClrLst>
+    <dgm:linClrLst meth="repeat">
+      <a:schemeClr val="lt1"/>
+    </dgm:linClrLst>
+    <dgm:effectClrLst/>
+    <dgm:txLinClrLst/>
+    <dgm:txFillClrLst/>
+    <dgm:txEffectClrLst/>
+  </dgm:styleLbl>
+  <dgm:styleLbl name="node3">
+    <dgm:fillClrLst>
+      <a:schemeClr val="accent1"/>
+    </dgm:fillClrLst>
+    <dgm:linClrLst meth="repeat">
+      <a:schemeClr val="lt1"/>
+    </dgm:linClrLst>
+    <dgm:effectClrLst/>
+    <dgm:txLinClrLst/>
+    <dgm:txFillClrLst/>
+    <dgm:txEffectClrLst/>
+  </dgm:styleLbl>
+  <dgm:styleLbl name="node4">
+    <dgm:fillClrLst>
+      <a:schemeClr val="accent2"/>
+    </dgm:fillClrLst>
+    <dgm:linClrLst meth="repeat">
+      <a:schemeClr val="lt1"/>
+    </dgm:linClrLst>
+    <dgm:effectClrLst/>
+    <dgm:txLinClrLst/>
+    <dgm:txFillClrLst/>
+    <dgm:txEffectClrLst/>
+  </dgm:styleLbl>
+  <dgm:styleLbl name="fgImgPlace1">
+    <dgm:fillClrLst>
+      <a:schemeClr val="accent5">
+        <a:tint val="50000"/>
+      </a:schemeClr>
+      <a:schemeClr val="accent6">
+        <a:tint val="50000"/>
+      </a:schemeClr>
+    </dgm:fillClrLst>
+    <dgm:linClrLst meth="repeat">
+      <a:schemeClr val="lt1"/>
+    </dgm:linClrLst>
+    <dgm:effectClrLst/>
+    <dgm:txLinClrLst/>
+    <dgm:txFillClrLst meth="repeat">
+      <a:schemeClr val="lt1"/>
+    </dgm:txFillClrLst>
+    <dgm:txEffectClrLst/>
+  </dgm:styleLbl>
+  <dgm:styleLbl name="alignImgPlace1">
+    <dgm:fillClrLst>
+      <a:schemeClr val="accent5">
+        <a:tint val="50000"/>
+      </a:schemeClr>
+      <a:schemeClr val="accent6">
+        <a:tint val="20000"/>
+      </a:schemeClr>
+    </dgm:fillClrLst>
+    <dgm:linClrLst meth="repeat">
+      <a:schemeClr val="lt1"/>
+    </dgm:linClrLst>
+    <dgm:effectClrLst/>
+    <dgm:txLinClrLst/>
+    <dgm:txFillClrLst meth="repeat">
+      <a:schemeClr val="lt1"/>
+    </dgm:txFillClrLst>
+    <dgm:txEffectClrLst/>
+  </dgm:styleLbl>
+  <dgm:styleLbl name="bgImgPlace1">
+    <dgm:fillClrLst>
+      <a:schemeClr val="accent5">
+        <a:tint val="50000"/>
+      </a:schemeClr>
+      <a:schemeClr val="accent6">
+        <a:tint val="20000"/>
+      </a:schemeClr>
+    </dgm:fillClrLst>
+    <dgm:linClrLst meth="repeat">
+      <a:schemeClr val="lt1"/>
+    </dgm:linClrLst>
+    <dgm:effectClrLst/>
+    <dgm:txLinClrLst/>
+    <dgm:txFillClrLst meth="repeat">
+      <a:schemeClr val="lt1"/>
+    </dgm:txFillClrLst>
+    <dgm:txEffectClrLst/>
+  </dgm:styleLbl>
+  <dgm:styleLbl name="sibTrans2D1">
+    <dgm:fillClrLst>
+      <a:schemeClr val="accent5"/>
+      <a:schemeClr val="accent6"/>
+    </dgm:fillClrLst>
+    <dgm:linClrLst meth="repeat">
+      <a:schemeClr val="lt1"/>
+    </dgm:linClrLst>
+    <dgm:effectClrLst/>
+    <dgm:txLinClrLst/>
+    <dgm:txFillClrLst/>
+    <dgm:txEffectClrLst/>
+  </dgm:styleLbl>
+  <dgm:styleLbl name="fgSibTrans2D1">
+    <dgm:fillClrLst>
+      <a:schemeClr val="accent5"/>
+      <a:schemeClr val="accent6"/>
+    </dgm:fillClrLst>
+    <dgm:linClrLst meth="repeat">
+      <a:schemeClr val="lt1"/>
+    </dgm:linClrLst>
+    <dgm:effectClrLst/>
+    <dgm:txLinClrLst/>
+    <dgm:txFillClrLst meth="repeat">
+      <a:schemeClr val="lt1"/>
+    </dgm:txFillClrLst>
+    <dgm:txEffectClrLst/>
+  </dgm:styleLbl>
+  <dgm:styleLbl name="bgSibTrans2D1">
+    <dgm:fillClrLst>
+      <a:schemeClr val="accent5"/>
+      <a:schemeClr val="accent6"/>
+    </dgm:fillClrLst>
+    <dgm:linClrLst meth="repeat">
+      <a:schemeClr val="lt1"/>
+    </dgm:linClrLst>
+    <dgm:effectClrLst/>
+    <dgm:txLinClrLst/>
+    <dgm:txFillClrLst meth="repeat">
+      <a:schemeClr val="lt1"/>
+    </dgm:txFillClrLst>
+    <dgm:txEffectClrLst/>
+  </dgm:styleLbl>
+  <dgm:styleLbl name="sibTrans1D1">
+    <dgm:fillClrLst/>
+    <dgm:linClrLst>
+      <a:schemeClr val="accent5"/>
+      <a:schemeClr val="accent6"/>
+    </dgm:linClrLst>
+    <dgm:effectClrLst/>
+    <dgm:txLinClrLst/>
+    <dgm:txFillClrLst meth="repeat">
+      <a:schemeClr val="tx1"/>
+    </dgm:txFillClrLst>
+    <dgm:txEffectClrLst/>
+  </dgm:styleLbl>
+  <dgm:styleLbl name="callout">
+    <dgm:fillClrLst meth="repeat">
+      <a:schemeClr val="accent5"/>
+    </dgm:fillClrLst>
+    <dgm:linClrLst meth="repeat">
+      <a:schemeClr val="accent5">
+        <a:tint val="50000"/>
+      </a:schemeClr>
+    </dgm:linClrLst>
+    <dgm:effectClrLst/>
+    <dgm:txLinClrLst/>
+    <dgm:txFillClrLst meth="repeat">
+      <a:schemeClr val="tx1"/>
+    </dgm:txFillClrLst>
+    <dgm:txEffectClrLst/>
+  </dgm:styleLbl>
+  <dgm:styleLbl name="asst0">
+    <dgm:fillClrLst meth="repeat">
+      <a:schemeClr val="accent5"/>
+    </dgm:fillClrLst>
+    <dgm:linClrLst meth="repeat">
+      <a:schemeClr val="lt1">
+        <a:shade val="80000"/>
+      </a:schemeClr>
+    </dgm:linClrLst>
+    <dgm:effectClrLst/>
+    <dgm:txLinClrLst/>
+    <dgm:txFillClrLst/>
+    <dgm:txEffectClrLst/>
+  </dgm:styleLbl>
+  <dgm:styleLbl name="asst1">
+    <dgm:fillClrLst meth="repeat">
+      <a:schemeClr val="accent6"/>
+    </dgm:fillClrLst>
+    <dgm:linClrLst meth="repeat">
+      <a:schemeClr val="lt1">
+        <a:shade val="80000"/>
+      </a:schemeClr>
+    </dgm:linClrLst>
+    <dgm:effectClrLst/>
+    <dgm:txLinClrLst/>
+    <dgm:txFillClrLst/>
+    <dgm:txEffectClrLst/>
+  </dgm:styleLbl>
+  <dgm:styleLbl name="asst2">
+    <dgm:fillClrLst>
+      <a:schemeClr val="accent1"/>
+    </dgm:fillClrLst>
+    <dgm:linClrLst meth="repeat">
+      <a:schemeClr val="lt1"/>
+    </dgm:linClrLst>
+    <dgm:effectClrLst/>
+    <dgm:txLinClrLst/>
+    <dgm:txFillClrLst/>
+    <dgm:txEffectClrLst/>
+  </dgm:styleLbl>
+  <dgm:styleLbl name="asst3">
+    <dgm:fillClrLst>
+      <a:schemeClr val="accent2"/>
+    </dgm:fillClrLst>
+    <dgm:linClrLst meth="repeat">
+      <a:schemeClr val="lt1"/>
+    </dgm:linClrLst>
+    <dgm:effectClrLst/>
+    <dgm:txLinClrLst/>
+    <dgm:txFillClrLst/>
+    <dgm:txEffectClrLst/>
+  </dgm:styleLbl>
+  <dgm:styleLbl name="asst4">
+    <dgm:fillClrLst>
+      <a:schemeClr val="accent3"/>
+    </dgm:fillClrLst>
+    <dgm:linClrLst meth="repeat">
+      <a:schemeClr val="lt1"/>
+    </dgm:linClrLst>
+    <dgm:effectClrLst/>
+    <dgm:txLinClrLst/>
+    <dgm:txFillClrLst/>
+    <dgm:txEffectClrLst/>
+  </dgm:styleLbl>
+  <dgm:styleLbl name="parChTrans2D1">
+    <dgm:fillClrLst meth="repeat">
+      <a:schemeClr val="accent5"/>
+    </dgm:fillClrLst>
+    <dgm:linClrLst meth="repeat">
+      <a:schemeClr val="lt1"/>
+    </dgm:linClrLst>
+    <dgm:effectClrLst/>
+    <dgm:txLinClrLst/>
+    <dgm:txFillClrLst meth="repeat">
+      <a:schemeClr val="lt1"/>
+    </dgm:txFillClrLst>
+    <dgm:txEffectClrLst/>
+  </dgm:styleLbl>
+  <dgm:styleLbl name="parChTrans2D2">
+    <dgm:fillClrLst meth="repeat">
+      <a:schemeClr val="accent6"/>
+    </dgm:fillClrLst>
+    <dgm:linClrLst meth="repeat">
+      <a:schemeClr val="lt1"/>
+    </dgm:linClrLst>
+    <dgm:effectClrLst/>
+    <dgm:txLinClrLst/>
+    <dgm:txFillClrLst/>
+    <dgm:txEffectClrLst/>
+  </dgm:styleLbl>
+  <dgm:styleLbl name="parChTrans2D3">
+    <dgm:fillClrLst meth="repeat">
+      <a:schemeClr val="accent6"/>
+    </dgm:fillClrLst>
+    <dgm:linClrLst meth="repeat">
+      <a:schemeClr val="lt1"/>
+    </dgm:linClrLst>
+    <dgm:effectClrLst/>
+    <dgm:txLinClrLst/>
+    <dgm:txFillClrLst/>
+    <dgm:txEffectClrLst/>
+  </dgm:styleLbl>
+  <dgm:styleLbl name="parChTrans2D4">
+    <dgm:fillClrLst meth="repeat">
+      <a:schemeClr val="accent1"/>
+    </dgm:fillClrLst>
+    <dgm:linClrLst meth="repeat">
+      <a:schemeClr val="lt1"/>
+    </dgm:linClrLst>
+    <dgm:effectClrLst/>
+    <dgm:txLinClrLst/>
+    <dgm:txFillClrLst meth="repeat">
+      <a:schemeClr val="lt1"/>
+    </dgm:txFillClrLst>
+    <dgm:txEffectClrLst/>
+  </dgm:styleLbl>
+  <dgm:styleLbl name="parChTrans1D1">
+    <dgm:fillClrLst meth="repeat">
+      <a:schemeClr val="accent5"/>
+    </dgm:fillClrLst>
+    <dgm:linClrLst meth="repeat">
+      <a:schemeClr val="accent5"/>
+    </dgm:linClrLst>
+    <dgm:effectClrLst/>
+    <dgm:txLinClrLst/>
+    <dgm:txFillClrLst meth="repeat">
+      <a:schemeClr val="tx1"/>
+    </dgm:txFillClrLst>
+    <dgm:txEffectClrLst/>
+  </dgm:styleLbl>
+  <dgm:styleLbl name="parChTrans1D2">
+    <dgm:fillClrLst meth="repeat">
+      <a:schemeClr val="accent6">
+        <a:tint val="90000"/>
+      </a:schemeClr>
+    </dgm:fillClrLst>
+    <dgm:linClrLst meth="repeat">
+      <a:schemeClr val="accent6"/>
+    </dgm:linClrLst>
+    <dgm:effectClrLst/>
+    <dgm:txLinClrLst/>
+    <dgm:txFillClrLst meth="repeat">
+      <a:schemeClr val="tx1"/>
+    </dgm:txFillClrLst>
+    <dgm:txEffectClrLst/>
+  </dgm:styleLbl>
+  <dgm:styleLbl name="parChTrans1D3">
+    <dgm:fillClrLst meth="repeat">
+      <a:schemeClr val="accent6">
+        <a:tint val="70000"/>
+      </a:schemeClr>
+    </dgm:fillClrLst>
+    <dgm:linClrLst meth="repeat">
+      <a:schemeClr val="accent1"/>
+    </dgm:linClrLst>
+    <dgm:effectClrLst/>
+    <dgm:txLinClrLst/>
+    <dgm:txFillClrLst meth="repeat">
+      <a:schemeClr val="tx1"/>
+    </dgm:txFillClrLst>
+    <dgm:txEffectClrLst/>
+  </dgm:styleLbl>
+  <dgm:styleLbl name="parChTrans1D4">
+    <dgm:fillClrLst meth="repeat">
+      <a:schemeClr val="accent6">
+        <a:tint val="50000"/>
+      </a:schemeClr>
+    </dgm:fillClrLst>
+    <dgm:linClrLst meth="repeat">
+      <a:schemeClr val="accent2"/>
+    </dgm:linClrLst>
+    <dgm:effectClrLst/>
+    <dgm:txLinClrLst/>
+    <dgm:txFillClrLst meth="repeat">
+      <a:schemeClr val="tx1"/>
+    </dgm:txFillClrLst>
+    <dgm:txEffectClrLst/>
+  </dgm:styleLbl>
+  <dgm:styleLbl name="fgAcc1">
+    <dgm:fillClrLst meth="repeat">
+      <a:schemeClr val="lt1">
+        <a:alpha val="90000"/>
+      </a:schemeClr>
+    </dgm:fillClrLst>
+    <dgm:linClrLst>
+      <a:schemeClr val="accent5"/>
+      <a:schemeClr val="accent6"/>
+    </dgm:linClrLst>
+    <dgm:effectClrLst/>
+    <dgm:txLinClrLst/>
+    <dgm:txFillClrLst meth="repeat">
+      <a:schemeClr val="dk1"/>
+    </dgm:txFillClrLst>
+    <dgm:txEffectClrLst/>
+  </dgm:styleLbl>
+  <dgm:styleLbl name="conFgAcc1">
+    <dgm:fillClrLst meth="repeat">
+      <a:schemeClr val="lt1">
+        <a:alpha val="90000"/>
+      </a:schemeClr>
+    </dgm:fillClrLst>
+    <dgm:linClrLst>
+      <a:schemeClr val="accent5"/>
+      <a:schemeClr val="accent6"/>
+    </dgm:linClrLst>
+    <dgm:effectClrLst/>
+    <dgm:txLinClrLst/>
+    <dgm:txFillClrLst meth="repeat">
+      <a:schemeClr val="dk1"/>
+    </dgm:txFillClrLst>
+    <dgm:txEffectClrLst/>
+  </dgm:styleLbl>
+  <dgm:styleLbl name="alignAcc1">
+    <dgm:fillClrLst meth="repeat">
+      <a:schemeClr val="lt1">
+        <a:alpha val="90000"/>
+      </a:schemeClr>
+    </dgm:fillClrLst>
+    <dgm:linClrLst>
+      <a:schemeClr val="accent5"/>
+      <a:schemeClr val="accent6"/>
+    </dgm:linClrLst>
+    <dgm:effectClrLst/>
+    <dgm:txLinClrLst/>
+    <dgm:txFillClrLst meth="repeat">
+      <a:schemeClr val="dk1"/>
+    </dgm:txFillClrLst>
+    <dgm:txEffectClrLst/>
+  </dgm:styleLbl>
+  <dgm:styleLbl name="trAlignAcc1">
+    <dgm:fillClrLst meth="repeat">
+      <a:schemeClr val="lt1">
+        <a:alpha val="40000"/>
+      </a:schemeClr>
+    </dgm:fillClrLst>
+    <dgm:linClrLst meth="repeat">
+      <a:schemeClr val="accent5"/>
+    </dgm:linClrLst>
+    <dgm:effectClrLst/>
+    <dgm:txLinClrLst/>
+    <dgm:txFillClrLst meth="repeat">
+      <a:schemeClr val="dk1"/>
+    </dgm:txFillClrLst>
+    <dgm:txEffectClrLst/>
+  </dgm:styleLbl>
+  <dgm:styleLbl name="bgAcc1">
+    <dgm:fillClrLst meth="repeat">
+      <a:schemeClr val="lt1">
+        <a:alpha val="90000"/>
+      </a:schemeClr>
+    </dgm:fillClrLst>
+    <dgm:linClrLst>
+      <a:schemeClr val="accent5"/>
+      <a:schemeClr val="accent6"/>
+    </dgm:linClrLst>
+    <dgm:effectClrLst/>
+    <dgm:txLinClrLst/>
+    <dgm:txFillClrLst meth="repeat">
+      <a:schemeClr val="dk1"/>
+    </dgm:txFillClrLst>
+    <dgm:txEffectClrLst/>
+  </dgm:styleLbl>
+  <dgm:styleLbl name="solidFgAcc1">
+    <dgm:fillClrLst meth="repeat">
+      <a:schemeClr val="lt1"/>
+    </dgm:fillClrLst>
+    <dgm:linClrLst>
+      <a:schemeClr val="accent5"/>
+      <a:schemeClr val="accent6"/>
+    </dgm:linClrLst>
+    <dgm:effectClrLst/>
+    <dgm:txLinClrLst/>
+    <dgm:txFillClrLst meth="repeat">
+      <a:schemeClr val="dk1"/>
+    </dgm:txFillClrLst>
+    <dgm:txEffectClrLst/>
+  </dgm:styleLbl>
+  <dgm:styleLbl name="solidAlignAcc1">
+    <dgm:fillClrLst meth="repeat">
+      <a:schemeClr val="lt1"/>
+    </dgm:fillClrLst>
+    <dgm:linClrLst>
+      <a:schemeClr val="accent5"/>
+      <a:schemeClr val="accent6"/>
+    </dgm:linClrLst>
+    <dgm:effectClrLst/>
+    <dgm:txLinClrLst/>
+    <dgm:txFillClrLst meth="repeat">
+      <a:schemeClr val="dk1"/>
+    </dgm:txFillClrLst>
+    <dgm:txEffectClrLst/>
+  </dgm:styleLbl>
+  <dgm:styleLbl name="solidBgAcc1">
+    <dgm:fillClrLst meth="repeat">
+      <a:schemeClr val="lt1"/>
+    </dgm:fillClrLst>
+    <dgm:linClrLst>
+      <a:schemeClr val="accent5"/>
+      <a:schemeClr val="accent6"/>
+    </dgm:linClrLst>
+    <dgm:effectClrLst/>
+    <dgm:txLinClrLst/>
+    <dgm:txFillClrLst meth="repeat">
+      <a:schemeClr val="dk1"/>
+    </dgm:txFillClrLst>
+    <dgm:txEffectClrLst/>
+  </dgm:styleLbl>
+  <dgm:styleLbl name="fgAccFollowNode1">
+    <dgm:fillClrLst>
+      <a:schemeClr val="accent5">
+        <a:tint val="40000"/>
+        <a:alpha val="90000"/>
+      </a:schemeClr>
+      <a:schemeClr val="accent6">
+        <a:tint val="40000"/>
+        <a:alpha val="90000"/>
+      </a:schemeClr>
+    </dgm:fillClrLst>
+    <dgm:linClrLst>
+      <a:schemeClr val="accent5">
+        <a:tint val="40000"/>
+        <a:alpha val="90000"/>
+      </a:schemeClr>
+      <a:schemeClr val="accent5">
+        <a:tint val="40000"/>
+        <a:alpha val="90000"/>
+      </a:schemeClr>
+    </dgm:linClrLst>
+    <dgm:effectClrLst/>
+    <dgm:txLinClrLst/>
+    <dgm:txFillClrLst meth="repeat">
+      <a:schemeClr val="dk1"/>
+    </dgm:txFillClrLst>
+    <dgm:txEffectClrLst/>
+  </dgm:styleLbl>
+  <dgm:styleLbl name="alignAccFollowNode1">
+    <dgm:fillClrLst>
+      <a:schemeClr val="accent5">
+        <a:tint val="40000"/>
+        <a:alpha val="90000"/>
+      </a:schemeClr>
+      <a:schemeClr val="accent6">
+        <a:tint val="40000"/>
+        <a:alpha val="90000"/>
+      </a:schemeClr>
+    </dgm:fillClrLst>
+    <dgm:linClrLst>
+      <a:schemeClr val="accent5">
+        <a:tint val="40000"/>
+        <a:alpha val="90000"/>
+      </a:schemeClr>
+      <a:schemeClr val="accent6">
+        <a:tint val="40000"/>
+        <a:alpha val="90000"/>
+      </a:schemeClr>
+    </dgm:linClrLst>
+    <dgm:effectClrLst/>
+    <dgm:txLinClrLst/>
+    <dgm:txFillClrLst meth="repeat">
+      <a:schemeClr val="dk1"/>
+    </dgm:txFillClrLst>
+    <dgm:txEffectClrLst/>
+  </dgm:styleLbl>
+  <dgm:styleLbl name="bgAccFollowNode1">
+    <dgm:fillClrLst>
+      <a:schemeClr val="accent5">
+        <a:tint val="40000"/>
+        <a:alpha val="90000"/>
+      </a:schemeClr>
+      <a:schemeClr val="accent6">
+        <a:tint val="40000"/>
+        <a:alpha val="90000"/>
+      </a:schemeClr>
+    </dgm:fillClrLst>
+    <dgm:linClrLst>
+      <a:schemeClr val="accent5">
+        <a:tint val="40000"/>
+        <a:alpha val="90000"/>
+      </a:schemeClr>
+      <a:schemeClr val="accent6">
+        <a:tint val="40000"/>
+        <a:alpha val="90000"/>
+      </a:schemeClr>
+    </dgm:linClrLst>
+    <dgm:effectClrLst/>
+    <dgm:txLinClrLst/>
+    <dgm:txFillClrLst meth="repeat">
+      <a:schemeClr val="dk1"/>
+    </dgm:txFillClrLst>
+    <dgm:txEffectClrLst/>
+  </dgm:styleLbl>
+  <dgm:styleLbl name="fgAcc0">
+    <dgm:fillClrLst meth="repeat">
+      <a:schemeClr val="lt1">
+        <a:alpha val="90000"/>
+      </a:schemeClr>
+    </dgm:fillClrLst>
+    <dgm:linClrLst>
+      <a:schemeClr val="accent4"/>
+    </dgm:linClrLst>
+    <dgm:effectClrLst/>
+    <dgm:txLinClrLst/>
+    <dgm:txFillClrLst meth="repeat">
+      <a:schemeClr val="dk1"/>
+    </dgm:txFillClrLst>
+    <dgm:txEffectClrLst/>
+  </dgm:styleLbl>
+  <dgm:styleLbl name="fgAcc2">
+    <dgm:fillClrLst meth="repeat">
+      <a:schemeClr val="lt1">
+        <a:alpha val="90000"/>
+      </a:schemeClr>
+    </dgm:fillClrLst>
+    <dgm:linClrLst>
+      <a:schemeClr val="accent6"/>
+    </dgm:linClrLst>
+    <dgm:effectClrLst/>
+    <dgm:txLinClrLst/>
+    <dgm:txFillClrLst meth="repeat">
+      <a:schemeClr val="dk1"/>
+    </dgm:txFillClrLst>
+    <dgm:txEffectClrLst/>
+  </dgm:styleLbl>
+  <dgm:styleLbl name="fgAcc3">
+    <dgm:fillClrLst meth="repeat">
+      <a:schemeClr val="lt1">
+        <a:alpha val="90000"/>
+      </a:schemeClr>
+    </dgm:fillClrLst>
+    <dgm:linClrLst>
+      <a:schemeClr val="accent1"/>
+    </dgm:linClrLst>
+    <dgm:effectClrLst/>
+    <dgm:txLinClrLst/>
+    <dgm:txFillClrLst meth="repeat">
+      <a:schemeClr val="dk1"/>
+    </dgm:txFillClrLst>
+    <dgm:txEffectClrLst/>
+  </dgm:styleLbl>
+  <dgm:styleLbl name="fgAcc4">
+    <dgm:fillClrLst meth="repeat">
+      <a:schemeClr val="lt1">
+        <a:alpha val="90000"/>
+      </a:schemeClr>
+    </dgm:fillClrLst>
+    <dgm:linClrLst>
+      <a:schemeClr val="accent2"/>
+    </dgm:linClrLst>
+    <dgm:effectClrLst/>
+    <dgm:txLinClrLst/>
+    <dgm:txFillClrLst meth="repeat">
+      <a:schemeClr val="dk1"/>
+    </dgm:txFillClrLst>
+    <dgm:txEffectClrLst/>
+  </dgm:styleLbl>
+  <dgm:styleLbl name="bgShp">
+    <dgm:fillClrLst meth="repeat">
+      <a:schemeClr val="accent5">
+        <a:tint val="40000"/>
+      </a:schemeClr>
+    </dgm:fillClrLst>
+    <dgm:linClrLst meth="repeat">
+      <a:schemeClr val="dk1"/>
+    </dgm:linClrLst>
+    <dgm:effectClrLst/>
+    <dgm:txLinClrLst/>
+    <dgm:txFillClrLst meth="repeat">
+      <a:schemeClr val="dk1"/>
+    </dgm:txFillClrLst>
+    <dgm:txEffectClrLst/>
+  </dgm:styleLbl>
+  <dgm:styleLbl name="dkBgShp">
+    <dgm:fillClrLst meth="repeat">
+      <a:schemeClr val="accent5">
+        <a:shade val="90000"/>
+      </a:schemeClr>
+    </dgm:fillClrLst>
+    <dgm:linClrLst meth="repeat">
+      <a:schemeClr val="dk1"/>
+    </dgm:linClrLst>
+    <dgm:effectClrLst/>
+    <dgm:txLinClrLst/>
+    <dgm:txFillClrLst meth="repeat">
+      <a:schemeClr val="lt1"/>
+    </dgm:txFillClrLst>
+    <dgm:txEffectClrLst/>
+  </dgm:styleLbl>
+  <dgm:styleLbl name="trBgShp">
+    <dgm:fillClrLst meth="repeat">
+      <a:schemeClr val="accent5">
+        <a:tint val="50000"/>
+        <a:alpha val="40000"/>
+      </a:schemeClr>
+    </dgm:fillClrLst>
+    <dgm:linClrLst meth="repeat">
+      <a:schemeClr val="accent5"/>
+    </dgm:linClrLst>
+    <dgm:effectClrLst/>
+    <dgm:txLinClrLst/>
+    <dgm:txFillClrLst meth="repeat">
+      <a:schemeClr val="lt1"/>
+    </dgm:txFillClrLst>
+    <dgm:txEffectClrLst/>
+  </dgm:styleLbl>
+  <dgm:styleLbl name="fgShp">
+    <dgm:fillClrLst meth="repeat">
+      <a:schemeClr val="accent5">
         <a:tint val="40000"/>
       </a:schemeClr>
     </dgm:fillClrLst>
@@ -2144,6 +2932,388 @@
     <dgm:cxn modelId="{582D5D42-C571-4A94-9DCE-23203EEF8314}" type="presParOf" srcId="{A3205FA8-28DE-4746-BC80-C36FD3F2F136}" destId="{BE938736-876E-4DDB-B190-5CD955FE75DF}" srcOrd="1" destOrd="0" presId="urn:microsoft.com/office/officeart/2005/8/layout/pyramid4"/>
     <dgm:cxn modelId="{1FAF8D3A-A9EB-4B2F-B6F0-0E6B59ED9EC0}" type="presParOf" srcId="{A3205FA8-28DE-4746-BC80-C36FD3F2F136}" destId="{C8EE325B-8326-4BCF-A60D-FEDD6189F14D}" srcOrd="2" destOrd="0" presId="urn:microsoft.com/office/officeart/2005/8/layout/pyramid4"/>
     <dgm:cxn modelId="{25CF710C-3B25-4CD1-91E4-ACAAD523257E}" type="presParOf" srcId="{A3205FA8-28DE-4746-BC80-C36FD3F2F136}" destId="{2092F218-0DAB-4565-A34B-F264D0917A9F}" srcOrd="3" destOrd="0" presId="urn:microsoft.com/office/officeart/2005/8/layout/pyramid4"/>
+  </dgm:cxnLst>
+  <dgm:bg/>
+  <dgm:whole/>
+  <dgm:extLst>
+    <a:ext uri="http://schemas.microsoft.com/office/drawing/2008/diagram">
+      <dsp:dataModelExt xmlns:dsp="http://schemas.microsoft.com/office/drawing/2008/diagram" relId="rId6" minVer="http://schemas.openxmlformats.org/drawingml/2006/diagram"/>
+    </a:ext>
+  </dgm:extLst>
+</dgm:dataModel>
+</file>
+
+<file path=ppt/diagrams/data3.xml><?xml version="1.0" encoding="utf-8"?>
+<dgm:dataModel xmlns:dgm="http://schemas.openxmlformats.org/drawingml/2006/diagram" xmlns:a="http://schemas.openxmlformats.org/drawingml/2006/main">
+  <dgm:ptLst>
+    <dgm:pt modelId="{6BF8E729-676F-4E6F-985E-4A639C63578A}" type="doc">
+      <dgm:prSet loTypeId="urn:microsoft.com/office/officeart/2005/8/layout/hProcess9" loCatId="process" qsTypeId="urn:microsoft.com/office/officeart/2005/8/quickstyle/simple1" qsCatId="simple" csTypeId="urn:microsoft.com/office/officeart/2005/8/colors/colorful5" csCatId="colorful" phldr="1"/>
+      <dgm:spPr>
+        <a:scene3d>
+          <a:camera prst="perspectiveFront" fov="3300000">
+            <a:rot lat="486000" lon="19530000" rev="174000"/>
+          </a:camera>
+          <a:lightRig rig="harsh" dir="t">
+            <a:rot lat="0" lon="0" rev="3000000"/>
+          </a:lightRig>
+        </a:scene3d>
+      </dgm:spPr>
+    </dgm:pt>
+    <dgm:pt modelId="{4FE64815-A6D8-4E7A-8C0B-4A27810AC680}">
+      <dgm:prSet phldrT="[文本]"/>
+      <dgm:spPr>
+        <a:ln>
+          <a:noFill/>
+        </a:ln>
+        <a:effectLst>
+          <a:outerShdw blurRad="225425" dist="50800" dir="5220000" algn="ctr">
+            <a:srgbClr val="000000">
+              <a:alpha val="33000"/>
+            </a:srgbClr>
+          </a:outerShdw>
+        </a:effectLst>
+        <a:scene3d>
+          <a:camera prst="perspectiveFront" fov="3300000">
+            <a:rot lat="486000" lon="19530000" rev="174000"/>
+          </a:camera>
+          <a:lightRig rig="harsh" dir="t">
+            <a:rot lat="0" lon="0" rev="3000000"/>
+          </a:lightRig>
+        </a:scene3d>
+        <a:sp3d extrusionH="254000" contourW="19050">
+          <a:bevelT w="82550" h="44450" prst="angle"/>
+          <a:bevelB w="82550" h="44450" prst="angle"/>
+          <a:contourClr>
+            <a:srgbClr val="FFFFFF"/>
+          </a:contourClr>
+        </a:sp3d>
+      </dgm:spPr>
+      <dgm:t>
+        <a:bodyPr/>
+        <a:lstStyle/>
+        <a:p>
+          <a:r>
+            <a:rPr lang="zh-CN" altLang="en-US" dirty="0"/>
+            <a:t>输入</a:t>
+          </a:r>
+        </a:p>
+      </dgm:t>
+    </dgm:pt>
+    <dgm:pt modelId="{CF237690-C89F-4569-A4A7-263379E95B97}" type="parTrans" cxnId="{7AD491C7-2715-4509-9B89-B27E40B93060}">
+      <dgm:prSet/>
+      <dgm:spPr/>
+      <dgm:t>
+        <a:bodyPr/>
+        <a:lstStyle/>
+        <a:p>
+          <a:endParaRPr lang="zh-CN" altLang="en-US"/>
+        </a:p>
+      </dgm:t>
+    </dgm:pt>
+    <dgm:pt modelId="{3F3F5394-E8E3-4E4C-9A68-C308C9F7B1ED}" type="sibTrans" cxnId="{7AD491C7-2715-4509-9B89-B27E40B93060}">
+      <dgm:prSet/>
+      <dgm:spPr/>
+      <dgm:t>
+        <a:bodyPr/>
+        <a:lstStyle/>
+        <a:p>
+          <a:endParaRPr lang="zh-CN" altLang="en-US"/>
+        </a:p>
+      </dgm:t>
+    </dgm:pt>
+    <dgm:pt modelId="{113947F8-75B1-40A6-B9AC-C987D75246A3}">
+      <dgm:prSet phldrT="[文本]"/>
+      <dgm:spPr>
+        <a:ln>
+          <a:noFill/>
+        </a:ln>
+        <a:effectLst>
+          <a:outerShdw blurRad="225425" dist="50800" dir="5220000" algn="ctr">
+            <a:srgbClr val="000000">
+              <a:alpha val="33000"/>
+            </a:srgbClr>
+          </a:outerShdw>
+        </a:effectLst>
+        <a:scene3d>
+          <a:camera prst="perspectiveFront" fov="3300000">
+            <a:rot lat="486000" lon="19530000" rev="174000"/>
+          </a:camera>
+          <a:lightRig rig="harsh" dir="t">
+            <a:rot lat="0" lon="0" rev="3000000"/>
+          </a:lightRig>
+        </a:scene3d>
+        <a:sp3d extrusionH="254000" contourW="19050">
+          <a:bevelT w="82550" h="44450" prst="angle"/>
+          <a:bevelB w="82550" h="44450" prst="angle"/>
+          <a:contourClr>
+            <a:srgbClr val="FFFFFF"/>
+          </a:contourClr>
+        </a:sp3d>
+      </dgm:spPr>
+      <dgm:t>
+        <a:bodyPr/>
+        <a:lstStyle/>
+        <a:p>
+          <a:r>
+            <a:rPr lang="zh-CN" altLang="en-US" dirty="0"/>
+            <a:t>工具与技术</a:t>
+          </a:r>
+        </a:p>
+      </dgm:t>
+    </dgm:pt>
+    <dgm:pt modelId="{7F7D1CD5-562B-4A62-AFED-7E042692B1DE}" type="parTrans" cxnId="{AF282AFE-665F-470B-8FFC-BFE26CE0824E}">
+      <dgm:prSet/>
+      <dgm:spPr/>
+      <dgm:t>
+        <a:bodyPr/>
+        <a:lstStyle/>
+        <a:p>
+          <a:endParaRPr lang="zh-CN" altLang="en-US"/>
+        </a:p>
+      </dgm:t>
+    </dgm:pt>
+    <dgm:pt modelId="{3A66957A-6B36-400A-93AE-2485D533E7BD}" type="sibTrans" cxnId="{AF282AFE-665F-470B-8FFC-BFE26CE0824E}">
+      <dgm:prSet/>
+      <dgm:spPr/>
+      <dgm:t>
+        <a:bodyPr/>
+        <a:lstStyle/>
+        <a:p>
+          <a:endParaRPr lang="zh-CN" altLang="en-US"/>
+        </a:p>
+      </dgm:t>
+    </dgm:pt>
+    <dgm:pt modelId="{C2DFA92B-593C-4767-B45E-A76A7F474E5C}">
+      <dgm:prSet phldrT="[文本]"/>
+      <dgm:spPr>
+        <a:ln>
+          <a:noFill/>
+        </a:ln>
+        <a:effectLst>
+          <a:outerShdw blurRad="225425" dist="50800" dir="5220000" algn="ctr">
+            <a:srgbClr val="000000">
+              <a:alpha val="33000"/>
+            </a:srgbClr>
+          </a:outerShdw>
+        </a:effectLst>
+        <a:scene3d>
+          <a:camera prst="perspectiveFront" fov="3300000">
+            <a:rot lat="486000" lon="19530000" rev="174000"/>
+          </a:camera>
+          <a:lightRig rig="harsh" dir="t">
+            <a:rot lat="0" lon="0" rev="3000000"/>
+          </a:lightRig>
+        </a:scene3d>
+        <a:sp3d extrusionH="254000" contourW="19050">
+          <a:bevelT w="82550" h="44450" prst="angle"/>
+          <a:bevelB w="82550" h="44450" prst="angle"/>
+          <a:contourClr>
+            <a:srgbClr val="FFFFFF"/>
+          </a:contourClr>
+        </a:sp3d>
+      </dgm:spPr>
+      <dgm:t>
+        <a:bodyPr/>
+        <a:lstStyle/>
+        <a:p>
+          <a:r>
+            <a:rPr lang="zh-CN" altLang="en-US" dirty="0"/>
+            <a:t>输出</a:t>
+          </a:r>
+        </a:p>
+      </dgm:t>
+    </dgm:pt>
+    <dgm:pt modelId="{56466804-05A8-443A-AF2D-607167675358}" type="parTrans" cxnId="{4F6313AA-ED1C-46E8-B569-D85603509FEE}">
+      <dgm:prSet/>
+      <dgm:spPr/>
+      <dgm:t>
+        <a:bodyPr/>
+        <a:lstStyle/>
+        <a:p>
+          <a:endParaRPr lang="zh-CN" altLang="en-US"/>
+        </a:p>
+      </dgm:t>
+    </dgm:pt>
+    <dgm:pt modelId="{C7BF1E03-EDD1-4A8F-901E-CD0F599F2588}" type="sibTrans" cxnId="{4F6313AA-ED1C-46E8-B569-D85603509FEE}">
+      <dgm:prSet/>
+      <dgm:spPr/>
+      <dgm:t>
+        <a:bodyPr/>
+        <a:lstStyle/>
+        <a:p>
+          <a:endParaRPr lang="zh-CN" altLang="en-US"/>
+        </a:p>
+      </dgm:t>
+    </dgm:pt>
+    <dgm:pt modelId="{A8ABEA02-9BD7-431C-966C-7B2AF2EA1B9C}" type="pres">
+      <dgm:prSet presAssocID="{6BF8E729-676F-4E6F-985E-4A639C63578A}" presName="CompostProcess" presStyleCnt="0">
+        <dgm:presLayoutVars>
+          <dgm:dir/>
+          <dgm:resizeHandles val="exact"/>
+        </dgm:presLayoutVars>
+      </dgm:prSet>
+      <dgm:spPr/>
+    </dgm:pt>
+    <dgm:pt modelId="{0D3DD33B-0D3B-4798-8537-2FED6E7A2E4F}" type="pres">
+      <dgm:prSet presAssocID="{6BF8E729-676F-4E6F-985E-4A639C63578A}" presName="arrow" presStyleLbl="bgShp" presStyleIdx="0" presStyleCnt="1"/>
+      <dgm:spPr>
+        <a:ln>
+          <a:noFill/>
+        </a:ln>
+        <a:effectLst>
+          <a:outerShdw blurRad="225425" dist="50800" dir="5220000" algn="ctr">
+            <a:srgbClr val="000000">
+              <a:alpha val="33000"/>
+            </a:srgbClr>
+          </a:outerShdw>
+        </a:effectLst>
+        <a:scene3d>
+          <a:camera prst="perspectiveFront" fov="3300000">
+            <a:rot lat="486000" lon="19530000" rev="174000"/>
+          </a:camera>
+          <a:lightRig rig="harsh" dir="t">
+            <a:rot lat="0" lon="0" rev="3000000"/>
+          </a:lightRig>
+        </a:scene3d>
+        <a:sp3d extrusionH="254000" contourW="19050">
+          <a:bevelT w="82550" h="44450" prst="angle"/>
+          <a:bevelB w="82550" h="44450" prst="angle"/>
+          <a:contourClr>
+            <a:srgbClr val="FFFFFF"/>
+          </a:contourClr>
+        </a:sp3d>
+      </dgm:spPr>
+    </dgm:pt>
+    <dgm:pt modelId="{658F35E3-6B04-4D23-BF12-AF3F2A1661AD}" type="pres">
+      <dgm:prSet presAssocID="{6BF8E729-676F-4E6F-985E-4A639C63578A}" presName="linearProcess" presStyleCnt="0"/>
+      <dgm:spPr>
+        <a:ln>
+          <a:noFill/>
+        </a:ln>
+        <a:effectLst>
+          <a:outerShdw blurRad="225425" dist="50800" dir="5220000" algn="ctr">
+            <a:srgbClr val="000000">
+              <a:alpha val="33000"/>
+            </a:srgbClr>
+          </a:outerShdw>
+        </a:effectLst>
+        <a:scene3d>
+          <a:camera prst="perspectiveFront" fov="3300000">
+            <a:rot lat="486000" lon="19530000" rev="174000"/>
+          </a:camera>
+          <a:lightRig rig="harsh" dir="t">
+            <a:rot lat="0" lon="0" rev="3000000"/>
+          </a:lightRig>
+        </a:scene3d>
+        <a:sp3d extrusionH="254000" contourW="19050">
+          <a:bevelT w="82550" h="44450" prst="angle"/>
+          <a:bevelB w="82550" h="44450" prst="angle"/>
+          <a:contourClr>
+            <a:srgbClr val="FFFFFF"/>
+          </a:contourClr>
+        </a:sp3d>
+      </dgm:spPr>
+    </dgm:pt>
+    <dgm:pt modelId="{08E2FEFD-DBB6-448C-9238-344C75636F2F}" type="pres">
+      <dgm:prSet presAssocID="{4FE64815-A6D8-4E7A-8C0B-4A27810AC680}" presName="textNode" presStyleLbl="node1" presStyleIdx="0" presStyleCnt="3">
+        <dgm:presLayoutVars>
+          <dgm:bulletEnabled val="1"/>
+        </dgm:presLayoutVars>
+      </dgm:prSet>
+      <dgm:spPr/>
+    </dgm:pt>
+    <dgm:pt modelId="{931A6495-B0A6-415F-9837-1CEC19D5DA21}" type="pres">
+      <dgm:prSet presAssocID="{3F3F5394-E8E3-4E4C-9A68-C308C9F7B1ED}" presName="sibTrans" presStyleCnt="0"/>
+      <dgm:spPr>
+        <a:ln>
+          <a:noFill/>
+        </a:ln>
+        <a:effectLst>
+          <a:outerShdw blurRad="225425" dist="50800" dir="5220000" algn="ctr">
+            <a:srgbClr val="000000">
+              <a:alpha val="33000"/>
+            </a:srgbClr>
+          </a:outerShdw>
+        </a:effectLst>
+        <a:scene3d>
+          <a:camera prst="perspectiveFront" fov="3300000">
+            <a:rot lat="486000" lon="19530000" rev="174000"/>
+          </a:camera>
+          <a:lightRig rig="harsh" dir="t">
+            <a:rot lat="0" lon="0" rev="3000000"/>
+          </a:lightRig>
+        </a:scene3d>
+        <a:sp3d extrusionH="254000" contourW="19050">
+          <a:bevelT w="82550" h="44450" prst="angle"/>
+          <a:bevelB w="82550" h="44450" prst="angle"/>
+          <a:contourClr>
+            <a:srgbClr val="FFFFFF"/>
+          </a:contourClr>
+        </a:sp3d>
+      </dgm:spPr>
+    </dgm:pt>
+    <dgm:pt modelId="{4AE2727C-5205-4911-A347-363FA8654419}" type="pres">
+      <dgm:prSet presAssocID="{113947F8-75B1-40A6-B9AC-C987D75246A3}" presName="textNode" presStyleLbl="node1" presStyleIdx="1" presStyleCnt="3">
+        <dgm:presLayoutVars>
+          <dgm:bulletEnabled val="1"/>
+        </dgm:presLayoutVars>
+      </dgm:prSet>
+      <dgm:spPr/>
+    </dgm:pt>
+    <dgm:pt modelId="{4051929E-3AC6-4FE3-A98B-F0D482D5AEB3}" type="pres">
+      <dgm:prSet presAssocID="{3A66957A-6B36-400A-93AE-2485D533E7BD}" presName="sibTrans" presStyleCnt="0"/>
+      <dgm:spPr>
+        <a:ln>
+          <a:noFill/>
+        </a:ln>
+        <a:effectLst>
+          <a:outerShdw blurRad="225425" dist="50800" dir="5220000" algn="ctr">
+            <a:srgbClr val="000000">
+              <a:alpha val="33000"/>
+            </a:srgbClr>
+          </a:outerShdw>
+        </a:effectLst>
+        <a:scene3d>
+          <a:camera prst="perspectiveFront" fov="3300000">
+            <a:rot lat="486000" lon="19530000" rev="174000"/>
+          </a:camera>
+          <a:lightRig rig="harsh" dir="t">
+            <a:rot lat="0" lon="0" rev="3000000"/>
+          </a:lightRig>
+        </a:scene3d>
+        <a:sp3d extrusionH="254000" contourW="19050">
+          <a:bevelT w="82550" h="44450" prst="angle"/>
+          <a:bevelB w="82550" h="44450" prst="angle"/>
+          <a:contourClr>
+            <a:srgbClr val="FFFFFF"/>
+          </a:contourClr>
+        </a:sp3d>
+      </dgm:spPr>
+    </dgm:pt>
+    <dgm:pt modelId="{A4D43959-57A2-4CAD-9934-C9487D2FA9D1}" type="pres">
+      <dgm:prSet presAssocID="{C2DFA92B-593C-4767-B45E-A76A7F474E5C}" presName="textNode" presStyleLbl="node1" presStyleIdx="2" presStyleCnt="3">
+        <dgm:presLayoutVars>
+          <dgm:bulletEnabled val="1"/>
+        </dgm:presLayoutVars>
+      </dgm:prSet>
+      <dgm:spPr/>
+    </dgm:pt>
+  </dgm:ptLst>
+  <dgm:cxnLst>
+    <dgm:cxn modelId="{676B8203-539F-46EF-BDBA-9DAF0085839D}" type="presOf" srcId="{C2DFA92B-593C-4767-B45E-A76A7F474E5C}" destId="{A4D43959-57A2-4CAD-9934-C9487D2FA9D1}" srcOrd="0" destOrd="0" presId="urn:microsoft.com/office/officeart/2005/8/layout/hProcess9"/>
+    <dgm:cxn modelId="{7E165006-E509-49E6-9F11-A766FF4BC837}" type="presOf" srcId="{113947F8-75B1-40A6-B9AC-C987D75246A3}" destId="{4AE2727C-5205-4911-A347-363FA8654419}" srcOrd="0" destOrd="0" presId="urn:microsoft.com/office/officeart/2005/8/layout/hProcess9"/>
+    <dgm:cxn modelId="{4F6313AA-ED1C-46E8-B569-D85603509FEE}" srcId="{6BF8E729-676F-4E6F-985E-4A639C63578A}" destId="{C2DFA92B-593C-4767-B45E-A76A7F474E5C}" srcOrd="2" destOrd="0" parTransId="{56466804-05A8-443A-AF2D-607167675358}" sibTransId="{C7BF1E03-EDD1-4A8F-901E-CD0F599F2588}"/>
+    <dgm:cxn modelId="{20CBE8AC-A028-47FB-8FD2-0E2C7E2434F5}" type="presOf" srcId="{6BF8E729-676F-4E6F-985E-4A639C63578A}" destId="{A8ABEA02-9BD7-431C-966C-7B2AF2EA1B9C}" srcOrd="0" destOrd="0" presId="urn:microsoft.com/office/officeart/2005/8/layout/hProcess9"/>
+    <dgm:cxn modelId="{7AD491C7-2715-4509-9B89-B27E40B93060}" srcId="{6BF8E729-676F-4E6F-985E-4A639C63578A}" destId="{4FE64815-A6D8-4E7A-8C0B-4A27810AC680}" srcOrd="0" destOrd="0" parTransId="{CF237690-C89F-4569-A4A7-263379E95B97}" sibTransId="{3F3F5394-E8E3-4E4C-9A68-C308C9F7B1ED}"/>
+    <dgm:cxn modelId="{D7525EF9-7444-438A-9F22-62DACE999AF9}" type="presOf" srcId="{4FE64815-A6D8-4E7A-8C0B-4A27810AC680}" destId="{08E2FEFD-DBB6-448C-9238-344C75636F2F}" srcOrd="0" destOrd="0" presId="urn:microsoft.com/office/officeart/2005/8/layout/hProcess9"/>
+    <dgm:cxn modelId="{AF282AFE-665F-470B-8FFC-BFE26CE0824E}" srcId="{6BF8E729-676F-4E6F-985E-4A639C63578A}" destId="{113947F8-75B1-40A6-B9AC-C987D75246A3}" srcOrd="1" destOrd="0" parTransId="{7F7D1CD5-562B-4A62-AFED-7E042692B1DE}" sibTransId="{3A66957A-6B36-400A-93AE-2485D533E7BD}"/>
+    <dgm:cxn modelId="{CAC32C43-D32A-442D-AE67-87F688B314D3}" type="presParOf" srcId="{A8ABEA02-9BD7-431C-966C-7B2AF2EA1B9C}" destId="{0D3DD33B-0D3B-4798-8537-2FED6E7A2E4F}" srcOrd="0" destOrd="0" presId="urn:microsoft.com/office/officeart/2005/8/layout/hProcess9"/>
+    <dgm:cxn modelId="{5A65A58F-F9FB-44A0-8D9E-6E60D5FD185C}" type="presParOf" srcId="{A8ABEA02-9BD7-431C-966C-7B2AF2EA1B9C}" destId="{658F35E3-6B04-4D23-BF12-AF3F2A1661AD}" srcOrd="1" destOrd="0" presId="urn:microsoft.com/office/officeart/2005/8/layout/hProcess9"/>
+    <dgm:cxn modelId="{4A09024D-A668-4895-87D2-8AFFD030F8B3}" type="presParOf" srcId="{658F35E3-6B04-4D23-BF12-AF3F2A1661AD}" destId="{08E2FEFD-DBB6-448C-9238-344C75636F2F}" srcOrd="0" destOrd="0" presId="urn:microsoft.com/office/officeart/2005/8/layout/hProcess9"/>
+    <dgm:cxn modelId="{2F8CBA81-D8EC-49D1-8F28-3870F66D134D}" type="presParOf" srcId="{658F35E3-6B04-4D23-BF12-AF3F2A1661AD}" destId="{931A6495-B0A6-415F-9837-1CEC19D5DA21}" srcOrd="1" destOrd="0" presId="urn:microsoft.com/office/officeart/2005/8/layout/hProcess9"/>
+    <dgm:cxn modelId="{FD52486C-2FDF-4EDE-A585-B33FBAA59100}" type="presParOf" srcId="{658F35E3-6B04-4D23-BF12-AF3F2A1661AD}" destId="{4AE2727C-5205-4911-A347-363FA8654419}" srcOrd="2" destOrd="0" presId="urn:microsoft.com/office/officeart/2005/8/layout/hProcess9"/>
+    <dgm:cxn modelId="{FACA9C27-740B-417F-B5E2-25E7EF757C81}" type="presParOf" srcId="{658F35E3-6B04-4D23-BF12-AF3F2A1661AD}" destId="{4051929E-3AC6-4FE3-A98B-F0D482D5AEB3}" srcOrd="3" destOrd="0" presId="urn:microsoft.com/office/officeart/2005/8/layout/hProcess9"/>
+    <dgm:cxn modelId="{03498FCD-7BC9-4F0E-A9F1-BA0BB44D93C2}" type="presParOf" srcId="{658F35E3-6B04-4D23-BF12-AF3F2A1661AD}" destId="{A4D43959-57A2-4CAD-9934-C9487D2FA9D1}" srcOrd="4" destOrd="0" presId="urn:microsoft.com/office/officeart/2005/8/layout/hProcess9"/>
   </dgm:cxnLst>
   <dgm:bg/>
   <dgm:whole/>
@@ -2813,6 +3983,355 @@
       <dsp:txXfrm>
         <a:off x="3713359" y="2809980"/>
         <a:ext cx="936660" cy="936660"/>
+      </dsp:txXfrm>
+    </dsp:sp>
+  </dsp:spTree>
+</dsp:drawing>
+</file>
+
+<file path=ppt/diagrams/drawing3.xml><?xml version="1.0" encoding="utf-8"?>
+<dsp:drawing xmlns:dgm="http://schemas.openxmlformats.org/drawingml/2006/diagram" xmlns:dsp="http://schemas.microsoft.com/office/drawing/2008/diagram" xmlns:a="http://schemas.openxmlformats.org/drawingml/2006/main">
+  <dsp:spTree>
+    <dsp:nvGrpSpPr>
+      <dsp:cNvPr id="0" name=""/>
+      <dsp:cNvGrpSpPr/>
+    </dsp:nvGrpSpPr>
+    <dsp:grpSpPr/>
+    <dsp:sp modelId="{0D3DD33B-0D3B-4798-8537-2FED6E7A2E4F}">
+      <dsp:nvSpPr>
+        <dsp:cNvPr id="0" name=""/>
+        <dsp:cNvSpPr/>
+      </dsp:nvSpPr>
+      <dsp:spPr>
+        <a:xfrm>
+          <a:off x="680911" y="0"/>
+          <a:ext cx="7716999" cy="3334749"/>
+        </a:xfrm>
+        <a:prstGeom prst="rightArrow">
+          <a:avLst/>
+        </a:prstGeom>
+        <a:solidFill>
+          <a:schemeClr val="accent5">
+            <a:tint val="40000"/>
+            <a:hueOff val="0"/>
+            <a:satOff val="0"/>
+            <a:lumOff val="0"/>
+            <a:alphaOff val="0"/>
+          </a:schemeClr>
+        </a:solidFill>
+        <a:ln>
+          <a:noFill/>
+        </a:ln>
+        <a:effectLst>
+          <a:outerShdw blurRad="225425" dist="50800" dir="5220000" algn="ctr" rotWithShape="0">
+            <a:srgbClr val="000000">
+              <a:alpha val="33000"/>
+            </a:srgbClr>
+          </a:outerShdw>
+        </a:effectLst>
+        <a:scene3d>
+          <a:camera prst="perspectiveFront" fov="3300000">
+            <a:rot lat="486000" lon="19530000" rev="174000"/>
+          </a:camera>
+          <a:lightRig rig="harsh" dir="t">
+            <a:rot lat="0" lon="0" rev="3000000"/>
+          </a:lightRig>
+        </a:scene3d>
+        <a:sp3d extrusionH="254000" contourW="19050">
+          <a:bevelT w="82550" h="44450" prst="angle"/>
+          <a:bevelB w="82550" h="44450" prst="angle"/>
+          <a:contourClr>
+            <a:srgbClr val="FFFFFF"/>
+          </a:contourClr>
+        </a:sp3d>
+      </dsp:spPr>
+      <dsp:style>
+        <a:lnRef idx="0">
+          <a:scrgbClr r="0" g="0" b="0"/>
+        </a:lnRef>
+        <a:fillRef idx="1">
+          <a:scrgbClr r="0" g="0" b="0"/>
+        </a:fillRef>
+        <a:effectRef idx="0">
+          <a:scrgbClr r="0" g="0" b="0"/>
+        </a:effectRef>
+        <a:fontRef idx="minor"/>
+      </dsp:style>
+    </dsp:sp>
+    <dsp:sp modelId="{08E2FEFD-DBB6-448C-9238-344C75636F2F}">
+      <dsp:nvSpPr>
+        <dsp:cNvPr id="0" name=""/>
+        <dsp:cNvSpPr/>
+      </dsp:nvSpPr>
+      <dsp:spPr>
+        <a:xfrm>
+          <a:off x="4377" y="1000424"/>
+          <a:ext cx="2806433" cy="1333899"/>
+        </a:xfrm>
+        <a:prstGeom prst="roundRect">
+          <a:avLst/>
+        </a:prstGeom>
+        <a:solidFill>
+          <a:schemeClr val="accent5">
+            <a:hueOff val="0"/>
+            <a:satOff val="0"/>
+            <a:lumOff val="0"/>
+            <a:alphaOff val="0"/>
+          </a:schemeClr>
+        </a:solidFill>
+        <a:ln w="12700" cap="flat" cmpd="sng" algn="ctr">
+          <a:noFill/>
+          <a:prstDash val="solid"/>
+          <a:miter lim="800000"/>
+        </a:ln>
+        <a:effectLst>
+          <a:outerShdw blurRad="225425" dist="50800" dir="5220000" algn="ctr" rotWithShape="0">
+            <a:srgbClr val="000000">
+              <a:alpha val="33000"/>
+            </a:srgbClr>
+          </a:outerShdw>
+        </a:effectLst>
+        <a:scene3d>
+          <a:camera prst="perspectiveFront" fov="3300000">
+            <a:rot lat="486000" lon="19530000" rev="174000"/>
+          </a:camera>
+          <a:lightRig rig="harsh" dir="t">
+            <a:rot lat="0" lon="0" rev="3000000"/>
+          </a:lightRig>
+        </a:scene3d>
+        <a:sp3d extrusionH="254000" contourW="19050">
+          <a:bevelT w="82550" h="44450" prst="angle"/>
+          <a:bevelB w="82550" h="44450" prst="angle"/>
+          <a:contourClr>
+            <a:srgbClr val="FFFFFF"/>
+          </a:contourClr>
+        </a:sp3d>
+      </dsp:spPr>
+      <dsp:style>
+        <a:lnRef idx="2">
+          <a:scrgbClr r="0" g="0" b="0"/>
+        </a:lnRef>
+        <a:fillRef idx="1">
+          <a:scrgbClr r="0" g="0" b="0"/>
+        </a:fillRef>
+        <a:effectRef idx="0">
+          <a:scrgbClr r="0" g="0" b="0"/>
+        </a:effectRef>
+        <a:fontRef idx="minor">
+          <a:schemeClr val="lt1"/>
+        </a:fontRef>
+      </dsp:style>
+      <dsp:txBody>
+        <a:bodyPr spcFirstLastPara="0" vert="horz" wrap="square" lIns="140970" tIns="140970" rIns="140970" bIns="140970" numCol="1" spcCol="1270" anchor="ctr" anchorCtr="0">
+          <a:noAutofit/>
+        </a:bodyPr>
+        <a:lstStyle/>
+        <a:p>
+          <a:pPr marL="0" lvl="0" indent="0" algn="ctr" defTabSz="1644650">
+            <a:lnSpc>
+              <a:spcPct val="90000"/>
+            </a:lnSpc>
+            <a:spcBef>
+              <a:spcPct val="0"/>
+            </a:spcBef>
+            <a:spcAft>
+              <a:spcPct val="35000"/>
+            </a:spcAft>
+            <a:buNone/>
+          </a:pPr>
+          <a:r>
+            <a:rPr lang="zh-CN" altLang="en-US" sz="3700" kern="1200" dirty="0"/>
+            <a:t>输入</a:t>
+          </a:r>
+        </a:p>
+      </dsp:txBody>
+      <dsp:txXfrm>
+        <a:off x="69493" y="1065540"/>
+        <a:ext cx="2676201" cy="1203667"/>
+      </dsp:txXfrm>
+    </dsp:sp>
+    <dsp:sp modelId="{4AE2727C-5205-4911-A347-363FA8654419}">
+      <dsp:nvSpPr>
+        <dsp:cNvPr id="0" name=""/>
+        <dsp:cNvSpPr/>
+      </dsp:nvSpPr>
+      <dsp:spPr>
+        <a:xfrm>
+          <a:off x="3136194" y="1000424"/>
+          <a:ext cx="2806433" cy="1333899"/>
+        </a:xfrm>
+        <a:prstGeom prst="roundRect">
+          <a:avLst/>
+        </a:prstGeom>
+        <a:solidFill>
+          <a:schemeClr val="accent5">
+            <a:hueOff val="-3379271"/>
+            <a:satOff val="-8710"/>
+            <a:lumOff val="-5883"/>
+            <a:alphaOff val="0"/>
+          </a:schemeClr>
+        </a:solidFill>
+        <a:ln w="12700" cap="flat" cmpd="sng" algn="ctr">
+          <a:noFill/>
+          <a:prstDash val="solid"/>
+          <a:miter lim="800000"/>
+        </a:ln>
+        <a:effectLst>
+          <a:outerShdw blurRad="225425" dist="50800" dir="5220000" algn="ctr" rotWithShape="0">
+            <a:srgbClr val="000000">
+              <a:alpha val="33000"/>
+            </a:srgbClr>
+          </a:outerShdw>
+        </a:effectLst>
+        <a:scene3d>
+          <a:camera prst="perspectiveFront" fov="3300000">
+            <a:rot lat="486000" lon="19530000" rev="174000"/>
+          </a:camera>
+          <a:lightRig rig="harsh" dir="t">
+            <a:rot lat="0" lon="0" rev="3000000"/>
+          </a:lightRig>
+        </a:scene3d>
+        <a:sp3d extrusionH="254000" contourW="19050">
+          <a:bevelT w="82550" h="44450" prst="angle"/>
+          <a:bevelB w="82550" h="44450" prst="angle"/>
+          <a:contourClr>
+            <a:srgbClr val="FFFFFF"/>
+          </a:contourClr>
+        </a:sp3d>
+      </dsp:spPr>
+      <dsp:style>
+        <a:lnRef idx="2">
+          <a:scrgbClr r="0" g="0" b="0"/>
+        </a:lnRef>
+        <a:fillRef idx="1">
+          <a:scrgbClr r="0" g="0" b="0"/>
+        </a:fillRef>
+        <a:effectRef idx="0">
+          <a:scrgbClr r="0" g="0" b="0"/>
+        </a:effectRef>
+        <a:fontRef idx="minor">
+          <a:schemeClr val="lt1"/>
+        </a:fontRef>
+      </dsp:style>
+      <dsp:txBody>
+        <a:bodyPr spcFirstLastPara="0" vert="horz" wrap="square" lIns="140970" tIns="140970" rIns="140970" bIns="140970" numCol="1" spcCol="1270" anchor="ctr" anchorCtr="0">
+          <a:noAutofit/>
+        </a:bodyPr>
+        <a:lstStyle/>
+        <a:p>
+          <a:pPr marL="0" lvl="0" indent="0" algn="ctr" defTabSz="1644650">
+            <a:lnSpc>
+              <a:spcPct val="90000"/>
+            </a:lnSpc>
+            <a:spcBef>
+              <a:spcPct val="0"/>
+            </a:spcBef>
+            <a:spcAft>
+              <a:spcPct val="35000"/>
+            </a:spcAft>
+            <a:buNone/>
+          </a:pPr>
+          <a:r>
+            <a:rPr lang="zh-CN" altLang="en-US" sz="3700" kern="1200" dirty="0"/>
+            <a:t>工具与技术</a:t>
+          </a:r>
+        </a:p>
+      </dsp:txBody>
+      <dsp:txXfrm>
+        <a:off x="3201310" y="1065540"/>
+        <a:ext cx="2676201" cy="1203667"/>
+      </dsp:txXfrm>
+    </dsp:sp>
+    <dsp:sp modelId="{A4D43959-57A2-4CAD-9934-C9487D2FA9D1}">
+      <dsp:nvSpPr>
+        <dsp:cNvPr id="0" name=""/>
+        <dsp:cNvSpPr/>
+      </dsp:nvSpPr>
+      <dsp:spPr>
+        <a:xfrm>
+          <a:off x="6268011" y="1000424"/>
+          <a:ext cx="2806433" cy="1333899"/>
+        </a:xfrm>
+        <a:prstGeom prst="roundRect">
+          <a:avLst/>
+        </a:prstGeom>
+        <a:solidFill>
+          <a:schemeClr val="accent5">
+            <a:hueOff val="-6758543"/>
+            <a:satOff val="-17419"/>
+            <a:lumOff val="-11765"/>
+            <a:alphaOff val="0"/>
+          </a:schemeClr>
+        </a:solidFill>
+        <a:ln w="12700" cap="flat" cmpd="sng" algn="ctr">
+          <a:noFill/>
+          <a:prstDash val="solid"/>
+          <a:miter lim="800000"/>
+        </a:ln>
+        <a:effectLst>
+          <a:outerShdw blurRad="225425" dist="50800" dir="5220000" algn="ctr" rotWithShape="0">
+            <a:srgbClr val="000000">
+              <a:alpha val="33000"/>
+            </a:srgbClr>
+          </a:outerShdw>
+        </a:effectLst>
+        <a:scene3d>
+          <a:camera prst="perspectiveFront" fov="3300000">
+            <a:rot lat="486000" lon="19530000" rev="174000"/>
+          </a:camera>
+          <a:lightRig rig="harsh" dir="t">
+            <a:rot lat="0" lon="0" rev="3000000"/>
+          </a:lightRig>
+        </a:scene3d>
+        <a:sp3d extrusionH="254000" contourW="19050">
+          <a:bevelT w="82550" h="44450" prst="angle"/>
+          <a:bevelB w="82550" h="44450" prst="angle"/>
+          <a:contourClr>
+            <a:srgbClr val="FFFFFF"/>
+          </a:contourClr>
+        </a:sp3d>
+      </dsp:spPr>
+      <dsp:style>
+        <a:lnRef idx="2">
+          <a:scrgbClr r="0" g="0" b="0"/>
+        </a:lnRef>
+        <a:fillRef idx="1">
+          <a:scrgbClr r="0" g="0" b="0"/>
+        </a:fillRef>
+        <a:effectRef idx="0">
+          <a:scrgbClr r="0" g="0" b="0"/>
+        </a:effectRef>
+        <a:fontRef idx="minor">
+          <a:schemeClr val="lt1"/>
+        </a:fontRef>
+      </dsp:style>
+      <dsp:txBody>
+        <a:bodyPr spcFirstLastPara="0" vert="horz" wrap="square" lIns="140970" tIns="140970" rIns="140970" bIns="140970" numCol="1" spcCol="1270" anchor="ctr" anchorCtr="0">
+          <a:noAutofit/>
+        </a:bodyPr>
+        <a:lstStyle/>
+        <a:p>
+          <a:pPr marL="0" lvl="0" indent="0" algn="ctr" defTabSz="1644650">
+            <a:lnSpc>
+              <a:spcPct val="90000"/>
+            </a:lnSpc>
+            <a:spcBef>
+              <a:spcPct val="0"/>
+            </a:spcBef>
+            <a:spcAft>
+              <a:spcPct val="35000"/>
+            </a:spcAft>
+            <a:buNone/>
+          </a:pPr>
+          <a:r>
+            <a:rPr lang="zh-CN" altLang="en-US" sz="3700" kern="1200" dirty="0"/>
+            <a:t>输出</a:t>
+          </a:r>
+        </a:p>
+      </dsp:txBody>
+      <dsp:txXfrm>
+        <a:off x="6333127" y="1065540"/>
+        <a:ext cx="2676201" cy="1203667"/>
       </dsp:txXfrm>
     </dsp:sp>
   </dsp:spTree>
@@ -3599,6 +5118,160 @@
 </dgm:layoutDef>
 </file>
 
+<file path=ppt/diagrams/layout3.xml><?xml version="1.0" encoding="utf-8"?>
+<dgm:layoutDef xmlns:dgm="http://schemas.openxmlformats.org/drawingml/2006/diagram" xmlns:a="http://schemas.openxmlformats.org/drawingml/2006/main" uniqueId="urn:microsoft.com/office/officeart/2005/8/layout/hProcess9">
+  <dgm:title val=""/>
+  <dgm:desc val=""/>
+  <dgm:catLst>
+    <dgm:cat type="process" pri="5000"/>
+    <dgm:cat type="convert" pri="13000"/>
+  </dgm:catLst>
+  <dgm:sampData useDef="1">
+    <dgm:dataModel>
+      <dgm:ptLst/>
+      <dgm:bg/>
+      <dgm:whole/>
+    </dgm:dataModel>
+  </dgm:sampData>
+  <dgm:styleData>
+    <dgm:dataModel>
+      <dgm:ptLst>
+        <dgm:pt modelId="0" type="doc"/>
+        <dgm:pt modelId="1"/>
+        <dgm:pt modelId="2"/>
+      </dgm:ptLst>
+      <dgm:cxnLst>
+        <dgm:cxn modelId="3" srcId="0" destId="1" srcOrd="0" destOrd="0"/>
+        <dgm:cxn modelId="4" srcId="0" destId="2" srcOrd="1" destOrd="0"/>
+      </dgm:cxnLst>
+      <dgm:bg/>
+      <dgm:whole/>
+    </dgm:dataModel>
+  </dgm:styleData>
+  <dgm:clrData>
+    <dgm:dataModel>
+      <dgm:ptLst>
+        <dgm:pt modelId="0" type="doc"/>
+        <dgm:pt modelId="1"/>
+        <dgm:pt modelId="2"/>
+        <dgm:pt modelId="3"/>
+        <dgm:pt modelId="4"/>
+      </dgm:ptLst>
+      <dgm:cxnLst>
+        <dgm:cxn modelId="5" srcId="0" destId="1" srcOrd="0" destOrd="0"/>
+        <dgm:cxn modelId="6" srcId="0" destId="2" srcOrd="1" destOrd="0"/>
+        <dgm:cxn modelId="7" srcId="0" destId="3" srcOrd="2" destOrd="0"/>
+        <dgm:cxn modelId="8" srcId="0" destId="4" srcOrd="3" destOrd="0"/>
+      </dgm:cxnLst>
+      <dgm:bg/>
+      <dgm:whole/>
+    </dgm:dataModel>
+  </dgm:clrData>
+  <dgm:layoutNode name="CompostProcess">
+    <dgm:varLst>
+      <dgm:dir/>
+      <dgm:resizeHandles val="exact"/>
+    </dgm:varLst>
+    <dgm:alg type="composite">
+      <dgm:param type="horzAlign" val="ctr"/>
+      <dgm:param type="vertAlign" val="mid"/>
+    </dgm:alg>
+    <dgm:shape xmlns:r="http://schemas.openxmlformats.org/officeDocument/2006/relationships" r:blip="">
+      <dgm:adjLst/>
+    </dgm:shape>
+    <dgm:presOf/>
+    <dgm:constrLst>
+      <dgm:constr type="w" for="ch" forName="arrow" refType="w" fact="0.85"/>
+      <dgm:constr type="h" for="ch" forName="arrow" refType="h"/>
+      <dgm:constr type="ctrX" for="ch" forName="arrow" refType="w" fact="0.5"/>
+      <dgm:constr type="ctrY" for="ch" forName="arrow" refType="h" fact="0.5"/>
+      <dgm:constr type="w" for="ch" forName="linearProcess" refType="w"/>
+      <dgm:constr type="h" for="ch" forName="linearProcess" refType="h" fact="0.4"/>
+      <dgm:constr type="ctrX" for="ch" forName="linearProcess" refType="w" fact="0.5"/>
+      <dgm:constr type="ctrY" for="ch" forName="linearProcess" refType="h" fact="0.5"/>
+    </dgm:constrLst>
+    <dgm:ruleLst/>
+    <dgm:layoutNode name="arrow" styleLbl="bgShp">
+      <dgm:alg type="sp"/>
+      <dgm:choose name="Name0">
+        <dgm:if name="Name1" func="var" arg="dir" op="equ" val="norm">
+          <dgm:shape xmlns:r="http://schemas.openxmlformats.org/officeDocument/2006/relationships" type="rightArrow" r:blip="">
+            <dgm:adjLst/>
+          </dgm:shape>
+        </dgm:if>
+        <dgm:else name="Name2">
+          <dgm:shape xmlns:r="http://schemas.openxmlformats.org/officeDocument/2006/relationships" type="leftArrow" r:blip="">
+            <dgm:adjLst/>
+          </dgm:shape>
+        </dgm:else>
+      </dgm:choose>
+      <dgm:presOf/>
+      <dgm:constrLst/>
+      <dgm:ruleLst/>
+    </dgm:layoutNode>
+    <dgm:layoutNode name="linearProcess">
+      <dgm:choose name="Name3">
+        <dgm:if name="Name4" func="var" arg="dir" op="equ" val="norm">
+          <dgm:alg type="lin"/>
+        </dgm:if>
+        <dgm:else name="Name5">
+          <dgm:alg type="lin">
+            <dgm:param type="linDir" val="fromR"/>
+          </dgm:alg>
+        </dgm:else>
+      </dgm:choose>
+      <dgm:shape xmlns:r="http://schemas.openxmlformats.org/officeDocument/2006/relationships" r:blip="">
+        <dgm:adjLst/>
+      </dgm:shape>
+      <dgm:presOf/>
+      <dgm:constrLst>
+        <dgm:constr type="userA" for="ch" ptType="node" refType="w"/>
+        <dgm:constr type="h" for="ch" ptType="node" refType="h"/>
+        <dgm:constr type="w" for="ch" ptType="node" op="equ"/>
+        <dgm:constr type="w" for="ch" forName="sibTrans" refType="w" fact="0.05"/>
+        <dgm:constr type="primFontSz" for="ch" ptType="node" op="equ" val="65"/>
+      </dgm:constrLst>
+      <dgm:ruleLst/>
+      <dgm:forEach name="Name6" axis="ch" ptType="node">
+        <dgm:layoutNode name="textNode" styleLbl="node1">
+          <dgm:varLst>
+            <dgm:bulletEnabled val="1"/>
+          </dgm:varLst>
+          <dgm:alg type="tx"/>
+          <dgm:shape xmlns:r="http://schemas.openxmlformats.org/officeDocument/2006/relationships" type="roundRect" r:blip="">
+            <dgm:adjLst/>
+          </dgm:shape>
+          <dgm:presOf axis="desOrSelf" ptType="node"/>
+          <dgm:constrLst>
+            <dgm:constr type="userA"/>
+            <dgm:constr type="w" refType="userA" fact="0.3"/>
+            <dgm:constr type="tMarg" refType="primFontSz" fact="0.3"/>
+            <dgm:constr type="bMarg" refType="primFontSz" fact="0.3"/>
+            <dgm:constr type="lMarg" refType="primFontSz" fact="0.3"/>
+            <dgm:constr type="rMarg" refType="primFontSz" fact="0.3"/>
+          </dgm:constrLst>
+          <dgm:ruleLst>
+            <dgm:rule type="w" val="NaN" fact="1" max="NaN"/>
+            <dgm:rule type="primFontSz" val="5" fact="NaN" max="NaN"/>
+          </dgm:ruleLst>
+        </dgm:layoutNode>
+        <dgm:forEach name="Name7" axis="followSib" ptType="sibTrans" cnt="1">
+          <dgm:layoutNode name="sibTrans">
+            <dgm:alg type="sp"/>
+            <dgm:shape xmlns:r="http://schemas.openxmlformats.org/officeDocument/2006/relationships" r:blip="">
+              <dgm:adjLst/>
+            </dgm:shape>
+            <dgm:presOf/>
+            <dgm:constrLst/>
+            <dgm:ruleLst/>
+          </dgm:layoutNode>
+        </dgm:forEach>
+      </dgm:forEach>
+    </dgm:layoutNode>
+  </dgm:layoutNode>
+</dgm:layoutDef>
+</file>
+
 <file path=ppt/diagrams/quickStyle1.xml><?xml version="1.0" encoding="utf-8"?>
 <dgm:styleDef xmlns:dgm="http://schemas.openxmlformats.org/drawingml/2006/diagram" xmlns:a="http://schemas.openxmlformats.org/drawingml/2006/main" uniqueId="urn:microsoft.com/office/officeart/2005/8/quickstyle/simple1">
   <dgm:title val=""/>
@@ -4634,6 +6307,1040 @@
 </file>
 
 <file path=ppt/diagrams/quickStyle2.xml><?xml version="1.0" encoding="utf-8"?>
+<dgm:styleDef xmlns:dgm="http://schemas.openxmlformats.org/drawingml/2006/diagram" xmlns:a="http://schemas.openxmlformats.org/drawingml/2006/main" uniqueId="urn:microsoft.com/office/officeart/2005/8/quickstyle/simple1">
+  <dgm:title val=""/>
+  <dgm:desc val=""/>
+  <dgm:catLst>
+    <dgm:cat type="simple" pri="10100"/>
+  </dgm:catLst>
+  <dgm:scene3d>
+    <a:camera prst="orthographicFront"/>
+    <a:lightRig rig="threePt" dir="t"/>
+  </dgm:scene3d>
+  <dgm:styleLbl name="node0">
+    <dgm:scene3d>
+      <a:camera prst="orthographicFront"/>
+      <a:lightRig rig="threePt" dir="t"/>
+    </dgm:scene3d>
+    <dgm:sp3d/>
+    <dgm:txPr/>
+    <dgm:style>
+      <a:lnRef idx="2">
+        <a:scrgbClr r="0" g="0" b="0"/>
+      </a:lnRef>
+      <a:fillRef idx="1">
+        <a:scrgbClr r="0" g="0" b="0"/>
+      </a:fillRef>
+      <a:effectRef idx="0">
+        <a:scrgbClr r="0" g="0" b="0"/>
+      </a:effectRef>
+      <a:fontRef idx="minor">
+        <a:schemeClr val="lt1"/>
+      </a:fontRef>
+    </dgm:style>
+  </dgm:styleLbl>
+  <dgm:styleLbl name="lnNode1">
+    <dgm:scene3d>
+      <a:camera prst="orthographicFront"/>
+      <a:lightRig rig="threePt" dir="t"/>
+    </dgm:scene3d>
+    <dgm:sp3d/>
+    <dgm:txPr/>
+    <dgm:style>
+      <a:lnRef idx="2">
+        <a:scrgbClr r="0" g="0" b="0"/>
+      </a:lnRef>
+      <a:fillRef idx="1">
+        <a:scrgbClr r="0" g="0" b="0"/>
+      </a:fillRef>
+      <a:effectRef idx="0">
+        <a:scrgbClr r="0" g="0" b="0"/>
+      </a:effectRef>
+      <a:fontRef idx="minor">
+        <a:schemeClr val="lt1"/>
+      </a:fontRef>
+    </dgm:style>
+  </dgm:styleLbl>
+  <dgm:styleLbl name="vennNode1">
+    <dgm:scene3d>
+      <a:camera prst="orthographicFront"/>
+      <a:lightRig rig="threePt" dir="t"/>
+    </dgm:scene3d>
+    <dgm:sp3d/>
+    <dgm:txPr/>
+    <dgm:style>
+      <a:lnRef idx="2">
+        <a:scrgbClr r="0" g="0" b="0"/>
+      </a:lnRef>
+      <a:fillRef idx="1">
+        <a:scrgbClr r="0" g="0" b="0"/>
+      </a:fillRef>
+      <a:effectRef idx="0">
+        <a:scrgbClr r="0" g="0" b="0"/>
+      </a:effectRef>
+      <a:fontRef idx="minor">
+        <a:schemeClr val="tx1"/>
+      </a:fontRef>
+    </dgm:style>
+  </dgm:styleLbl>
+  <dgm:styleLbl name="alignNode1">
+    <dgm:scene3d>
+      <a:camera prst="orthographicFront"/>
+      <a:lightRig rig="threePt" dir="t"/>
+    </dgm:scene3d>
+    <dgm:sp3d/>
+    <dgm:txPr/>
+    <dgm:style>
+      <a:lnRef idx="2">
+        <a:scrgbClr r="0" g="0" b="0"/>
+      </a:lnRef>
+      <a:fillRef idx="1">
+        <a:scrgbClr r="0" g="0" b="0"/>
+      </a:fillRef>
+      <a:effectRef idx="0">
+        <a:scrgbClr r="0" g="0" b="0"/>
+      </a:effectRef>
+      <a:fontRef idx="minor">
+        <a:schemeClr val="lt1"/>
+      </a:fontRef>
+    </dgm:style>
+  </dgm:styleLbl>
+  <dgm:styleLbl name="node1">
+    <dgm:scene3d>
+      <a:camera prst="orthographicFront"/>
+      <a:lightRig rig="threePt" dir="t"/>
+    </dgm:scene3d>
+    <dgm:sp3d/>
+    <dgm:txPr/>
+    <dgm:style>
+      <a:lnRef idx="2">
+        <a:scrgbClr r="0" g="0" b="0"/>
+      </a:lnRef>
+      <a:fillRef idx="1">
+        <a:scrgbClr r="0" g="0" b="0"/>
+      </a:fillRef>
+      <a:effectRef idx="0">
+        <a:scrgbClr r="0" g="0" b="0"/>
+      </a:effectRef>
+      <a:fontRef idx="minor">
+        <a:schemeClr val="lt1"/>
+      </a:fontRef>
+    </dgm:style>
+  </dgm:styleLbl>
+  <dgm:styleLbl name="node2">
+    <dgm:scene3d>
+      <a:camera prst="orthographicFront"/>
+      <a:lightRig rig="threePt" dir="t"/>
+    </dgm:scene3d>
+    <dgm:sp3d/>
+    <dgm:txPr/>
+    <dgm:style>
+      <a:lnRef idx="2">
+        <a:scrgbClr r="0" g="0" b="0"/>
+      </a:lnRef>
+      <a:fillRef idx="1">
+        <a:scrgbClr r="0" g="0" b="0"/>
+      </a:fillRef>
+      <a:effectRef idx="0">
+        <a:scrgbClr r="0" g="0" b="0"/>
+      </a:effectRef>
+      <a:fontRef idx="minor">
+        <a:schemeClr val="lt1"/>
+      </a:fontRef>
+    </dgm:style>
+  </dgm:styleLbl>
+  <dgm:styleLbl name="node3">
+    <dgm:scene3d>
+      <a:camera prst="orthographicFront"/>
+      <a:lightRig rig="threePt" dir="t"/>
+    </dgm:scene3d>
+    <dgm:sp3d/>
+    <dgm:txPr/>
+    <dgm:style>
+      <a:lnRef idx="2">
+        <a:scrgbClr r="0" g="0" b="0"/>
+      </a:lnRef>
+      <a:fillRef idx="1">
+        <a:scrgbClr r="0" g="0" b="0"/>
+      </a:fillRef>
+      <a:effectRef idx="0">
+        <a:scrgbClr r="0" g="0" b="0"/>
+      </a:effectRef>
+      <a:fontRef idx="minor">
+        <a:schemeClr val="lt1"/>
+      </a:fontRef>
+    </dgm:style>
+  </dgm:styleLbl>
+  <dgm:styleLbl name="node4">
+    <dgm:scene3d>
+      <a:camera prst="orthographicFront"/>
+      <a:lightRig rig="threePt" dir="t"/>
+    </dgm:scene3d>
+    <dgm:sp3d/>
+    <dgm:txPr/>
+    <dgm:style>
+      <a:lnRef idx="2">
+        <a:scrgbClr r="0" g="0" b="0"/>
+      </a:lnRef>
+      <a:fillRef idx="1">
+        <a:scrgbClr r="0" g="0" b="0"/>
+      </a:fillRef>
+      <a:effectRef idx="0">
+        <a:scrgbClr r="0" g="0" b="0"/>
+      </a:effectRef>
+      <a:fontRef idx="minor">
+        <a:schemeClr val="lt1"/>
+      </a:fontRef>
+    </dgm:style>
+  </dgm:styleLbl>
+  <dgm:styleLbl name="fgImgPlace1">
+    <dgm:scene3d>
+      <a:camera prst="orthographicFront"/>
+      <a:lightRig rig="threePt" dir="t"/>
+    </dgm:scene3d>
+    <dgm:sp3d/>
+    <dgm:txPr/>
+    <dgm:style>
+      <a:lnRef idx="2">
+        <a:scrgbClr r="0" g="0" b="0"/>
+      </a:lnRef>
+      <a:fillRef idx="1">
+        <a:scrgbClr r="0" g="0" b="0"/>
+      </a:fillRef>
+      <a:effectRef idx="0">
+        <a:scrgbClr r="0" g="0" b="0"/>
+      </a:effectRef>
+      <a:fontRef idx="minor"/>
+    </dgm:style>
+  </dgm:styleLbl>
+  <dgm:styleLbl name="alignImgPlace1">
+    <dgm:scene3d>
+      <a:camera prst="orthographicFront"/>
+      <a:lightRig rig="threePt" dir="t"/>
+    </dgm:scene3d>
+    <dgm:sp3d/>
+    <dgm:txPr/>
+    <dgm:style>
+      <a:lnRef idx="2">
+        <a:scrgbClr r="0" g="0" b="0"/>
+      </a:lnRef>
+      <a:fillRef idx="1">
+        <a:scrgbClr r="0" g="0" b="0"/>
+      </a:fillRef>
+      <a:effectRef idx="0">
+        <a:scrgbClr r="0" g="0" b="0"/>
+      </a:effectRef>
+      <a:fontRef idx="minor"/>
+    </dgm:style>
+  </dgm:styleLbl>
+  <dgm:styleLbl name="bgImgPlace1">
+    <dgm:scene3d>
+      <a:camera prst="orthographicFront"/>
+      <a:lightRig rig="threePt" dir="t"/>
+    </dgm:scene3d>
+    <dgm:sp3d/>
+    <dgm:txPr/>
+    <dgm:style>
+      <a:lnRef idx="2">
+        <a:scrgbClr r="0" g="0" b="0"/>
+      </a:lnRef>
+      <a:fillRef idx="1">
+        <a:scrgbClr r="0" g="0" b="0"/>
+      </a:fillRef>
+      <a:effectRef idx="0">
+        <a:scrgbClr r="0" g="0" b="0"/>
+      </a:effectRef>
+      <a:fontRef idx="minor"/>
+    </dgm:style>
+  </dgm:styleLbl>
+  <dgm:styleLbl name="sibTrans2D1">
+    <dgm:scene3d>
+      <a:camera prst="orthographicFront"/>
+      <a:lightRig rig="threePt" dir="t"/>
+    </dgm:scene3d>
+    <dgm:sp3d/>
+    <dgm:txPr/>
+    <dgm:style>
+      <a:lnRef idx="0">
+        <a:scrgbClr r="0" g="0" b="0"/>
+      </a:lnRef>
+      <a:fillRef idx="1">
+        <a:scrgbClr r="0" g="0" b="0"/>
+      </a:fillRef>
+      <a:effectRef idx="0">
+        <a:scrgbClr r="0" g="0" b="0"/>
+      </a:effectRef>
+      <a:fontRef idx="minor">
+        <a:schemeClr val="lt1"/>
+      </a:fontRef>
+    </dgm:style>
+  </dgm:styleLbl>
+  <dgm:styleLbl name="fgSibTrans2D1">
+    <dgm:scene3d>
+      <a:camera prst="orthographicFront"/>
+      <a:lightRig rig="threePt" dir="t"/>
+    </dgm:scene3d>
+    <dgm:sp3d/>
+    <dgm:txPr/>
+    <dgm:style>
+      <a:lnRef idx="0">
+        <a:scrgbClr r="0" g="0" b="0"/>
+      </a:lnRef>
+      <a:fillRef idx="1">
+        <a:scrgbClr r="0" g="0" b="0"/>
+      </a:fillRef>
+      <a:effectRef idx="0">
+        <a:scrgbClr r="0" g="0" b="0"/>
+      </a:effectRef>
+      <a:fontRef idx="minor">
+        <a:schemeClr val="lt1"/>
+      </a:fontRef>
+    </dgm:style>
+  </dgm:styleLbl>
+  <dgm:styleLbl name="bgSibTrans2D1">
+    <dgm:scene3d>
+      <a:camera prst="orthographicFront"/>
+      <a:lightRig rig="threePt" dir="t"/>
+    </dgm:scene3d>
+    <dgm:sp3d/>
+    <dgm:txPr/>
+    <dgm:style>
+      <a:lnRef idx="0">
+        <a:scrgbClr r="0" g="0" b="0"/>
+      </a:lnRef>
+      <a:fillRef idx="1">
+        <a:scrgbClr r="0" g="0" b="0"/>
+      </a:fillRef>
+      <a:effectRef idx="0">
+        <a:scrgbClr r="0" g="0" b="0"/>
+      </a:effectRef>
+      <a:fontRef idx="minor">
+        <a:schemeClr val="lt1"/>
+      </a:fontRef>
+    </dgm:style>
+  </dgm:styleLbl>
+  <dgm:styleLbl name="sibTrans1D1">
+    <dgm:scene3d>
+      <a:camera prst="orthographicFront"/>
+      <a:lightRig rig="threePt" dir="t"/>
+    </dgm:scene3d>
+    <dgm:sp3d/>
+    <dgm:txPr/>
+    <dgm:style>
+      <a:lnRef idx="1">
+        <a:scrgbClr r="0" g="0" b="0"/>
+      </a:lnRef>
+      <a:fillRef idx="0">
+        <a:scrgbClr r="0" g="0" b="0"/>
+      </a:fillRef>
+      <a:effectRef idx="0">
+        <a:scrgbClr r="0" g="0" b="0"/>
+      </a:effectRef>
+      <a:fontRef idx="minor"/>
+    </dgm:style>
+  </dgm:styleLbl>
+  <dgm:styleLbl name="callout">
+    <dgm:scene3d>
+      <a:camera prst="orthographicFront"/>
+      <a:lightRig rig="threePt" dir="t"/>
+    </dgm:scene3d>
+    <dgm:sp3d/>
+    <dgm:txPr/>
+    <dgm:style>
+      <a:lnRef idx="2">
+        <a:scrgbClr r="0" g="0" b="0"/>
+      </a:lnRef>
+      <a:fillRef idx="1">
+        <a:scrgbClr r="0" g="0" b="0"/>
+      </a:fillRef>
+      <a:effectRef idx="0">
+        <a:scrgbClr r="0" g="0" b="0"/>
+      </a:effectRef>
+      <a:fontRef idx="minor"/>
+    </dgm:style>
+  </dgm:styleLbl>
+  <dgm:styleLbl name="asst0">
+    <dgm:scene3d>
+      <a:camera prst="orthographicFront"/>
+      <a:lightRig rig="threePt" dir="t"/>
+    </dgm:scene3d>
+    <dgm:sp3d/>
+    <dgm:txPr/>
+    <dgm:style>
+      <a:lnRef idx="2">
+        <a:scrgbClr r="0" g="0" b="0"/>
+      </a:lnRef>
+      <a:fillRef idx="1">
+        <a:scrgbClr r="0" g="0" b="0"/>
+      </a:fillRef>
+      <a:effectRef idx="0">
+        <a:scrgbClr r="0" g="0" b="0"/>
+      </a:effectRef>
+      <a:fontRef idx="minor">
+        <a:schemeClr val="lt1"/>
+      </a:fontRef>
+    </dgm:style>
+  </dgm:styleLbl>
+  <dgm:styleLbl name="asst1">
+    <dgm:scene3d>
+      <a:camera prst="orthographicFront"/>
+      <a:lightRig rig="threePt" dir="t"/>
+    </dgm:scene3d>
+    <dgm:sp3d/>
+    <dgm:txPr/>
+    <dgm:style>
+      <a:lnRef idx="2">
+        <a:scrgbClr r="0" g="0" b="0"/>
+      </a:lnRef>
+      <a:fillRef idx="1">
+        <a:scrgbClr r="0" g="0" b="0"/>
+      </a:fillRef>
+      <a:effectRef idx="0">
+        <a:scrgbClr r="0" g="0" b="0"/>
+      </a:effectRef>
+      <a:fontRef idx="minor">
+        <a:schemeClr val="lt1"/>
+      </a:fontRef>
+    </dgm:style>
+  </dgm:styleLbl>
+  <dgm:styleLbl name="asst2">
+    <dgm:scene3d>
+      <a:camera prst="orthographicFront"/>
+      <a:lightRig rig="threePt" dir="t"/>
+    </dgm:scene3d>
+    <dgm:sp3d/>
+    <dgm:txPr/>
+    <dgm:style>
+      <a:lnRef idx="2">
+        <a:scrgbClr r="0" g="0" b="0"/>
+      </a:lnRef>
+      <a:fillRef idx="1">
+        <a:scrgbClr r="0" g="0" b="0"/>
+      </a:fillRef>
+      <a:effectRef idx="0">
+        <a:scrgbClr r="0" g="0" b="0"/>
+      </a:effectRef>
+      <a:fontRef idx="minor">
+        <a:schemeClr val="lt1"/>
+      </a:fontRef>
+    </dgm:style>
+  </dgm:styleLbl>
+  <dgm:styleLbl name="asst3">
+    <dgm:scene3d>
+      <a:camera prst="orthographicFront"/>
+      <a:lightRig rig="threePt" dir="t"/>
+    </dgm:scene3d>
+    <dgm:sp3d/>
+    <dgm:txPr/>
+    <dgm:style>
+      <a:lnRef idx="2">
+        <a:scrgbClr r="0" g="0" b="0"/>
+      </a:lnRef>
+      <a:fillRef idx="1">
+        <a:scrgbClr r="0" g="0" b="0"/>
+      </a:fillRef>
+      <a:effectRef idx="0">
+        <a:scrgbClr r="0" g="0" b="0"/>
+      </a:effectRef>
+      <a:fontRef idx="minor">
+        <a:schemeClr val="lt1"/>
+      </a:fontRef>
+    </dgm:style>
+  </dgm:styleLbl>
+  <dgm:styleLbl name="asst4">
+    <dgm:scene3d>
+      <a:camera prst="orthographicFront"/>
+      <a:lightRig rig="threePt" dir="t"/>
+    </dgm:scene3d>
+    <dgm:sp3d/>
+    <dgm:txPr/>
+    <dgm:style>
+      <a:lnRef idx="2">
+        <a:scrgbClr r="0" g="0" b="0"/>
+      </a:lnRef>
+      <a:fillRef idx="1">
+        <a:scrgbClr r="0" g="0" b="0"/>
+      </a:fillRef>
+      <a:effectRef idx="0">
+        <a:scrgbClr r="0" g="0" b="0"/>
+      </a:effectRef>
+      <a:fontRef idx="minor">
+        <a:schemeClr val="lt1"/>
+      </a:fontRef>
+    </dgm:style>
+  </dgm:styleLbl>
+  <dgm:styleLbl name="parChTrans2D1">
+    <dgm:scene3d>
+      <a:camera prst="orthographicFront"/>
+      <a:lightRig rig="threePt" dir="t"/>
+    </dgm:scene3d>
+    <dgm:sp3d/>
+    <dgm:txPr/>
+    <dgm:style>
+      <a:lnRef idx="2">
+        <a:scrgbClr r="0" g="0" b="0"/>
+      </a:lnRef>
+      <a:fillRef idx="1">
+        <a:scrgbClr r="0" g="0" b="0"/>
+      </a:fillRef>
+      <a:effectRef idx="0">
+        <a:scrgbClr r="0" g="0" b="0"/>
+      </a:effectRef>
+      <a:fontRef idx="minor">
+        <a:schemeClr val="lt1"/>
+      </a:fontRef>
+    </dgm:style>
+  </dgm:styleLbl>
+  <dgm:styleLbl name="parChTrans2D2">
+    <dgm:scene3d>
+      <a:camera prst="orthographicFront"/>
+      <a:lightRig rig="threePt" dir="t"/>
+    </dgm:scene3d>
+    <dgm:sp3d/>
+    <dgm:txPr/>
+    <dgm:style>
+      <a:lnRef idx="2">
+        <a:scrgbClr r="0" g="0" b="0"/>
+      </a:lnRef>
+      <a:fillRef idx="1">
+        <a:scrgbClr r="0" g="0" b="0"/>
+      </a:fillRef>
+      <a:effectRef idx="0">
+        <a:scrgbClr r="0" g="0" b="0"/>
+      </a:effectRef>
+      <a:fontRef idx="minor">
+        <a:schemeClr val="lt1"/>
+      </a:fontRef>
+    </dgm:style>
+  </dgm:styleLbl>
+  <dgm:styleLbl name="parChTrans2D3">
+    <dgm:scene3d>
+      <a:camera prst="orthographicFront"/>
+      <a:lightRig rig="threePt" dir="t"/>
+    </dgm:scene3d>
+    <dgm:sp3d/>
+    <dgm:txPr/>
+    <dgm:style>
+      <a:lnRef idx="2">
+        <a:scrgbClr r="0" g="0" b="0"/>
+      </a:lnRef>
+      <a:fillRef idx="1">
+        <a:scrgbClr r="0" g="0" b="0"/>
+      </a:fillRef>
+      <a:effectRef idx="0">
+        <a:scrgbClr r="0" g="0" b="0"/>
+      </a:effectRef>
+      <a:fontRef idx="minor">
+        <a:schemeClr val="lt1"/>
+      </a:fontRef>
+    </dgm:style>
+  </dgm:styleLbl>
+  <dgm:styleLbl name="parChTrans2D4">
+    <dgm:scene3d>
+      <a:camera prst="orthographicFront"/>
+      <a:lightRig rig="threePt" dir="t"/>
+    </dgm:scene3d>
+    <dgm:sp3d/>
+    <dgm:txPr/>
+    <dgm:style>
+      <a:lnRef idx="2">
+        <a:scrgbClr r="0" g="0" b="0"/>
+      </a:lnRef>
+      <a:fillRef idx="1">
+        <a:scrgbClr r="0" g="0" b="0"/>
+      </a:fillRef>
+      <a:effectRef idx="0">
+        <a:scrgbClr r="0" g="0" b="0"/>
+      </a:effectRef>
+      <a:fontRef idx="minor">
+        <a:schemeClr val="lt1"/>
+      </a:fontRef>
+    </dgm:style>
+  </dgm:styleLbl>
+  <dgm:styleLbl name="parChTrans1D1">
+    <dgm:scene3d>
+      <a:camera prst="orthographicFront"/>
+      <a:lightRig rig="threePt" dir="t"/>
+    </dgm:scene3d>
+    <dgm:sp3d/>
+    <dgm:txPr/>
+    <dgm:style>
+      <a:lnRef idx="2">
+        <a:scrgbClr r="0" g="0" b="0"/>
+      </a:lnRef>
+      <a:fillRef idx="0">
+        <a:scrgbClr r="0" g="0" b="0"/>
+      </a:fillRef>
+      <a:effectRef idx="0">
+        <a:scrgbClr r="0" g="0" b="0"/>
+      </a:effectRef>
+      <a:fontRef idx="minor"/>
+    </dgm:style>
+  </dgm:styleLbl>
+  <dgm:styleLbl name="parChTrans1D2">
+    <dgm:scene3d>
+      <a:camera prst="orthographicFront"/>
+      <a:lightRig rig="threePt" dir="t"/>
+    </dgm:scene3d>
+    <dgm:sp3d/>
+    <dgm:txPr/>
+    <dgm:style>
+      <a:lnRef idx="2">
+        <a:scrgbClr r="0" g="0" b="0"/>
+      </a:lnRef>
+      <a:fillRef idx="0">
+        <a:scrgbClr r="0" g="0" b="0"/>
+      </a:fillRef>
+      <a:effectRef idx="0">
+        <a:scrgbClr r="0" g="0" b="0"/>
+      </a:effectRef>
+      <a:fontRef idx="minor"/>
+    </dgm:style>
+  </dgm:styleLbl>
+  <dgm:styleLbl name="parChTrans1D3">
+    <dgm:scene3d>
+      <a:camera prst="orthographicFront"/>
+      <a:lightRig rig="threePt" dir="t"/>
+    </dgm:scene3d>
+    <dgm:sp3d/>
+    <dgm:txPr/>
+    <dgm:style>
+      <a:lnRef idx="2">
+        <a:scrgbClr r="0" g="0" b="0"/>
+      </a:lnRef>
+      <a:fillRef idx="0">
+        <a:scrgbClr r="0" g="0" b="0"/>
+      </a:fillRef>
+      <a:effectRef idx="0">
+        <a:scrgbClr r="0" g="0" b="0"/>
+      </a:effectRef>
+      <a:fontRef idx="minor"/>
+    </dgm:style>
+  </dgm:styleLbl>
+  <dgm:styleLbl name="parChTrans1D4">
+    <dgm:scene3d>
+      <a:camera prst="orthographicFront"/>
+      <a:lightRig rig="threePt" dir="t"/>
+    </dgm:scene3d>
+    <dgm:sp3d/>
+    <dgm:txPr/>
+    <dgm:style>
+      <a:lnRef idx="2">
+        <a:scrgbClr r="0" g="0" b="0"/>
+      </a:lnRef>
+      <a:fillRef idx="0">
+        <a:scrgbClr r="0" g="0" b="0"/>
+      </a:fillRef>
+      <a:effectRef idx="0">
+        <a:scrgbClr r="0" g="0" b="0"/>
+      </a:effectRef>
+      <a:fontRef idx="minor"/>
+    </dgm:style>
+  </dgm:styleLbl>
+  <dgm:styleLbl name="fgAcc1">
+    <dgm:scene3d>
+      <a:camera prst="orthographicFront"/>
+      <a:lightRig rig="threePt" dir="t"/>
+    </dgm:scene3d>
+    <dgm:sp3d/>
+    <dgm:txPr/>
+    <dgm:style>
+      <a:lnRef idx="2">
+        <a:scrgbClr r="0" g="0" b="0"/>
+      </a:lnRef>
+      <a:fillRef idx="1">
+        <a:scrgbClr r="0" g="0" b="0"/>
+      </a:fillRef>
+      <a:effectRef idx="0">
+        <a:scrgbClr r="0" g="0" b="0"/>
+      </a:effectRef>
+      <a:fontRef idx="minor"/>
+    </dgm:style>
+  </dgm:styleLbl>
+  <dgm:styleLbl name="conFgAcc1">
+    <dgm:scene3d>
+      <a:camera prst="orthographicFront"/>
+      <a:lightRig rig="threePt" dir="t"/>
+    </dgm:scene3d>
+    <dgm:sp3d/>
+    <dgm:txPr/>
+    <dgm:style>
+      <a:lnRef idx="2">
+        <a:scrgbClr r="0" g="0" b="0"/>
+      </a:lnRef>
+      <a:fillRef idx="1">
+        <a:scrgbClr r="0" g="0" b="0"/>
+      </a:fillRef>
+      <a:effectRef idx="0">
+        <a:scrgbClr r="0" g="0" b="0"/>
+      </a:effectRef>
+      <a:fontRef idx="minor"/>
+    </dgm:style>
+  </dgm:styleLbl>
+  <dgm:styleLbl name="alignAcc1">
+    <dgm:scene3d>
+      <a:camera prst="orthographicFront"/>
+      <a:lightRig rig="threePt" dir="t"/>
+    </dgm:scene3d>
+    <dgm:sp3d/>
+    <dgm:txPr/>
+    <dgm:style>
+      <a:lnRef idx="2">
+        <a:scrgbClr r="0" g="0" b="0"/>
+      </a:lnRef>
+      <a:fillRef idx="1">
+        <a:scrgbClr r="0" g="0" b="0"/>
+      </a:fillRef>
+      <a:effectRef idx="0">
+        <a:scrgbClr r="0" g="0" b="0"/>
+      </a:effectRef>
+      <a:fontRef idx="minor"/>
+    </dgm:style>
+  </dgm:styleLbl>
+  <dgm:styleLbl name="trAlignAcc1">
+    <dgm:scene3d>
+      <a:camera prst="orthographicFront"/>
+      <a:lightRig rig="threePt" dir="t"/>
+    </dgm:scene3d>
+    <dgm:sp3d/>
+    <dgm:txPr/>
+    <dgm:style>
+      <a:lnRef idx="1">
+        <a:scrgbClr r="0" g="0" b="0"/>
+      </a:lnRef>
+      <a:fillRef idx="1">
+        <a:scrgbClr r="0" g="0" b="0"/>
+      </a:fillRef>
+      <a:effectRef idx="0">
+        <a:scrgbClr r="0" g="0" b="0"/>
+      </a:effectRef>
+      <a:fontRef idx="minor"/>
+    </dgm:style>
+  </dgm:styleLbl>
+  <dgm:styleLbl name="bgAcc1">
+    <dgm:scene3d>
+      <a:camera prst="orthographicFront"/>
+      <a:lightRig rig="threePt" dir="t"/>
+    </dgm:scene3d>
+    <dgm:sp3d/>
+    <dgm:txPr/>
+    <dgm:style>
+      <a:lnRef idx="2">
+        <a:scrgbClr r="0" g="0" b="0"/>
+      </a:lnRef>
+      <a:fillRef idx="1">
+        <a:scrgbClr r="0" g="0" b="0"/>
+      </a:fillRef>
+      <a:effectRef idx="0">
+        <a:scrgbClr r="0" g="0" b="0"/>
+      </a:effectRef>
+      <a:fontRef idx="minor"/>
+    </dgm:style>
+  </dgm:styleLbl>
+  <dgm:styleLbl name="solidFgAcc1">
+    <dgm:scene3d>
+      <a:camera prst="orthographicFront"/>
+      <a:lightRig rig="threePt" dir="t"/>
+    </dgm:scene3d>
+    <dgm:sp3d/>
+    <dgm:txPr/>
+    <dgm:style>
+      <a:lnRef idx="2">
+        <a:scrgbClr r="0" g="0" b="0"/>
+      </a:lnRef>
+      <a:fillRef idx="1">
+        <a:scrgbClr r="0" g="0" b="0"/>
+      </a:fillRef>
+      <a:effectRef idx="0">
+        <a:scrgbClr r="0" g="0" b="0"/>
+      </a:effectRef>
+      <a:fontRef idx="minor"/>
+    </dgm:style>
+  </dgm:styleLbl>
+  <dgm:styleLbl name="solidAlignAcc1">
+    <dgm:scene3d>
+      <a:camera prst="orthographicFront"/>
+      <a:lightRig rig="threePt" dir="t"/>
+    </dgm:scene3d>
+    <dgm:sp3d/>
+    <dgm:txPr/>
+    <dgm:style>
+      <a:lnRef idx="2">
+        <a:scrgbClr r="0" g="0" b="0"/>
+      </a:lnRef>
+      <a:fillRef idx="1">
+        <a:scrgbClr r="0" g="0" b="0"/>
+      </a:fillRef>
+      <a:effectRef idx="0">
+        <a:scrgbClr r="0" g="0" b="0"/>
+      </a:effectRef>
+      <a:fontRef idx="minor"/>
+    </dgm:style>
+  </dgm:styleLbl>
+  <dgm:styleLbl name="solidBgAcc1">
+    <dgm:scene3d>
+      <a:camera prst="orthographicFront"/>
+      <a:lightRig rig="threePt" dir="t"/>
+    </dgm:scene3d>
+    <dgm:sp3d/>
+    <dgm:txPr/>
+    <dgm:style>
+      <a:lnRef idx="2">
+        <a:scrgbClr r="0" g="0" b="0"/>
+      </a:lnRef>
+      <a:fillRef idx="1">
+        <a:scrgbClr r="0" g="0" b="0"/>
+      </a:fillRef>
+      <a:effectRef idx="0">
+        <a:scrgbClr r="0" g="0" b="0"/>
+      </a:effectRef>
+      <a:fontRef idx="minor"/>
+    </dgm:style>
+  </dgm:styleLbl>
+  <dgm:styleLbl name="fgAccFollowNode1">
+    <dgm:scene3d>
+      <a:camera prst="orthographicFront"/>
+      <a:lightRig rig="threePt" dir="t"/>
+    </dgm:scene3d>
+    <dgm:sp3d/>
+    <dgm:txPr/>
+    <dgm:style>
+      <a:lnRef idx="2">
+        <a:scrgbClr r="0" g="0" b="0"/>
+      </a:lnRef>
+      <a:fillRef idx="1">
+        <a:scrgbClr r="0" g="0" b="0"/>
+      </a:fillRef>
+      <a:effectRef idx="0">
+        <a:scrgbClr r="0" g="0" b="0"/>
+      </a:effectRef>
+      <a:fontRef idx="minor"/>
+    </dgm:style>
+  </dgm:styleLbl>
+  <dgm:styleLbl name="alignAccFollowNode1">
+    <dgm:scene3d>
+      <a:camera prst="orthographicFront"/>
+      <a:lightRig rig="threePt" dir="t"/>
+    </dgm:scene3d>
+    <dgm:sp3d/>
+    <dgm:txPr/>
+    <dgm:style>
+      <a:lnRef idx="2">
+        <a:scrgbClr r="0" g="0" b="0"/>
+      </a:lnRef>
+      <a:fillRef idx="1">
+        <a:scrgbClr r="0" g="0" b="0"/>
+      </a:fillRef>
+      <a:effectRef idx="0">
+        <a:scrgbClr r="0" g="0" b="0"/>
+      </a:effectRef>
+      <a:fontRef idx="minor"/>
+    </dgm:style>
+  </dgm:styleLbl>
+  <dgm:styleLbl name="bgAccFollowNode1">
+    <dgm:scene3d>
+      <a:camera prst="orthographicFront"/>
+      <a:lightRig rig="threePt" dir="t"/>
+    </dgm:scene3d>
+    <dgm:sp3d/>
+    <dgm:txPr/>
+    <dgm:style>
+      <a:lnRef idx="2">
+        <a:scrgbClr r="0" g="0" b="0"/>
+      </a:lnRef>
+      <a:fillRef idx="1">
+        <a:scrgbClr r="0" g="0" b="0"/>
+      </a:fillRef>
+      <a:effectRef idx="0">
+        <a:scrgbClr r="0" g="0" b="0"/>
+      </a:effectRef>
+      <a:fontRef idx="minor"/>
+    </dgm:style>
+  </dgm:styleLbl>
+  <dgm:styleLbl name="fgAcc0">
+    <dgm:scene3d>
+      <a:camera prst="orthographicFront"/>
+      <a:lightRig rig="threePt" dir="t"/>
+    </dgm:scene3d>
+    <dgm:sp3d/>
+    <dgm:txPr/>
+    <dgm:style>
+      <a:lnRef idx="2">
+        <a:scrgbClr r="0" g="0" b="0"/>
+      </a:lnRef>
+      <a:fillRef idx="1">
+        <a:scrgbClr r="0" g="0" b="0"/>
+      </a:fillRef>
+      <a:effectRef idx="0">
+        <a:scrgbClr r="0" g="0" b="0"/>
+      </a:effectRef>
+      <a:fontRef idx="minor"/>
+    </dgm:style>
+  </dgm:styleLbl>
+  <dgm:styleLbl name="fgAcc2">
+    <dgm:scene3d>
+      <a:camera prst="orthographicFront"/>
+      <a:lightRig rig="threePt" dir="t"/>
+    </dgm:scene3d>
+    <dgm:sp3d/>
+    <dgm:txPr/>
+    <dgm:style>
+      <a:lnRef idx="2">
+        <a:scrgbClr r="0" g="0" b="0"/>
+      </a:lnRef>
+      <a:fillRef idx="1">
+        <a:scrgbClr r="0" g="0" b="0"/>
+      </a:fillRef>
+      <a:effectRef idx="0">
+        <a:scrgbClr r="0" g="0" b="0"/>
+      </a:effectRef>
+      <a:fontRef idx="minor"/>
+    </dgm:style>
+  </dgm:styleLbl>
+  <dgm:styleLbl name="fgAcc3">
+    <dgm:scene3d>
+      <a:camera prst="orthographicFront"/>
+      <a:lightRig rig="threePt" dir="t"/>
+    </dgm:scene3d>
+    <dgm:sp3d/>
+    <dgm:txPr/>
+    <dgm:style>
+      <a:lnRef idx="2">
+        <a:scrgbClr r="0" g="0" b="0"/>
+      </a:lnRef>
+      <a:fillRef idx="1">
+        <a:scrgbClr r="0" g="0" b="0"/>
+      </a:fillRef>
+      <a:effectRef idx="0">
+        <a:scrgbClr r="0" g="0" b="0"/>
+      </a:effectRef>
+      <a:fontRef idx="minor"/>
+    </dgm:style>
+  </dgm:styleLbl>
+  <dgm:styleLbl name="fgAcc4">
+    <dgm:scene3d>
+      <a:camera prst="orthographicFront"/>
+      <a:lightRig rig="threePt" dir="t"/>
+    </dgm:scene3d>
+    <dgm:sp3d/>
+    <dgm:txPr/>
+    <dgm:style>
+      <a:lnRef idx="2">
+        <a:scrgbClr r="0" g="0" b="0"/>
+      </a:lnRef>
+      <a:fillRef idx="1">
+        <a:scrgbClr r="0" g="0" b="0"/>
+      </a:fillRef>
+      <a:effectRef idx="0">
+        <a:scrgbClr r="0" g="0" b="0"/>
+      </a:effectRef>
+      <a:fontRef idx="minor"/>
+    </dgm:style>
+  </dgm:styleLbl>
+  <dgm:styleLbl name="bgShp">
+    <dgm:scene3d>
+      <a:camera prst="orthographicFront"/>
+      <a:lightRig rig="threePt" dir="t"/>
+    </dgm:scene3d>
+    <dgm:sp3d/>
+    <dgm:txPr/>
+    <dgm:style>
+      <a:lnRef idx="0">
+        <a:scrgbClr r="0" g="0" b="0"/>
+      </a:lnRef>
+      <a:fillRef idx="1">
+        <a:scrgbClr r="0" g="0" b="0"/>
+      </a:fillRef>
+      <a:effectRef idx="0">
+        <a:scrgbClr r="0" g="0" b="0"/>
+      </a:effectRef>
+      <a:fontRef idx="minor"/>
+    </dgm:style>
+  </dgm:styleLbl>
+  <dgm:styleLbl name="dkBgShp">
+    <dgm:scene3d>
+      <a:camera prst="orthographicFront"/>
+      <a:lightRig rig="threePt" dir="t"/>
+    </dgm:scene3d>
+    <dgm:sp3d/>
+    <dgm:txPr/>
+    <dgm:style>
+      <a:lnRef idx="0">
+        <a:scrgbClr r="0" g="0" b="0"/>
+      </a:lnRef>
+      <a:fillRef idx="1">
+        <a:scrgbClr r="0" g="0" b="0"/>
+      </a:fillRef>
+      <a:effectRef idx="0">
+        <a:scrgbClr r="0" g="0" b="0"/>
+      </a:effectRef>
+      <a:fontRef idx="minor"/>
+    </dgm:style>
+  </dgm:styleLbl>
+  <dgm:styleLbl name="trBgShp">
+    <dgm:scene3d>
+      <a:camera prst="orthographicFront"/>
+      <a:lightRig rig="threePt" dir="t"/>
+    </dgm:scene3d>
+    <dgm:sp3d/>
+    <dgm:txPr/>
+    <dgm:style>
+      <a:lnRef idx="0">
+        <a:scrgbClr r="0" g="0" b="0"/>
+      </a:lnRef>
+      <a:fillRef idx="1">
+        <a:scrgbClr r="0" g="0" b="0"/>
+      </a:fillRef>
+      <a:effectRef idx="0">
+        <a:scrgbClr r="0" g="0" b="0"/>
+      </a:effectRef>
+      <a:fontRef idx="minor"/>
+    </dgm:style>
+  </dgm:styleLbl>
+  <dgm:styleLbl name="fgShp">
+    <dgm:scene3d>
+      <a:camera prst="orthographicFront"/>
+      <a:lightRig rig="threePt" dir="t"/>
+    </dgm:scene3d>
+    <dgm:sp3d/>
+    <dgm:txPr/>
+    <dgm:style>
+      <a:lnRef idx="2">
+        <a:scrgbClr r="0" g="0" b="0"/>
+      </a:lnRef>
+      <a:fillRef idx="1">
+        <a:scrgbClr r="0" g="0" b="0"/>
+      </a:fillRef>
+      <a:effectRef idx="0">
+        <a:scrgbClr r="0" g="0" b="0"/>
+      </a:effectRef>
+      <a:fontRef idx="minor"/>
+    </dgm:style>
+  </dgm:styleLbl>
+  <dgm:styleLbl name="revTx">
+    <dgm:scene3d>
+      <a:camera prst="orthographicFront"/>
+      <a:lightRig rig="threePt" dir="t"/>
+    </dgm:scene3d>
+    <dgm:sp3d/>
+    <dgm:txPr/>
+    <dgm:style>
+      <a:lnRef idx="0">
+        <a:scrgbClr r="0" g="0" b="0"/>
+      </a:lnRef>
+      <a:fillRef idx="0">
+        <a:scrgbClr r="0" g="0" b="0"/>
+      </a:fillRef>
+      <a:effectRef idx="0">
+        <a:scrgbClr r="0" g="0" b="0"/>
+      </a:effectRef>
+      <a:fontRef idx="minor"/>
+    </dgm:style>
+  </dgm:styleLbl>
+</dgm:styleDef>
+</file>
+
+<file path=ppt/diagrams/quickStyle3.xml><?xml version="1.0" encoding="utf-8"?>
 <dgm:styleDef xmlns:dgm="http://schemas.openxmlformats.org/drawingml/2006/diagram" xmlns:a="http://schemas.openxmlformats.org/drawingml/2006/main" uniqueId="urn:microsoft.com/office/officeart/2005/8/quickstyle/simple1">
   <dgm:title val=""/>
   <dgm:desc val=""/>
@@ -15437,6 +18144,424 @@
 </p:sld>
 </file>
 
+<file path=ppt/slides/slide6.xml><?xml version="1.0" encoding="utf-8"?>
+<p:sld xmlns:a="http://schemas.openxmlformats.org/drawingml/2006/main" xmlns:r="http://schemas.openxmlformats.org/officeDocument/2006/relationships" xmlns:p="http://schemas.openxmlformats.org/presentationml/2006/main">
+  <p:cSld>
+    <p:spTree>
+      <p:nvGrpSpPr>
+        <p:cNvPr id="1" name=""/>
+        <p:cNvGrpSpPr/>
+        <p:nvPr/>
+      </p:nvGrpSpPr>
+      <p:grpSpPr>
+        <a:xfrm>
+          <a:off x="0" y="0"/>
+          <a:ext cx="0" cy="0"/>
+          <a:chOff x="0" y="0"/>
+          <a:chExt cx="0" cy="0"/>
+        </a:xfrm>
+      </p:grpSpPr>
+      <p:graphicFrame>
+        <p:nvGraphicFramePr>
+          <p:cNvPr id="2" name="图示 1">
+            <a:extLst>
+              <a:ext uri="{FF2B5EF4-FFF2-40B4-BE49-F238E27FC236}">
+                <a16:creationId xmlns:a16="http://schemas.microsoft.com/office/drawing/2014/main" id="{031EE839-E333-45D2-923C-033474E98D42}"/>
+              </a:ext>
+            </a:extLst>
+          </p:cNvPr>
+          <p:cNvGraphicFramePr/>
+          <p:nvPr>
+            <p:extLst>
+              <p:ext uri="{D42A27DB-BD31-4B8C-83A1-F6EECF244321}">
+                <p14:modId xmlns:p14="http://schemas.microsoft.com/office/powerpoint/2010/main" val="3759617481"/>
+              </p:ext>
+            </p:extLst>
+          </p:nvPr>
+        </p:nvGraphicFramePr>
+        <p:xfrm>
+          <a:off x="2584090" y="426367"/>
+          <a:ext cx="9078823" cy="3334749"/>
+        </p:xfrm>
+        <a:graphic>
+          <a:graphicData uri="http://schemas.openxmlformats.org/drawingml/2006/diagram">
+            <dgm:relIds xmlns:dgm="http://schemas.openxmlformats.org/drawingml/2006/diagram" xmlns:r="http://schemas.openxmlformats.org/officeDocument/2006/relationships" r:dm="rId2" r:lo="rId3" r:qs="rId4" r:cs="rId5"/>
+          </a:graphicData>
+        </a:graphic>
+      </p:graphicFrame>
+      <p:grpSp>
+        <p:nvGrpSpPr>
+          <p:cNvPr id="4" name="Diagram group">
+            <a:extLst>
+              <a:ext uri="{FF2B5EF4-FFF2-40B4-BE49-F238E27FC236}">
+                <a16:creationId xmlns:a16="http://schemas.microsoft.com/office/drawing/2014/main" id="{D9817060-F39C-4EAB-9D15-F18CE4098508}"/>
+              </a:ext>
+            </a:extLst>
+          </p:cNvPr>
+          <p:cNvGrpSpPr/>
+          <p:nvPr/>
+        </p:nvGrpSpPr>
+        <p:grpSpPr>
+          <a:xfrm>
+            <a:off x="5965767" y="3429000"/>
+            <a:ext cx="2806433" cy="1333899"/>
+            <a:chOff x="3136194" y="1000424"/>
+            <a:chExt cx="2806433" cy="1333899"/>
+          </a:xfrm>
+          <a:solidFill>
+            <a:schemeClr val="accent2"/>
+          </a:solidFill>
+          <a:scene3d>
+            <a:camera prst="perspectiveFront" fov="3300000">
+              <a:rot lat="486000" lon="19530000" rev="174000"/>
+            </a:camera>
+            <a:lightRig rig="harsh" dir="t">
+              <a:rot lat="0" lon="0" rev="3000000"/>
+            </a:lightRig>
+          </a:scene3d>
+        </p:grpSpPr>
+        <p:grpSp>
+          <p:nvGrpSpPr>
+            <p:cNvPr id="5" name="组合 4">
+              <a:extLst>
+                <a:ext uri="{FF2B5EF4-FFF2-40B4-BE49-F238E27FC236}">
+                  <a16:creationId xmlns:a16="http://schemas.microsoft.com/office/drawing/2014/main" id="{709F585F-EDD4-44F0-B44E-0C233AD230BC}"/>
+                </a:ext>
+              </a:extLst>
+            </p:cNvPr>
+            <p:cNvGrpSpPr/>
+            <p:nvPr/>
+          </p:nvGrpSpPr>
+          <p:grpSpPr>
+            <a:xfrm>
+              <a:off x="3136194" y="1000424"/>
+              <a:ext cx="2806433" cy="1333899"/>
+              <a:chOff x="3136194" y="1000424"/>
+              <a:chExt cx="2806433" cy="1333899"/>
+            </a:xfrm>
+            <a:grpFill/>
+            <a:scene3d>
+              <a:camera prst="perspectiveFront" fov="3300000">
+                <a:rot lat="486000" lon="19530000" rev="174000"/>
+              </a:camera>
+              <a:lightRig rig="harsh" dir="t">
+                <a:rot lat="0" lon="0" rev="3000000"/>
+              </a:lightRig>
+            </a:scene3d>
+          </p:grpSpPr>
+          <p:sp>
+            <p:nvSpPr>
+              <p:cNvPr id="6" name="矩形: 圆角 5">
+                <a:extLst>
+                  <a:ext uri="{FF2B5EF4-FFF2-40B4-BE49-F238E27FC236}">
+                    <a16:creationId xmlns:a16="http://schemas.microsoft.com/office/drawing/2014/main" id="{7BC3D5D3-3AA7-4E11-8D99-E066F18C5F04}"/>
+                  </a:ext>
+                </a:extLst>
+              </p:cNvPr>
+              <p:cNvSpPr/>
+              <p:nvPr/>
+            </p:nvSpPr>
+            <p:spPr>
+              <a:xfrm>
+                <a:off x="3136194" y="1000424"/>
+                <a:ext cx="2806433" cy="1333899"/>
+              </a:xfrm>
+              <a:prstGeom prst="roundRect">
+                <a:avLst/>
+              </a:prstGeom>
+              <a:grpFill/>
+              <a:ln>
+                <a:noFill/>
+              </a:ln>
+              <a:effectLst>
+                <a:outerShdw blurRad="225425" dist="50800" dir="5220000" algn="ctr">
+                  <a:srgbClr val="000000">
+                    <a:alpha val="33000"/>
+                  </a:srgbClr>
+                </a:outerShdw>
+              </a:effectLst>
+              <a:sp3d extrusionH="254000" contourW="19050">
+                <a:bevelT w="82550" h="44450" prst="angle"/>
+                <a:bevelB w="82550" h="44450" prst="angle"/>
+                <a:contourClr>
+                  <a:srgbClr val="FFFFFF"/>
+                </a:contourClr>
+              </a:sp3d>
+            </p:spPr>
+            <p:style>
+              <a:lnRef idx="2">
+                <a:scrgbClr r="0" g="0" b="0"/>
+              </a:lnRef>
+              <a:fillRef idx="1">
+                <a:schemeClr val="accent5">
+                  <a:hueOff val="-3379271"/>
+                  <a:satOff val="-8710"/>
+                  <a:lumOff val="-5883"/>
+                  <a:alphaOff val="0"/>
+                </a:schemeClr>
+              </a:fillRef>
+              <a:effectRef idx="0">
+                <a:scrgbClr r="0" g="0" b="0"/>
+              </a:effectRef>
+              <a:fontRef idx="minor">
+                <a:schemeClr val="lt1"/>
+              </a:fontRef>
+            </p:style>
+          </p:sp>
+          <p:sp>
+            <p:nvSpPr>
+              <p:cNvPr id="7" name="矩形: 圆角 4">
+                <a:extLst>
+                  <a:ext uri="{FF2B5EF4-FFF2-40B4-BE49-F238E27FC236}">
+                    <a16:creationId xmlns:a16="http://schemas.microsoft.com/office/drawing/2014/main" id="{A3F7FCFA-9076-4442-8C69-59002F59F7FF}"/>
+                  </a:ext>
+                </a:extLst>
+              </p:cNvPr>
+              <p:cNvSpPr txBox="1"/>
+              <p:nvPr/>
+            </p:nvSpPr>
+            <p:spPr>
+              <a:xfrm>
+                <a:off x="3201310" y="1065540"/>
+                <a:ext cx="2676201" cy="1203667"/>
+              </a:xfrm>
+              <a:prstGeom prst="rect">
+                <a:avLst/>
+              </a:prstGeom>
+              <a:grpFill/>
+              <a:sp3d/>
+            </p:spPr>
+            <p:style>
+              <a:lnRef idx="0">
+                <a:scrgbClr r="0" g="0" b="0"/>
+              </a:lnRef>
+              <a:fillRef idx="0">
+                <a:scrgbClr r="0" g="0" b="0"/>
+              </a:fillRef>
+              <a:effectRef idx="0">
+                <a:scrgbClr r="0" g="0" b="0"/>
+              </a:effectRef>
+              <a:fontRef idx="minor">
+                <a:schemeClr val="lt1"/>
+              </a:fontRef>
+            </p:style>
+            <p:txBody>
+              <a:bodyPr spcFirstLastPara="0" vert="horz" wrap="square" lIns="140970" tIns="140970" rIns="140970" bIns="140970" numCol="1" spcCol="1270" anchor="ctr" anchorCtr="0">
+                <a:noAutofit/>
+              </a:bodyPr>
+              <a:lstStyle/>
+              <a:p>
+                <a:pPr marL="0" lvl="0" indent="0" algn="ctr" defTabSz="1644650">
+                  <a:lnSpc>
+                    <a:spcPct val="90000"/>
+                  </a:lnSpc>
+                  <a:spcBef>
+                    <a:spcPct val="0"/>
+                  </a:spcBef>
+                  <a:spcAft>
+                    <a:spcPct val="35000"/>
+                  </a:spcAft>
+                  <a:buNone/>
+                </a:pPr>
+                <a:r>
+                  <a:rPr lang="zh-CN" altLang="en-US" sz="3700" kern="1200" dirty="0"/>
+                  <a:t>测量指标库</a:t>
+                </a:r>
+              </a:p>
+            </p:txBody>
+          </p:sp>
+        </p:grpSp>
+      </p:grpSp>
+      <p:grpSp>
+        <p:nvGrpSpPr>
+          <p:cNvPr id="8" name="Diagram group">
+            <a:extLst>
+              <a:ext uri="{FF2B5EF4-FFF2-40B4-BE49-F238E27FC236}">
+                <a16:creationId xmlns:a16="http://schemas.microsoft.com/office/drawing/2014/main" id="{768C6775-1967-4C13-AEAC-86377EBAA5A2}"/>
+              </a:ext>
+            </a:extLst>
+          </p:cNvPr>
+          <p:cNvGrpSpPr/>
+          <p:nvPr/>
+        </p:nvGrpSpPr>
+        <p:grpSpPr>
+          <a:xfrm>
+            <a:off x="6030883" y="5097733"/>
+            <a:ext cx="2806433" cy="1333899"/>
+            <a:chOff x="3136194" y="1000424"/>
+            <a:chExt cx="2806433" cy="1333899"/>
+          </a:xfrm>
+          <a:scene3d>
+            <a:camera prst="perspectiveFront" fov="3300000">
+              <a:rot lat="486000" lon="19530000" rev="174000"/>
+            </a:camera>
+            <a:lightRig rig="harsh" dir="t">
+              <a:rot lat="0" lon="0" rev="3000000"/>
+            </a:lightRig>
+          </a:scene3d>
+        </p:grpSpPr>
+        <p:grpSp>
+          <p:nvGrpSpPr>
+            <p:cNvPr id="9" name="组合 8">
+              <a:extLst>
+                <a:ext uri="{FF2B5EF4-FFF2-40B4-BE49-F238E27FC236}">
+                  <a16:creationId xmlns:a16="http://schemas.microsoft.com/office/drawing/2014/main" id="{09F1BDB7-E332-48C9-AEC4-4CF88E52A068}"/>
+                </a:ext>
+              </a:extLst>
+            </p:cNvPr>
+            <p:cNvGrpSpPr/>
+            <p:nvPr/>
+          </p:nvGrpSpPr>
+          <p:grpSpPr>
+            <a:xfrm>
+              <a:off x="3136194" y="1000424"/>
+              <a:ext cx="2806433" cy="1333899"/>
+              <a:chOff x="3136194" y="1000424"/>
+              <a:chExt cx="2806433" cy="1333899"/>
+            </a:xfrm>
+            <a:scene3d>
+              <a:camera prst="perspectiveFront" fov="3300000">
+                <a:rot lat="486000" lon="19530000" rev="174000"/>
+              </a:camera>
+              <a:lightRig rig="harsh" dir="t">
+                <a:rot lat="0" lon="0" rev="3000000"/>
+              </a:lightRig>
+            </a:scene3d>
+          </p:grpSpPr>
+          <p:sp>
+            <p:nvSpPr>
+              <p:cNvPr id="11" name="矩形: 圆角 10">
+                <a:extLst>
+                  <a:ext uri="{FF2B5EF4-FFF2-40B4-BE49-F238E27FC236}">
+                    <a16:creationId xmlns:a16="http://schemas.microsoft.com/office/drawing/2014/main" id="{72C6D06C-DC6A-491F-99EF-8E82BF00A6AE}"/>
+                  </a:ext>
+                </a:extLst>
+              </p:cNvPr>
+              <p:cNvSpPr/>
+              <p:nvPr/>
+            </p:nvSpPr>
+            <p:spPr>
+              <a:xfrm>
+                <a:off x="3136194" y="1000424"/>
+                <a:ext cx="2806433" cy="1333899"/>
+              </a:xfrm>
+              <a:prstGeom prst="roundRect">
+                <a:avLst/>
+              </a:prstGeom>
+              <a:ln>
+                <a:noFill/>
+              </a:ln>
+              <a:effectLst>
+                <a:outerShdw blurRad="225425" dist="50800" dir="5220000" algn="ctr">
+                  <a:srgbClr val="000000">
+                    <a:alpha val="33000"/>
+                  </a:srgbClr>
+                </a:outerShdw>
+              </a:effectLst>
+              <a:sp3d extrusionH="254000" contourW="19050">
+                <a:bevelT w="82550" h="44450" prst="angle"/>
+                <a:bevelB w="82550" h="44450" prst="angle"/>
+                <a:contourClr>
+                  <a:srgbClr val="FFFFFF"/>
+                </a:contourClr>
+              </a:sp3d>
+            </p:spPr>
+            <p:style>
+              <a:lnRef idx="2">
+                <a:scrgbClr r="0" g="0" b="0"/>
+              </a:lnRef>
+              <a:fillRef idx="1">
+                <a:schemeClr val="accent5">
+                  <a:hueOff val="-3379271"/>
+                  <a:satOff val="-8710"/>
+                  <a:lumOff val="-5883"/>
+                  <a:alphaOff val="0"/>
+                </a:schemeClr>
+              </a:fillRef>
+              <a:effectRef idx="0">
+                <a:scrgbClr r="0" g="0" b="0"/>
+              </a:effectRef>
+              <a:fontRef idx="minor">
+                <a:schemeClr val="lt1"/>
+              </a:fontRef>
+            </p:style>
+          </p:sp>
+          <p:sp>
+            <p:nvSpPr>
+              <p:cNvPr id="12" name="矩形: 圆角 4">
+                <a:extLst>
+                  <a:ext uri="{FF2B5EF4-FFF2-40B4-BE49-F238E27FC236}">
+                    <a16:creationId xmlns:a16="http://schemas.microsoft.com/office/drawing/2014/main" id="{3B31ABDA-F461-44E1-BDCD-84F86F13C2FD}"/>
+                  </a:ext>
+                </a:extLst>
+              </p:cNvPr>
+              <p:cNvSpPr txBox="1"/>
+              <p:nvPr/>
+            </p:nvSpPr>
+            <p:spPr>
+              <a:xfrm>
+                <a:off x="3201310" y="1065540"/>
+                <a:ext cx="2676201" cy="1203667"/>
+              </a:xfrm>
+              <a:prstGeom prst="rect">
+                <a:avLst/>
+              </a:prstGeom>
+              <a:sp3d/>
+            </p:spPr>
+            <p:style>
+              <a:lnRef idx="0">
+                <a:scrgbClr r="0" g="0" b="0"/>
+              </a:lnRef>
+              <a:fillRef idx="0">
+                <a:scrgbClr r="0" g="0" b="0"/>
+              </a:fillRef>
+              <a:effectRef idx="0">
+                <a:scrgbClr r="0" g="0" b="0"/>
+              </a:effectRef>
+              <a:fontRef idx="minor">
+                <a:schemeClr val="lt1"/>
+              </a:fontRef>
+            </p:style>
+            <p:txBody>
+              <a:bodyPr spcFirstLastPara="0" vert="horz" wrap="square" lIns="140970" tIns="140970" rIns="140970" bIns="140970" numCol="1" spcCol="1270" anchor="ctr" anchorCtr="0">
+                <a:noAutofit/>
+              </a:bodyPr>
+              <a:lstStyle/>
+              <a:p>
+                <a:pPr marL="0" lvl="0" indent="0" algn="ctr" defTabSz="1644650">
+                  <a:lnSpc>
+                    <a:spcPct val="90000"/>
+                  </a:lnSpc>
+                  <a:spcBef>
+                    <a:spcPct val="0"/>
+                  </a:spcBef>
+                  <a:spcAft>
+                    <a:spcPct val="35000"/>
+                  </a:spcAft>
+                  <a:buNone/>
+                </a:pPr>
+                <a:r>
+                  <a:rPr lang="zh-CN" altLang="en-US" sz="3700" kern="1200" dirty="0"/>
+                  <a:t>测量指标</a:t>
+                </a:r>
+              </a:p>
+            </p:txBody>
+          </p:sp>
+        </p:grpSp>
+      </p:grpSp>
+    </p:spTree>
+    <p:extLst>
+      <p:ext uri="{BB962C8B-B14F-4D97-AF65-F5344CB8AC3E}">
+        <p14:creationId xmlns:p14="http://schemas.microsoft.com/office/powerpoint/2010/main" val="1121191299"/>
+      </p:ext>
+    </p:extLst>
+  </p:cSld>
+  <p:clrMapOvr>
+    <a:masterClrMapping/>
+  </p:clrMapOvr>
+</p:sld>
+</file>
+
 <file path=ppt/theme/theme1.xml><?xml version="1.0" encoding="utf-8"?>
 <a:theme xmlns:a="http://schemas.openxmlformats.org/drawingml/2006/main" name="Office 主题​​">
   <a:themeElements>

</xml_diff>

<commit_message>
已修改        workspace/畫圖用ppt.pptx 已修改        失敗項目分析與挽救.md Add        .gitignore Add        imges/成功失败灰色.png Add        imges/时间成功失败.png Add        output/失敗項目分析與挽救.pdf
</commit_message>
<xml_diff>
--- a/workspace/畫圖用ppt.pptx
+++ b/workspace/畫圖用ppt.pptx
@@ -11,6 +11,9 @@
     <p:sldId id="257" r:id="rId5"/>
     <p:sldId id="260" r:id="rId6"/>
     <p:sldId id="261" r:id="rId7"/>
+    <p:sldId id="262" r:id="rId8"/>
+    <p:sldId id="263" r:id="rId9"/>
+    <p:sldId id="264" r:id="rId10"/>
   </p:sldIdLst>
   <p:sldSz cx="12192000" cy="6858000"/>
   <p:notesSz cx="6858000" cy="9144000"/>
@@ -2950,11 +2953,11 @@
       <dgm:prSet loTypeId="urn:microsoft.com/office/officeart/2005/8/layout/hProcess9" loCatId="process" qsTypeId="urn:microsoft.com/office/officeart/2005/8/quickstyle/simple1" qsCatId="simple" csTypeId="urn:microsoft.com/office/officeart/2005/8/colors/colorful5" csCatId="colorful" phldr="1"/>
       <dgm:spPr>
         <a:scene3d>
-          <a:camera prst="perspectiveFront" fov="3300000">
-            <a:rot lat="486000" lon="19530000" rev="174000"/>
+          <a:camera prst="orthographicFront">
+            <a:rot lat="0" lon="0" rev="0"/>
           </a:camera>
-          <a:lightRig rig="harsh" dir="t">
-            <a:rot lat="0" lon="0" rev="3000000"/>
+          <a:lightRig rig="glow" dir="t">
+            <a:rot lat="0" lon="0" rev="4800000"/>
           </a:lightRig>
         </a:scene3d>
       </dgm:spPr>
@@ -2966,26 +2969,22 @@
           <a:noFill/>
         </a:ln>
         <a:effectLst>
-          <a:outerShdw blurRad="225425" dist="50800" dir="5220000" algn="ctr">
+          <a:outerShdw blurRad="190500" dist="228600" dir="2700000" algn="ctr">
             <a:srgbClr val="000000">
-              <a:alpha val="33000"/>
+              <a:alpha val="30000"/>
             </a:srgbClr>
           </a:outerShdw>
         </a:effectLst>
         <a:scene3d>
-          <a:camera prst="perspectiveFront" fov="3300000">
-            <a:rot lat="486000" lon="19530000" rev="174000"/>
+          <a:camera prst="orthographicFront">
+            <a:rot lat="0" lon="0" rev="0"/>
           </a:camera>
-          <a:lightRig rig="harsh" dir="t">
-            <a:rot lat="0" lon="0" rev="3000000"/>
+          <a:lightRig rig="glow" dir="t">
+            <a:rot lat="0" lon="0" rev="4800000"/>
           </a:lightRig>
         </a:scene3d>
-        <a:sp3d extrusionH="254000" contourW="19050">
-          <a:bevelT w="82550" h="44450" prst="angle"/>
-          <a:bevelB w="82550" h="44450" prst="angle"/>
-          <a:contourClr>
-            <a:srgbClr val="FFFFFF"/>
-          </a:contourClr>
+        <a:sp3d prstMaterial="matte">
+          <a:bevelT w="127000" h="63500"/>
         </a:sp3d>
       </dgm:spPr>
       <dgm:t>
@@ -3028,26 +3027,22 @@
           <a:noFill/>
         </a:ln>
         <a:effectLst>
-          <a:outerShdw blurRad="225425" dist="50800" dir="5220000" algn="ctr">
+          <a:outerShdw blurRad="190500" dist="228600" dir="2700000" algn="ctr">
             <a:srgbClr val="000000">
-              <a:alpha val="33000"/>
+              <a:alpha val="30000"/>
             </a:srgbClr>
           </a:outerShdw>
         </a:effectLst>
         <a:scene3d>
-          <a:camera prst="perspectiveFront" fov="3300000">
-            <a:rot lat="486000" lon="19530000" rev="174000"/>
+          <a:camera prst="orthographicFront">
+            <a:rot lat="0" lon="0" rev="0"/>
           </a:camera>
-          <a:lightRig rig="harsh" dir="t">
-            <a:rot lat="0" lon="0" rev="3000000"/>
+          <a:lightRig rig="glow" dir="t">
+            <a:rot lat="0" lon="0" rev="4800000"/>
           </a:lightRig>
         </a:scene3d>
-        <a:sp3d extrusionH="254000" contourW="19050">
-          <a:bevelT w="82550" h="44450" prst="angle"/>
-          <a:bevelB w="82550" h="44450" prst="angle"/>
-          <a:contourClr>
-            <a:srgbClr val="FFFFFF"/>
-          </a:contourClr>
+        <a:sp3d prstMaterial="matte">
+          <a:bevelT w="127000" h="63500"/>
         </a:sp3d>
       </dgm:spPr>
       <dgm:t>
@@ -3090,26 +3085,22 @@
           <a:noFill/>
         </a:ln>
         <a:effectLst>
-          <a:outerShdw blurRad="225425" dist="50800" dir="5220000" algn="ctr">
+          <a:outerShdw blurRad="190500" dist="228600" dir="2700000" algn="ctr">
             <a:srgbClr val="000000">
-              <a:alpha val="33000"/>
+              <a:alpha val="30000"/>
             </a:srgbClr>
           </a:outerShdw>
         </a:effectLst>
         <a:scene3d>
-          <a:camera prst="perspectiveFront" fov="3300000">
-            <a:rot lat="486000" lon="19530000" rev="174000"/>
+          <a:camera prst="orthographicFront">
+            <a:rot lat="0" lon="0" rev="0"/>
           </a:camera>
-          <a:lightRig rig="harsh" dir="t">
-            <a:rot lat="0" lon="0" rev="3000000"/>
+          <a:lightRig rig="glow" dir="t">
+            <a:rot lat="0" lon="0" rev="4800000"/>
           </a:lightRig>
         </a:scene3d>
-        <a:sp3d extrusionH="254000" contourW="19050">
-          <a:bevelT w="82550" h="44450" prst="angle"/>
-          <a:bevelB w="82550" h="44450" prst="angle"/>
-          <a:contourClr>
-            <a:srgbClr val="FFFFFF"/>
-          </a:contourClr>
+        <a:sp3d prstMaterial="matte">
+          <a:bevelT w="127000" h="63500"/>
         </a:sp3d>
       </dgm:spPr>
       <dgm:t>
@@ -3161,26 +3152,22 @@
           <a:noFill/>
         </a:ln>
         <a:effectLst>
-          <a:outerShdw blurRad="225425" dist="50800" dir="5220000" algn="ctr">
+          <a:outerShdw blurRad="190500" dist="228600" dir="2700000" algn="ctr">
             <a:srgbClr val="000000">
-              <a:alpha val="33000"/>
+              <a:alpha val="30000"/>
             </a:srgbClr>
           </a:outerShdw>
         </a:effectLst>
         <a:scene3d>
-          <a:camera prst="perspectiveFront" fov="3300000">
-            <a:rot lat="486000" lon="19530000" rev="174000"/>
+          <a:camera prst="orthographicFront">
+            <a:rot lat="0" lon="0" rev="0"/>
           </a:camera>
-          <a:lightRig rig="harsh" dir="t">
-            <a:rot lat="0" lon="0" rev="3000000"/>
+          <a:lightRig rig="glow" dir="t">
+            <a:rot lat="0" lon="0" rev="4800000"/>
           </a:lightRig>
         </a:scene3d>
-        <a:sp3d extrusionH="254000" contourW="19050">
-          <a:bevelT w="82550" h="44450" prst="angle"/>
-          <a:bevelB w="82550" h="44450" prst="angle"/>
-          <a:contourClr>
-            <a:srgbClr val="FFFFFF"/>
-          </a:contourClr>
+        <a:sp3d prstMaterial="matte">
+          <a:bevelT w="127000" h="63500"/>
         </a:sp3d>
       </dgm:spPr>
     </dgm:pt>
@@ -3191,26 +3178,22 @@
           <a:noFill/>
         </a:ln>
         <a:effectLst>
-          <a:outerShdw blurRad="225425" dist="50800" dir="5220000" algn="ctr">
+          <a:outerShdw blurRad="190500" dist="228600" dir="2700000" algn="ctr">
             <a:srgbClr val="000000">
-              <a:alpha val="33000"/>
+              <a:alpha val="30000"/>
             </a:srgbClr>
           </a:outerShdw>
         </a:effectLst>
         <a:scene3d>
-          <a:camera prst="perspectiveFront" fov="3300000">
-            <a:rot lat="486000" lon="19530000" rev="174000"/>
+          <a:camera prst="orthographicFront">
+            <a:rot lat="0" lon="0" rev="0"/>
           </a:camera>
-          <a:lightRig rig="harsh" dir="t">
-            <a:rot lat="0" lon="0" rev="3000000"/>
+          <a:lightRig rig="glow" dir="t">
+            <a:rot lat="0" lon="0" rev="4800000"/>
           </a:lightRig>
         </a:scene3d>
-        <a:sp3d extrusionH="254000" contourW="19050">
-          <a:bevelT w="82550" h="44450" prst="angle"/>
-          <a:bevelB w="82550" h="44450" prst="angle"/>
-          <a:contourClr>
-            <a:srgbClr val="FFFFFF"/>
-          </a:contourClr>
+        <a:sp3d prstMaterial="matte">
+          <a:bevelT w="127000" h="63500"/>
         </a:sp3d>
       </dgm:spPr>
     </dgm:pt>
@@ -3229,26 +3212,22 @@
           <a:noFill/>
         </a:ln>
         <a:effectLst>
-          <a:outerShdw blurRad="225425" dist="50800" dir="5220000" algn="ctr">
+          <a:outerShdw blurRad="190500" dist="228600" dir="2700000" algn="ctr">
             <a:srgbClr val="000000">
-              <a:alpha val="33000"/>
+              <a:alpha val="30000"/>
             </a:srgbClr>
           </a:outerShdw>
         </a:effectLst>
         <a:scene3d>
-          <a:camera prst="perspectiveFront" fov="3300000">
-            <a:rot lat="486000" lon="19530000" rev="174000"/>
+          <a:camera prst="orthographicFront">
+            <a:rot lat="0" lon="0" rev="0"/>
           </a:camera>
-          <a:lightRig rig="harsh" dir="t">
-            <a:rot lat="0" lon="0" rev="3000000"/>
+          <a:lightRig rig="glow" dir="t">
+            <a:rot lat="0" lon="0" rev="4800000"/>
           </a:lightRig>
         </a:scene3d>
-        <a:sp3d extrusionH="254000" contourW="19050">
-          <a:bevelT w="82550" h="44450" prst="angle"/>
-          <a:bevelB w="82550" h="44450" prst="angle"/>
-          <a:contourClr>
-            <a:srgbClr val="FFFFFF"/>
-          </a:contourClr>
+        <a:sp3d prstMaterial="matte">
+          <a:bevelT w="127000" h="63500"/>
         </a:sp3d>
       </dgm:spPr>
     </dgm:pt>
@@ -3267,26 +3246,22 @@
           <a:noFill/>
         </a:ln>
         <a:effectLst>
-          <a:outerShdw blurRad="225425" dist="50800" dir="5220000" algn="ctr">
+          <a:outerShdw blurRad="190500" dist="228600" dir="2700000" algn="ctr">
             <a:srgbClr val="000000">
-              <a:alpha val="33000"/>
+              <a:alpha val="30000"/>
             </a:srgbClr>
           </a:outerShdw>
         </a:effectLst>
         <a:scene3d>
-          <a:camera prst="perspectiveFront" fov="3300000">
-            <a:rot lat="486000" lon="19530000" rev="174000"/>
+          <a:camera prst="orthographicFront">
+            <a:rot lat="0" lon="0" rev="0"/>
           </a:camera>
-          <a:lightRig rig="harsh" dir="t">
-            <a:rot lat="0" lon="0" rev="3000000"/>
+          <a:lightRig rig="glow" dir="t">
+            <a:rot lat="0" lon="0" rev="4800000"/>
           </a:lightRig>
         </a:scene3d>
-        <a:sp3d extrusionH="254000" contourW="19050">
-          <a:bevelT w="82550" h="44450" prst="angle"/>
-          <a:bevelB w="82550" h="44450" prst="angle"/>
-          <a:contourClr>
-            <a:srgbClr val="FFFFFF"/>
-          </a:contourClr>
+        <a:sp3d prstMaterial="matte">
+          <a:bevelT w="127000" h="63500"/>
         </a:sp3d>
       </dgm:spPr>
     </dgm:pt>
@@ -4023,26 +3998,22 @@
           <a:noFill/>
         </a:ln>
         <a:effectLst>
-          <a:outerShdw blurRad="225425" dist="50800" dir="5220000" algn="ctr" rotWithShape="0">
+          <a:outerShdw blurRad="190500" dist="228600" dir="2700000" algn="ctr" rotWithShape="0">
             <a:srgbClr val="000000">
-              <a:alpha val="33000"/>
+              <a:alpha val="30000"/>
             </a:srgbClr>
           </a:outerShdw>
         </a:effectLst>
         <a:scene3d>
-          <a:camera prst="perspectiveFront" fov="3300000">
-            <a:rot lat="486000" lon="19530000" rev="174000"/>
+          <a:camera prst="orthographicFront">
+            <a:rot lat="0" lon="0" rev="0"/>
           </a:camera>
-          <a:lightRig rig="harsh" dir="t">
-            <a:rot lat="0" lon="0" rev="3000000"/>
+          <a:lightRig rig="glow" dir="t">
+            <a:rot lat="0" lon="0" rev="4800000"/>
           </a:lightRig>
         </a:scene3d>
-        <a:sp3d extrusionH="254000" contourW="19050">
-          <a:bevelT w="82550" h="44450" prst="angle"/>
-          <a:bevelB w="82550" h="44450" prst="angle"/>
-          <a:contourClr>
-            <a:srgbClr val="FFFFFF"/>
-          </a:contourClr>
+        <a:sp3d prstMaterial="matte">
+          <a:bevelT w="127000" h="63500"/>
         </a:sp3d>
       </dsp:spPr>
       <dsp:style>
@@ -4085,26 +4056,22 @@
           <a:miter lim="800000"/>
         </a:ln>
         <a:effectLst>
-          <a:outerShdw blurRad="225425" dist="50800" dir="5220000" algn="ctr" rotWithShape="0">
+          <a:outerShdw blurRad="190500" dist="228600" dir="2700000" algn="ctr" rotWithShape="0">
             <a:srgbClr val="000000">
-              <a:alpha val="33000"/>
+              <a:alpha val="30000"/>
             </a:srgbClr>
           </a:outerShdw>
         </a:effectLst>
         <a:scene3d>
-          <a:camera prst="perspectiveFront" fov="3300000">
-            <a:rot lat="486000" lon="19530000" rev="174000"/>
+          <a:camera prst="orthographicFront">
+            <a:rot lat="0" lon="0" rev="0"/>
           </a:camera>
-          <a:lightRig rig="harsh" dir="t">
-            <a:rot lat="0" lon="0" rev="3000000"/>
+          <a:lightRig rig="glow" dir="t">
+            <a:rot lat="0" lon="0" rev="4800000"/>
           </a:lightRig>
         </a:scene3d>
-        <a:sp3d extrusionH="254000" contourW="19050">
-          <a:bevelT w="82550" h="44450" prst="angle"/>
-          <a:bevelB w="82550" h="44450" prst="angle"/>
-          <a:contourClr>
-            <a:srgbClr val="FFFFFF"/>
-          </a:contourClr>
+        <a:sp3d prstMaterial="matte">
+          <a:bevelT w="127000" h="63500"/>
         </a:sp3d>
       </dsp:spPr>
       <dsp:style>
@@ -4177,26 +4144,22 @@
           <a:miter lim="800000"/>
         </a:ln>
         <a:effectLst>
-          <a:outerShdw blurRad="225425" dist="50800" dir="5220000" algn="ctr" rotWithShape="0">
+          <a:outerShdw blurRad="190500" dist="228600" dir="2700000" algn="ctr" rotWithShape="0">
             <a:srgbClr val="000000">
-              <a:alpha val="33000"/>
+              <a:alpha val="30000"/>
             </a:srgbClr>
           </a:outerShdw>
         </a:effectLst>
         <a:scene3d>
-          <a:camera prst="perspectiveFront" fov="3300000">
-            <a:rot lat="486000" lon="19530000" rev="174000"/>
+          <a:camera prst="orthographicFront">
+            <a:rot lat="0" lon="0" rev="0"/>
           </a:camera>
-          <a:lightRig rig="harsh" dir="t">
-            <a:rot lat="0" lon="0" rev="3000000"/>
+          <a:lightRig rig="glow" dir="t">
+            <a:rot lat="0" lon="0" rev="4800000"/>
           </a:lightRig>
         </a:scene3d>
-        <a:sp3d extrusionH="254000" contourW="19050">
-          <a:bevelT w="82550" h="44450" prst="angle"/>
-          <a:bevelB w="82550" h="44450" prst="angle"/>
-          <a:contourClr>
-            <a:srgbClr val="FFFFFF"/>
-          </a:contourClr>
+        <a:sp3d prstMaterial="matte">
+          <a:bevelT w="127000" h="63500"/>
         </a:sp3d>
       </dsp:spPr>
       <dsp:style>
@@ -4269,26 +4232,22 @@
           <a:miter lim="800000"/>
         </a:ln>
         <a:effectLst>
-          <a:outerShdw blurRad="225425" dist="50800" dir="5220000" algn="ctr" rotWithShape="0">
+          <a:outerShdw blurRad="190500" dist="228600" dir="2700000" algn="ctr" rotWithShape="0">
             <a:srgbClr val="000000">
-              <a:alpha val="33000"/>
+              <a:alpha val="30000"/>
             </a:srgbClr>
           </a:outerShdw>
         </a:effectLst>
         <a:scene3d>
-          <a:camera prst="perspectiveFront" fov="3300000">
-            <a:rot lat="486000" lon="19530000" rev="174000"/>
+          <a:camera prst="orthographicFront">
+            <a:rot lat="0" lon="0" rev="0"/>
           </a:camera>
-          <a:lightRig rig="harsh" dir="t">
-            <a:rot lat="0" lon="0" rev="3000000"/>
+          <a:lightRig rig="glow" dir="t">
+            <a:rot lat="0" lon="0" rev="4800000"/>
           </a:lightRig>
         </a:scene3d>
-        <a:sp3d extrusionH="254000" contourW="19050">
-          <a:bevelT w="82550" h="44450" prst="angle"/>
-          <a:bevelB w="82550" h="44450" prst="angle"/>
-          <a:contourClr>
-            <a:srgbClr val="FFFFFF"/>
-          </a:contourClr>
+        <a:sp3d prstMaterial="matte">
+          <a:bevelT w="127000" h="63500"/>
         </a:sp3d>
       </dsp:spPr>
       <dsp:style>
@@ -8521,7 +8480,7 @@
           <a:p>
             <a:fld id="{9C01DAC5-DDB6-472F-8327-2AA8B8560523}" type="datetimeFigureOut">
               <a:rPr lang="zh-CN" altLang="en-US" smtClean="0"/>
-              <a:t>2020-02-13</a:t>
+              <a:t>2020-02-14</a:t>
             </a:fld>
             <a:endParaRPr lang="zh-CN" altLang="en-US"/>
           </a:p>
@@ -8719,7 +8678,7 @@
           <a:p>
             <a:fld id="{9C01DAC5-DDB6-472F-8327-2AA8B8560523}" type="datetimeFigureOut">
               <a:rPr lang="zh-CN" altLang="en-US" smtClean="0"/>
-              <a:t>2020-02-13</a:t>
+              <a:t>2020-02-14</a:t>
             </a:fld>
             <a:endParaRPr lang="zh-CN" altLang="en-US"/>
           </a:p>
@@ -8927,7 +8886,7 @@
           <a:p>
             <a:fld id="{9C01DAC5-DDB6-472F-8327-2AA8B8560523}" type="datetimeFigureOut">
               <a:rPr lang="zh-CN" altLang="en-US" smtClean="0"/>
-              <a:t>2020-02-13</a:t>
+              <a:t>2020-02-14</a:t>
             </a:fld>
             <a:endParaRPr lang="zh-CN" altLang="en-US"/>
           </a:p>
@@ -9125,7 +9084,7 @@
           <a:p>
             <a:fld id="{9C01DAC5-DDB6-472F-8327-2AA8B8560523}" type="datetimeFigureOut">
               <a:rPr lang="zh-CN" altLang="en-US" smtClean="0"/>
-              <a:t>2020-02-13</a:t>
+              <a:t>2020-02-14</a:t>
             </a:fld>
             <a:endParaRPr lang="zh-CN" altLang="en-US"/>
           </a:p>
@@ -9400,7 +9359,7 @@
           <a:p>
             <a:fld id="{9C01DAC5-DDB6-472F-8327-2AA8B8560523}" type="datetimeFigureOut">
               <a:rPr lang="zh-CN" altLang="en-US" smtClean="0"/>
-              <a:t>2020-02-13</a:t>
+              <a:t>2020-02-14</a:t>
             </a:fld>
             <a:endParaRPr lang="zh-CN" altLang="en-US"/>
           </a:p>
@@ -9665,7 +9624,7 @@
           <a:p>
             <a:fld id="{9C01DAC5-DDB6-472F-8327-2AA8B8560523}" type="datetimeFigureOut">
               <a:rPr lang="zh-CN" altLang="en-US" smtClean="0"/>
-              <a:t>2020-02-13</a:t>
+              <a:t>2020-02-14</a:t>
             </a:fld>
             <a:endParaRPr lang="zh-CN" altLang="en-US"/>
           </a:p>
@@ -10077,7 +10036,7 @@
           <a:p>
             <a:fld id="{9C01DAC5-DDB6-472F-8327-2AA8B8560523}" type="datetimeFigureOut">
               <a:rPr lang="zh-CN" altLang="en-US" smtClean="0"/>
-              <a:t>2020-02-13</a:t>
+              <a:t>2020-02-14</a:t>
             </a:fld>
             <a:endParaRPr lang="zh-CN" altLang="en-US"/>
           </a:p>
@@ -10218,7 +10177,7 @@
           <a:p>
             <a:fld id="{9C01DAC5-DDB6-472F-8327-2AA8B8560523}" type="datetimeFigureOut">
               <a:rPr lang="zh-CN" altLang="en-US" smtClean="0"/>
-              <a:t>2020-02-13</a:t>
+              <a:t>2020-02-14</a:t>
             </a:fld>
             <a:endParaRPr lang="zh-CN" altLang="en-US"/>
           </a:p>
@@ -10331,7 +10290,7 @@
           <a:p>
             <a:fld id="{9C01DAC5-DDB6-472F-8327-2AA8B8560523}" type="datetimeFigureOut">
               <a:rPr lang="zh-CN" altLang="en-US" smtClean="0"/>
-              <a:t>2020-02-13</a:t>
+              <a:t>2020-02-14</a:t>
             </a:fld>
             <a:endParaRPr lang="zh-CN" altLang="en-US"/>
           </a:p>
@@ -10642,7 +10601,7 @@
           <a:p>
             <a:fld id="{9C01DAC5-DDB6-472F-8327-2AA8B8560523}" type="datetimeFigureOut">
               <a:rPr lang="zh-CN" altLang="en-US" smtClean="0"/>
-              <a:t>2020-02-13</a:t>
+              <a:t>2020-02-14</a:t>
             </a:fld>
             <a:endParaRPr lang="zh-CN" altLang="en-US"/>
           </a:p>
@@ -10930,7 +10889,7 @@
           <a:p>
             <a:fld id="{9C01DAC5-DDB6-472F-8327-2AA8B8560523}" type="datetimeFigureOut">
               <a:rPr lang="zh-CN" altLang="en-US" smtClean="0"/>
-              <a:t>2020-02-13</a:t>
+              <a:t>2020-02-14</a:t>
             </a:fld>
             <a:endParaRPr lang="zh-CN" altLang="en-US"/>
           </a:p>
@@ -11171,7 +11130,7 @@
           <a:p>
             <a:fld id="{9C01DAC5-DDB6-472F-8327-2AA8B8560523}" type="datetimeFigureOut">
               <a:rPr lang="zh-CN" altLang="en-US" smtClean="0"/>
-              <a:t>2020-02-13</a:t>
+              <a:t>2020-02-14</a:t>
             </a:fld>
             <a:endParaRPr lang="zh-CN" altLang="en-US"/>
           </a:p>
@@ -18174,13 +18133,13 @@
           <p:nvPr>
             <p:extLst>
               <p:ext uri="{D42A27DB-BD31-4B8C-83A1-F6EECF244321}">
-                <p14:modId xmlns:p14="http://schemas.microsoft.com/office/powerpoint/2010/main" val="3759617481"/>
+                <p14:modId xmlns:p14="http://schemas.microsoft.com/office/powerpoint/2010/main" val="2848766381"/>
               </p:ext>
             </p:extLst>
           </p:nvPr>
         </p:nvGraphicFramePr>
         <p:xfrm>
-          <a:off x="2584090" y="426367"/>
+          <a:off x="1384060" y="0"/>
           <a:ext cx="9078823" cy="3334749"/>
         </p:xfrm>
         <a:graphic>
@@ -18203,7 +18162,7 @@
         </p:nvGrpSpPr>
         <p:grpSpPr>
           <a:xfrm>
-            <a:off x="5965767" y="3429000"/>
+            <a:off x="4572060" y="3334749"/>
             <a:ext cx="2806433" cy="1333899"/>
             <a:chOff x="3136194" y="1000424"/>
             <a:chExt cx="2806433" cy="1333899"/>
@@ -18212,11 +18171,11 @@
             <a:schemeClr val="accent2"/>
           </a:solidFill>
           <a:scene3d>
-            <a:camera prst="perspectiveFront" fov="3300000">
-              <a:rot lat="486000" lon="19530000" rev="174000"/>
+            <a:camera prst="orthographicFront">
+              <a:rot lat="0" lon="0" rev="0"/>
             </a:camera>
-            <a:lightRig rig="harsh" dir="t">
-              <a:rot lat="0" lon="0" rev="3000000"/>
+            <a:lightRig rig="glow" dir="t">
+              <a:rot lat="0" lon="0" rev="4800000"/>
             </a:lightRig>
           </a:scene3d>
         </p:grpSpPr>
@@ -18240,14 +18199,6 @@
               <a:chExt cx="2806433" cy="1333899"/>
             </a:xfrm>
             <a:grpFill/>
-            <a:scene3d>
-              <a:camera prst="perspectiveFront" fov="3300000">
-                <a:rot lat="486000" lon="19530000" rev="174000"/>
-              </a:camera>
-              <a:lightRig rig="harsh" dir="t">
-                <a:rot lat="0" lon="0" rev="3000000"/>
-              </a:lightRig>
-            </a:scene3d>
           </p:grpSpPr>
           <p:sp>
             <p:nvSpPr>
@@ -18274,18 +18225,14 @@
                 <a:noFill/>
               </a:ln>
               <a:effectLst>
-                <a:outerShdw blurRad="225425" dist="50800" dir="5220000" algn="ctr">
+                <a:outerShdw blurRad="190500" dist="228600" dir="2700000" algn="ctr">
                   <a:srgbClr val="000000">
-                    <a:alpha val="33000"/>
+                    <a:alpha val="30000"/>
                   </a:srgbClr>
                 </a:outerShdw>
               </a:effectLst>
-              <a:sp3d extrusionH="254000" contourW="19050">
-                <a:bevelT w="82550" h="44450" prst="angle"/>
-                <a:bevelB w="82550" h="44450" prst="angle"/>
-                <a:contourClr>
-                  <a:srgbClr val="FFFFFF"/>
-                </a:contourClr>
+              <a:sp3d prstMaterial="matte">
+                <a:bevelT w="127000" h="63500"/>
               </a:sp3d>
             </p:spPr>
             <p:style>
@@ -18329,7 +18276,19 @@
                 <a:avLst/>
               </a:prstGeom>
               <a:grpFill/>
-              <a:sp3d/>
+              <a:ln>
+                <a:noFill/>
+              </a:ln>
+              <a:effectLst>
+                <a:outerShdw blurRad="190500" dist="228600" dir="2700000" algn="ctr">
+                  <a:srgbClr val="000000">
+                    <a:alpha val="30000"/>
+                  </a:srgbClr>
+                </a:outerShdw>
+              </a:effectLst>
+              <a:sp3d prstMaterial="matte">
+                <a:bevelT w="127000" h="63500"/>
+              </a:sp3d>
             </p:spPr>
             <p:style>
               <a:lnRef idx="0">
@@ -18386,17 +18345,20 @@
         </p:nvGrpSpPr>
         <p:grpSpPr>
           <a:xfrm>
-            <a:off x="6030883" y="5097733"/>
+            <a:off x="4572060" y="5313312"/>
             <a:ext cx="2806433" cy="1333899"/>
             <a:chOff x="3136194" y="1000424"/>
             <a:chExt cx="2806433" cy="1333899"/>
           </a:xfrm>
+          <a:solidFill>
+            <a:srgbClr val="7030A0"/>
+          </a:solidFill>
           <a:scene3d>
-            <a:camera prst="perspectiveFront" fov="3300000">
-              <a:rot lat="486000" lon="19530000" rev="174000"/>
+            <a:camera prst="orthographicFront">
+              <a:rot lat="0" lon="0" rev="0"/>
             </a:camera>
-            <a:lightRig rig="harsh" dir="t">
-              <a:rot lat="0" lon="0" rev="3000000"/>
+            <a:lightRig rig="glow" dir="t">
+              <a:rot lat="0" lon="0" rev="4800000"/>
             </a:lightRig>
           </a:scene3d>
         </p:grpSpPr>
@@ -18419,14 +18381,7 @@
               <a:chOff x="3136194" y="1000424"/>
               <a:chExt cx="2806433" cy="1333899"/>
             </a:xfrm>
-            <a:scene3d>
-              <a:camera prst="perspectiveFront" fov="3300000">
-                <a:rot lat="486000" lon="19530000" rev="174000"/>
-              </a:camera>
-              <a:lightRig rig="harsh" dir="t">
-                <a:rot lat="0" lon="0" rev="3000000"/>
-              </a:lightRig>
-            </a:scene3d>
+            <a:grpFill/>
           </p:grpSpPr>
           <p:sp>
             <p:nvSpPr>
@@ -18448,22 +18403,19 @@
               <a:prstGeom prst="roundRect">
                 <a:avLst/>
               </a:prstGeom>
+              <a:grpFill/>
               <a:ln>
                 <a:noFill/>
               </a:ln>
               <a:effectLst>
-                <a:outerShdw blurRad="225425" dist="50800" dir="5220000" algn="ctr">
+                <a:outerShdw blurRad="190500" dist="228600" dir="2700000" algn="ctr">
                   <a:srgbClr val="000000">
-                    <a:alpha val="33000"/>
+                    <a:alpha val="30000"/>
                   </a:srgbClr>
                 </a:outerShdw>
               </a:effectLst>
-              <a:sp3d extrusionH="254000" contourW="19050">
-                <a:bevelT w="82550" h="44450" prst="angle"/>
-                <a:bevelB w="82550" h="44450" prst="angle"/>
-                <a:contourClr>
-                  <a:srgbClr val="FFFFFF"/>
-                </a:contourClr>
+              <a:sp3d prstMaterial="matte">
+                <a:bevelT w="127000" h="63500"/>
               </a:sp3d>
             </p:spPr>
             <p:style>
@@ -18506,7 +18458,20 @@
               <a:prstGeom prst="rect">
                 <a:avLst/>
               </a:prstGeom>
-              <a:sp3d/>
+              <a:grpFill/>
+              <a:ln>
+                <a:noFill/>
+              </a:ln>
+              <a:effectLst>
+                <a:outerShdw blurRad="190500" dist="228600" dir="2700000" algn="ctr">
+                  <a:srgbClr val="000000">
+                    <a:alpha val="30000"/>
+                  </a:srgbClr>
+                </a:outerShdw>
+              </a:effectLst>
+              <a:sp3d prstMaterial="matte">
+                <a:bevelT w="127000" h="63500"/>
+              </a:sp3d>
             </p:spPr>
             <p:style>
               <a:lnRef idx="0">
@@ -18549,10 +18514,1809 @@
           </p:sp>
         </p:grpSp>
       </p:grpSp>
+      <p:sp>
+        <p:nvSpPr>
+          <p:cNvPr id="3" name="箭头: 右 2">
+            <a:extLst>
+              <a:ext uri="{FF2B5EF4-FFF2-40B4-BE49-F238E27FC236}">
+                <a16:creationId xmlns:a16="http://schemas.microsoft.com/office/drawing/2014/main" id="{3DBE6868-B27C-486C-94A7-D33467857440}"/>
+              </a:ext>
+            </a:extLst>
+          </p:cNvPr>
+          <p:cNvSpPr/>
+          <p:nvPr/>
+        </p:nvSpPr>
+        <p:spPr>
+          <a:xfrm rot="16200000">
+            <a:off x="6528493" y="2474422"/>
+            <a:ext cx="431321" cy="883549"/>
+          </a:xfrm>
+          <a:prstGeom prst="rightArrow">
+            <a:avLst/>
+          </a:prstGeom>
+        </p:spPr>
+        <p:style>
+          <a:lnRef idx="2">
+            <a:schemeClr val="accent1">
+              <a:shade val="50000"/>
+            </a:schemeClr>
+          </a:lnRef>
+          <a:fillRef idx="1">
+            <a:schemeClr val="accent1"/>
+          </a:fillRef>
+          <a:effectRef idx="0">
+            <a:schemeClr val="accent1"/>
+          </a:effectRef>
+          <a:fontRef idx="minor">
+            <a:schemeClr val="lt1"/>
+          </a:fontRef>
+        </p:style>
+        <p:txBody>
+          <a:bodyPr rtlCol="0" anchor="ctr"/>
+          <a:lstStyle/>
+          <a:p>
+            <a:pPr algn="ctr"/>
+            <a:endParaRPr lang="zh-CN" altLang="en-US"/>
+          </a:p>
+        </p:txBody>
+      </p:sp>
+      <p:sp>
+        <p:nvSpPr>
+          <p:cNvPr id="13" name="箭头: 右 12">
+            <a:extLst>
+              <a:ext uri="{FF2B5EF4-FFF2-40B4-BE49-F238E27FC236}">
+                <a16:creationId xmlns:a16="http://schemas.microsoft.com/office/drawing/2014/main" id="{96F2867C-A17B-41B5-B4BD-9838EE71F7F9}"/>
+              </a:ext>
+            </a:extLst>
+          </p:cNvPr>
+          <p:cNvSpPr/>
+          <p:nvPr/>
+        </p:nvSpPr>
+        <p:spPr>
+          <a:xfrm rot="5400000">
+            <a:off x="5101176" y="2494212"/>
+            <a:ext cx="431321" cy="883549"/>
+          </a:xfrm>
+          <a:prstGeom prst="rightArrow">
+            <a:avLst/>
+          </a:prstGeom>
+        </p:spPr>
+        <p:style>
+          <a:lnRef idx="2">
+            <a:schemeClr val="accent1">
+              <a:shade val="50000"/>
+            </a:schemeClr>
+          </a:lnRef>
+          <a:fillRef idx="1">
+            <a:schemeClr val="accent1"/>
+          </a:fillRef>
+          <a:effectRef idx="0">
+            <a:schemeClr val="accent1"/>
+          </a:effectRef>
+          <a:fontRef idx="minor">
+            <a:schemeClr val="lt1"/>
+          </a:fontRef>
+        </p:style>
+        <p:txBody>
+          <a:bodyPr rtlCol="0" anchor="ctr"/>
+          <a:lstStyle/>
+          <a:p>
+            <a:pPr algn="ctr"/>
+            <a:endParaRPr lang="zh-CN" altLang="en-US"/>
+          </a:p>
+        </p:txBody>
+      </p:sp>
+      <p:sp>
+        <p:nvSpPr>
+          <p:cNvPr id="14" name="箭头: 右 13">
+            <a:extLst>
+              <a:ext uri="{FF2B5EF4-FFF2-40B4-BE49-F238E27FC236}">
+                <a16:creationId xmlns:a16="http://schemas.microsoft.com/office/drawing/2014/main" id="{BDADFD90-4581-4982-8641-97F3EC726ADA}"/>
+              </a:ext>
+            </a:extLst>
+          </p:cNvPr>
+          <p:cNvSpPr/>
+          <p:nvPr/>
+        </p:nvSpPr>
+        <p:spPr>
+          <a:xfrm rot="5400000">
+            <a:off x="5101175" y="4549206"/>
+            <a:ext cx="431321" cy="883549"/>
+          </a:xfrm>
+          <a:prstGeom prst="rightArrow">
+            <a:avLst/>
+          </a:prstGeom>
+        </p:spPr>
+        <p:style>
+          <a:lnRef idx="2">
+            <a:schemeClr val="accent1">
+              <a:shade val="50000"/>
+            </a:schemeClr>
+          </a:lnRef>
+          <a:fillRef idx="1">
+            <a:schemeClr val="accent1"/>
+          </a:fillRef>
+          <a:effectRef idx="0">
+            <a:schemeClr val="accent1"/>
+          </a:effectRef>
+          <a:fontRef idx="minor">
+            <a:schemeClr val="lt1"/>
+          </a:fontRef>
+        </p:style>
+        <p:txBody>
+          <a:bodyPr rtlCol="0" anchor="ctr"/>
+          <a:lstStyle/>
+          <a:p>
+            <a:pPr algn="ctr"/>
+            <a:endParaRPr lang="zh-CN" altLang="en-US"/>
+          </a:p>
+        </p:txBody>
+      </p:sp>
+      <p:sp>
+        <p:nvSpPr>
+          <p:cNvPr id="15" name="箭头: 右 14">
+            <a:extLst>
+              <a:ext uri="{FF2B5EF4-FFF2-40B4-BE49-F238E27FC236}">
+                <a16:creationId xmlns:a16="http://schemas.microsoft.com/office/drawing/2014/main" id="{BEAE4D93-A91B-46D3-B61B-6E862EED438E}"/>
+              </a:ext>
+            </a:extLst>
+          </p:cNvPr>
+          <p:cNvSpPr/>
+          <p:nvPr/>
+        </p:nvSpPr>
+        <p:spPr>
+          <a:xfrm rot="16200000">
+            <a:off x="6528492" y="4549206"/>
+            <a:ext cx="431321" cy="883549"/>
+          </a:xfrm>
+          <a:prstGeom prst="rightArrow">
+            <a:avLst/>
+          </a:prstGeom>
+        </p:spPr>
+        <p:style>
+          <a:lnRef idx="2">
+            <a:schemeClr val="accent1">
+              <a:shade val="50000"/>
+            </a:schemeClr>
+          </a:lnRef>
+          <a:fillRef idx="1">
+            <a:schemeClr val="accent1"/>
+          </a:fillRef>
+          <a:effectRef idx="0">
+            <a:schemeClr val="accent1"/>
+          </a:effectRef>
+          <a:fontRef idx="minor">
+            <a:schemeClr val="lt1"/>
+          </a:fontRef>
+        </p:style>
+        <p:txBody>
+          <a:bodyPr rtlCol="0" anchor="ctr"/>
+          <a:lstStyle/>
+          <a:p>
+            <a:pPr algn="ctr"/>
+            <a:endParaRPr lang="zh-CN" altLang="en-US"/>
+          </a:p>
+        </p:txBody>
+      </p:sp>
     </p:spTree>
     <p:extLst>
       <p:ext uri="{BB962C8B-B14F-4D97-AF65-F5344CB8AC3E}">
         <p14:creationId xmlns:p14="http://schemas.microsoft.com/office/powerpoint/2010/main" val="1121191299"/>
+      </p:ext>
+    </p:extLst>
+  </p:cSld>
+  <p:clrMapOvr>
+    <a:masterClrMapping/>
+  </p:clrMapOvr>
+</p:sld>
+</file>
+
+<file path=ppt/slides/slide7.xml><?xml version="1.0" encoding="utf-8"?>
+<p:sld xmlns:a="http://schemas.openxmlformats.org/drawingml/2006/main" xmlns:r="http://schemas.openxmlformats.org/officeDocument/2006/relationships" xmlns:p="http://schemas.openxmlformats.org/presentationml/2006/main">
+  <p:cSld>
+    <p:spTree>
+      <p:nvGrpSpPr>
+        <p:cNvPr id="1" name=""/>
+        <p:cNvGrpSpPr/>
+        <p:nvPr/>
+      </p:nvGrpSpPr>
+      <p:grpSpPr>
+        <a:xfrm>
+          <a:off x="0" y="0"/>
+          <a:ext cx="0" cy="0"/>
+          <a:chOff x="0" y="0"/>
+          <a:chExt cx="0" cy="0"/>
+        </a:xfrm>
+      </p:grpSpPr>
+      <p:sp>
+        <p:nvSpPr>
+          <p:cNvPr id="6" name="任意多边形: 形状 5">
+            <a:extLst>
+              <a:ext uri="{FF2B5EF4-FFF2-40B4-BE49-F238E27FC236}">
+                <a16:creationId xmlns:a16="http://schemas.microsoft.com/office/drawing/2014/main" id="{C99AFC8E-BC50-4F99-B789-5D67FE613F67}"/>
+              </a:ext>
+            </a:extLst>
+          </p:cNvPr>
+          <p:cNvSpPr/>
+          <p:nvPr/>
+        </p:nvSpPr>
+        <p:spPr>
+          <a:xfrm>
+            <a:off x="2926080" y="1981200"/>
+            <a:ext cx="3657600" cy="3082950"/>
+          </a:xfrm>
+          <a:custGeom>
+            <a:avLst/>
+            <a:gdLst>
+              <a:gd name="connsiteX0" fmla="*/ 1828800 w 3657600"/>
+              <a:gd name="connsiteY0" fmla="*/ 0 h 3082950"/>
+              <a:gd name="connsiteX1" fmla="*/ 1929657 w 3657600"/>
+              <a:gd name="connsiteY1" fmla="*/ 11111 h 3082950"/>
+              <a:gd name="connsiteX2" fmla="*/ 3657600 w 3657600"/>
+              <a:gd name="connsiteY2" fmla="*/ 1541475 h 3082950"/>
+              <a:gd name="connsiteX3" fmla="*/ 1929657 w 3657600"/>
+              <a:gd name="connsiteY3" fmla="*/ 3071839 h 3082950"/>
+              <a:gd name="connsiteX4" fmla="*/ 1828800 w 3657600"/>
+              <a:gd name="connsiteY4" fmla="*/ 3082950 h 3082950"/>
+              <a:gd name="connsiteX5" fmla="*/ 1727943 w 3657600"/>
+              <a:gd name="connsiteY5" fmla="*/ 3071839 h 3082950"/>
+              <a:gd name="connsiteX6" fmla="*/ 0 w 3657600"/>
+              <a:gd name="connsiteY6" fmla="*/ 1541475 h 3082950"/>
+              <a:gd name="connsiteX7" fmla="*/ 1727943 w 3657600"/>
+              <a:gd name="connsiteY7" fmla="*/ 11111 h 3082950"/>
+              <a:gd name="connsiteX8" fmla="*/ 1828800 w 3657600"/>
+              <a:gd name="connsiteY8" fmla="*/ 0 h 3082950"/>
+            </a:gdLst>
+            <a:ahLst/>
+            <a:cxnLst>
+              <a:cxn ang="0">
+                <a:pos x="connsiteX0" y="connsiteY0"/>
+              </a:cxn>
+              <a:cxn ang="0">
+                <a:pos x="connsiteX1" y="connsiteY1"/>
+              </a:cxn>
+              <a:cxn ang="0">
+                <a:pos x="connsiteX2" y="connsiteY2"/>
+              </a:cxn>
+              <a:cxn ang="0">
+                <a:pos x="connsiteX3" y="connsiteY3"/>
+              </a:cxn>
+              <a:cxn ang="0">
+                <a:pos x="connsiteX4" y="connsiteY4"/>
+              </a:cxn>
+              <a:cxn ang="0">
+                <a:pos x="connsiteX5" y="connsiteY5"/>
+              </a:cxn>
+              <a:cxn ang="0">
+                <a:pos x="connsiteX6" y="connsiteY6"/>
+              </a:cxn>
+              <a:cxn ang="0">
+                <a:pos x="connsiteX7" y="connsiteY7"/>
+              </a:cxn>
+              <a:cxn ang="0">
+                <a:pos x="connsiteX8" y="connsiteY8"/>
+              </a:cxn>
+            </a:cxnLst>
+            <a:rect l="l" t="t" r="r" b="b"/>
+            <a:pathLst>
+              <a:path w="3657600" h="3082950">
+                <a:moveTo>
+                  <a:pt x="1828800" y="0"/>
+                </a:moveTo>
+                <a:lnTo>
+                  <a:pt x="1929657" y="11111"/>
+                </a:lnTo>
+                <a:cubicBezTo>
+                  <a:pt x="2915792" y="156771"/>
+                  <a:pt x="3657600" y="786592"/>
+                  <a:pt x="3657600" y="1541475"/>
+                </a:cubicBezTo>
+                <a:cubicBezTo>
+                  <a:pt x="3657600" y="2296359"/>
+                  <a:pt x="2915792" y="2926179"/>
+                  <a:pt x="1929657" y="3071839"/>
+                </a:cubicBezTo>
+                <a:lnTo>
+                  <a:pt x="1828800" y="3082950"/>
+                </a:lnTo>
+                <a:lnTo>
+                  <a:pt x="1727943" y="3071839"/>
+                </a:lnTo>
+                <a:cubicBezTo>
+                  <a:pt x="741808" y="2926179"/>
+                  <a:pt x="0" y="2296359"/>
+                  <a:pt x="0" y="1541475"/>
+                </a:cubicBezTo>
+                <a:cubicBezTo>
+                  <a:pt x="0" y="786592"/>
+                  <a:pt x="741808" y="156771"/>
+                  <a:pt x="1727943" y="11111"/>
+                </a:cubicBezTo>
+                <a:lnTo>
+                  <a:pt x="1828800" y="0"/>
+                </a:lnTo>
+                <a:close/>
+              </a:path>
+            </a:pathLst>
+          </a:custGeom>
+          <a:solidFill>
+            <a:schemeClr val="bg1">
+              <a:lumMod val="65000"/>
+            </a:schemeClr>
+          </a:solidFill>
+          <a:ln w="28575">
+            <a:solidFill>
+              <a:schemeClr val="bg1"/>
+            </a:solidFill>
+          </a:ln>
+        </p:spPr>
+        <p:style>
+          <a:lnRef idx="2">
+            <a:schemeClr val="accent1">
+              <a:shade val="50000"/>
+            </a:schemeClr>
+          </a:lnRef>
+          <a:fillRef idx="1">
+            <a:schemeClr val="accent1"/>
+          </a:fillRef>
+          <a:effectRef idx="0">
+            <a:schemeClr val="accent1"/>
+          </a:effectRef>
+          <a:fontRef idx="minor">
+            <a:schemeClr val="lt1"/>
+          </a:fontRef>
+        </p:style>
+        <p:txBody>
+          <a:bodyPr rtlCol="0" anchor="ctr"/>
+          <a:lstStyle/>
+          <a:p>
+            <a:pPr algn="ctr"/>
+            <a:endParaRPr lang="zh-CN" altLang="en-US"/>
+          </a:p>
+        </p:txBody>
+      </p:sp>
+      <p:sp>
+        <p:nvSpPr>
+          <p:cNvPr id="5" name="任意多边形: 形状 4">
+            <a:extLst>
+              <a:ext uri="{FF2B5EF4-FFF2-40B4-BE49-F238E27FC236}">
+                <a16:creationId xmlns:a16="http://schemas.microsoft.com/office/drawing/2014/main" id="{F2F2E2C8-2BB8-4C2A-9D4C-2A94EB4AE429}"/>
+              </a:ext>
+            </a:extLst>
+          </p:cNvPr>
+          <p:cNvSpPr/>
+          <p:nvPr/>
+        </p:nvSpPr>
+        <p:spPr>
+          <a:xfrm>
+            <a:off x="2255520" y="1981200"/>
+            <a:ext cx="2499360" cy="3124200"/>
+          </a:xfrm>
+          <a:custGeom>
+            <a:avLst/>
+            <a:gdLst>
+              <a:gd name="connsiteX0" fmla="*/ 2164080 w 2499360"/>
+              <a:gd name="connsiteY0" fmla="*/ 0 h 3124200"/>
+              <a:gd name="connsiteX1" fmla="*/ 2385345 w 2499360"/>
+              <a:gd name="connsiteY1" fmla="*/ 8065 h 3124200"/>
+              <a:gd name="connsiteX2" fmla="*/ 2499360 w 2499360"/>
+              <a:gd name="connsiteY2" fmla="*/ 20625 h 3124200"/>
+              <a:gd name="connsiteX3" fmla="*/ 2398503 w 2499360"/>
+              <a:gd name="connsiteY3" fmla="*/ 31736 h 3124200"/>
+              <a:gd name="connsiteX4" fmla="*/ 670560 w 2499360"/>
+              <a:gd name="connsiteY4" fmla="*/ 1562100 h 3124200"/>
+              <a:gd name="connsiteX5" fmla="*/ 2398503 w 2499360"/>
+              <a:gd name="connsiteY5" fmla="*/ 3092464 h 3124200"/>
+              <a:gd name="connsiteX6" fmla="*/ 2499360 w 2499360"/>
+              <a:gd name="connsiteY6" fmla="*/ 3103575 h 3124200"/>
+              <a:gd name="connsiteX7" fmla="*/ 2385345 w 2499360"/>
+              <a:gd name="connsiteY7" fmla="*/ 3116135 h 3124200"/>
+              <a:gd name="connsiteX8" fmla="*/ 2164080 w 2499360"/>
+              <a:gd name="connsiteY8" fmla="*/ 3124200 h 3124200"/>
+              <a:gd name="connsiteX9" fmla="*/ 0 w 2499360"/>
+              <a:gd name="connsiteY9" fmla="*/ 1562100 h 3124200"/>
+              <a:gd name="connsiteX10" fmla="*/ 2164080 w 2499360"/>
+              <a:gd name="connsiteY10" fmla="*/ 0 h 3124200"/>
+            </a:gdLst>
+            <a:ahLst/>
+            <a:cxnLst>
+              <a:cxn ang="0">
+                <a:pos x="connsiteX0" y="connsiteY0"/>
+              </a:cxn>
+              <a:cxn ang="0">
+                <a:pos x="connsiteX1" y="connsiteY1"/>
+              </a:cxn>
+              <a:cxn ang="0">
+                <a:pos x="connsiteX2" y="connsiteY2"/>
+              </a:cxn>
+              <a:cxn ang="0">
+                <a:pos x="connsiteX3" y="connsiteY3"/>
+              </a:cxn>
+              <a:cxn ang="0">
+                <a:pos x="connsiteX4" y="connsiteY4"/>
+              </a:cxn>
+              <a:cxn ang="0">
+                <a:pos x="connsiteX5" y="connsiteY5"/>
+              </a:cxn>
+              <a:cxn ang="0">
+                <a:pos x="connsiteX6" y="connsiteY6"/>
+              </a:cxn>
+              <a:cxn ang="0">
+                <a:pos x="connsiteX7" y="connsiteY7"/>
+              </a:cxn>
+              <a:cxn ang="0">
+                <a:pos x="connsiteX8" y="connsiteY8"/>
+              </a:cxn>
+              <a:cxn ang="0">
+                <a:pos x="connsiteX9" y="connsiteY9"/>
+              </a:cxn>
+              <a:cxn ang="0">
+                <a:pos x="connsiteX10" y="connsiteY10"/>
+              </a:cxn>
+            </a:cxnLst>
+            <a:rect l="l" t="t" r="r" b="b"/>
+            <a:pathLst>
+              <a:path w="2499360" h="3124200">
+                <a:moveTo>
+                  <a:pt x="2164080" y="0"/>
+                </a:moveTo>
+                <a:cubicBezTo>
+                  <a:pt x="2238779" y="0"/>
+                  <a:pt x="2312595" y="2732"/>
+                  <a:pt x="2385345" y="8065"/>
+                </a:cubicBezTo>
+                <a:lnTo>
+                  <a:pt x="2499360" y="20625"/>
+                </a:lnTo>
+                <a:lnTo>
+                  <a:pt x="2398503" y="31736"/>
+                </a:lnTo>
+                <a:cubicBezTo>
+                  <a:pt x="1412368" y="177396"/>
+                  <a:pt x="670560" y="807217"/>
+                  <a:pt x="670560" y="1562100"/>
+                </a:cubicBezTo>
+                <a:cubicBezTo>
+                  <a:pt x="670560" y="2316984"/>
+                  <a:pt x="1412368" y="2946804"/>
+                  <a:pt x="2398503" y="3092464"/>
+                </a:cubicBezTo>
+                <a:lnTo>
+                  <a:pt x="2499360" y="3103575"/>
+                </a:lnTo>
+                <a:lnTo>
+                  <a:pt x="2385345" y="3116135"/>
+                </a:lnTo>
+                <a:cubicBezTo>
+                  <a:pt x="2312595" y="3121468"/>
+                  <a:pt x="2238779" y="3124200"/>
+                  <a:pt x="2164080" y="3124200"/>
+                </a:cubicBezTo>
+                <a:cubicBezTo>
+                  <a:pt x="968892" y="3124200"/>
+                  <a:pt x="0" y="2424824"/>
+                  <a:pt x="0" y="1562100"/>
+                </a:cubicBezTo>
+                <a:cubicBezTo>
+                  <a:pt x="0" y="699376"/>
+                  <a:pt x="968892" y="0"/>
+                  <a:pt x="2164080" y="0"/>
+                </a:cubicBezTo>
+                <a:close/>
+              </a:path>
+            </a:pathLst>
+          </a:custGeom>
+          <a:solidFill>
+            <a:schemeClr val="accent6">
+              <a:lumMod val="60000"/>
+              <a:lumOff val="40000"/>
+            </a:schemeClr>
+          </a:solidFill>
+          <a:ln w="28575">
+            <a:solidFill>
+              <a:schemeClr val="bg1"/>
+            </a:solidFill>
+          </a:ln>
+        </p:spPr>
+        <p:style>
+          <a:lnRef idx="2">
+            <a:schemeClr val="accent1">
+              <a:shade val="50000"/>
+            </a:schemeClr>
+          </a:lnRef>
+          <a:fillRef idx="1">
+            <a:schemeClr val="accent1"/>
+          </a:fillRef>
+          <a:effectRef idx="0">
+            <a:schemeClr val="accent1"/>
+          </a:effectRef>
+          <a:fontRef idx="minor">
+            <a:schemeClr val="lt1"/>
+          </a:fontRef>
+        </p:style>
+        <p:txBody>
+          <a:bodyPr rtlCol="0" anchor="ctr"/>
+          <a:lstStyle/>
+          <a:p>
+            <a:pPr algn="ctr"/>
+            <a:endParaRPr lang="zh-CN" altLang="en-US" dirty="0"/>
+          </a:p>
+        </p:txBody>
+      </p:sp>
+      <p:sp>
+        <p:nvSpPr>
+          <p:cNvPr id="4" name="任意多边形: 形状 3">
+            <a:extLst>
+              <a:ext uri="{FF2B5EF4-FFF2-40B4-BE49-F238E27FC236}">
+                <a16:creationId xmlns:a16="http://schemas.microsoft.com/office/drawing/2014/main" id="{02FB60AC-9EFD-4323-BFE5-1A90096E5885}"/>
+              </a:ext>
+            </a:extLst>
+          </p:cNvPr>
+          <p:cNvSpPr/>
+          <p:nvPr/>
+        </p:nvSpPr>
+        <p:spPr>
+          <a:xfrm>
+            <a:off x="4754880" y="1981200"/>
+            <a:ext cx="2499360" cy="3124200"/>
+          </a:xfrm>
+          <a:custGeom>
+            <a:avLst/>
+            <a:gdLst>
+              <a:gd name="connsiteX0" fmla="*/ 335280 w 2499360"/>
+              <a:gd name="connsiteY0" fmla="*/ 0 h 3124200"/>
+              <a:gd name="connsiteX1" fmla="*/ 2499360 w 2499360"/>
+              <a:gd name="connsiteY1" fmla="*/ 1562100 h 3124200"/>
+              <a:gd name="connsiteX2" fmla="*/ 335280 w 2499360"/>
+              <a:gd name="connsiteY2" fmla="*/ 3124200 h 3124200"/>
+              <a:gd name="connsiteX3" fmla="*/ 114015 w 2499360"/>
+              <a:gd name="connsiteY3" fmla="*/ 3116135 h 3124200"/>
+              <a:gd name="connsiteX4" fmla="*/ 0 w 2499360"/>
+              <a:gd name="connsiteY4" fmla="*/ 3103575 h 3124200"/>
+              <a:gd name="connsiteX5" fmla="*/ 100857 w 2499360"/>
+              <a:gd name="connsiteY5" fmla="*/ 3092464 h 3124200"/>
+              <a:gd name="connsiteX6" fmla="*/ 1828800 w 2499360"/>
+              <a:gd name="connsiteY6" fmla="*/ 1562100 h 3124200"/>
+              <a:gd name="connsiteX7" fmla="*/ 100857 w 2499360"/>
+              <a:gd name="connsiteY7" fmla="*/ 31736 h 3124200"/>
+              <a:gd name="connsiteX8" fmla="*/ 0 w 2499360"/>
+              <a:gd name="connsiteY8" fmla="*/ 20625 h 3124200"/>
+              <a:gd name="connsiteX9" fmla="*/ 114015 w 2499360"/>
+              <a:gd name="connsiteY9" fmla="*/ 8065 h 3124200"/>
+              <a:gd name="connsiteX10" fmla="*/ 335280 w 2499360"/>
+              <a:gd name="connsiteY10" fmla="*/ 0 h 3124200"/>
+            </a:gdLst>
+            <a:ahLst/>
+            <a:cxnLst>
+              <a:cxn ang="0">
+                <a:pos x="connsiteX0" y="connsiteY0"/>
+              </a:cxn>
+              <a:cxn ang="0">
+                <a:pos x="connsiteX1" y="connsiteY1"/>
+              </a:cxn>
+              <a:cxn ang="0">
+                <a:pos x="connsiteX2" y="connsiteY2"/>
+              </a:cxn>
+              <a:cxn ang="0">
+                <a:pos x="connsiteX3" y="connsiteY3"/>
+              </a:cxn>
+              <a:cxn ang="0">
+                <a:pos x="connsiteX4" y="connsiteY4"/>
+              </a:cxn>
+              <a:cxn ang="0">
+                <a:pos x="connsiteX5" y="connsiteY5"/>
+              </a:cxn>
+              <a:cxn ang="0">
+                <a:pos x="connsiteX6" y="connsiteY6"/>
+              </a:cxn>
+              <a:cxn ang="0">
+                <a:pos x="connsiteX7" y="connsiteY7"/>
+              </a:cxn>
+              <a:cxn ang="0">
+                <a:pos x="connsiteX8" y="connsiteY8"/>
+              </a:cxn>
+              <a:cxn ang="0">
+                <a:pos x="connsiteX9" y="connsiteY9"/>
+              </a:cxn>
+              <a:cxn ang="0">
+                <a:pos x="connsiteX10" y="connsiteY10"/>
+              </a:cxn>
+            </a:cxnLst>
+            <a:rect l="l" t="t" r="r" b="b"/>
+            <a:pathLst>
+              <a:path w="2499360" h="3124200">
+                <a:moveTo>
+                  <a:pt x="335280" y="0"/>
+                </a:moveTo>
+                <a:cubicBezTo>
+                  <a:pt x="1530468" y="0"/>
+                  <a:pt x="2499360" y="699376"/>
+                  <a:pt x="2499360" y="1562100"/>
+                </a:cubicBezTo>
+                <a:cubicBezTo>
+                  <a:pt x="2499360" y="2424824"/>
+                  <a:pt x="1530468" y="3124200"/>
+                  <a:pt x="335280" y="3124200"/>
+                </a:cubicBezTo>
+                <a:cubicBezTo>
+                  <a:pt x="260581" y="3124200"/>
+                  <a:pt x="186766" y="3121468"/>
+                  <a:pt x="114015" y="3116135"/>
+                </a:cubicBezTo>
+                <a:lnTo>
+                  <a:pt x="0" y="3103575"/>
+                </a:lnTo>
+                <a:lnTo>
+                  <a:pt x="100857" y="3092464"/>
+                </a:lnTo>
+                <a:cubicBezTo>
+                  <a:pt x="1086992" y="2946804"/>
+                  <a:pt x="1828800" y="2316984"/>
+                  <a:pt x="1828800" y="1562100"/>
+                </a:cubicBezTo>
+                <a:cubicBezTo>
+                  <a:pt x="1828800" y="807217"/>
+                  <a:pt x="1086992" y="177396"/>
+                  <a:pt x="100857" y="31736"/>
+                </a:cubicBezTo>
+                <a:lnTo>
+                  <a:pt x="0" y="20625"/>
+                </a:lnTo>
+                <a:lnTo>
+                  <a:pt x="114015" y="8065"/>
+                </a:lnTo>
+                <a:cubicBezTo>
+                  <a:pt x="186766" y="2732"/>
+                  <a:pt x="260581" y="0"/>
+                  <a:pt x="335280" y="0"/>
+                </a:cubicBezTo>
+                <a:close/>
+              </a:path>
+            </a:pathLst>
+          </a:custGeom>
+          <a:solidFill>
+            <a:schemeClr val="accent2"/>
+          </a:solidFill>
+          <a:ln w="28575">
+            <a:solidFill>
+              <a:schemeClr val="bg1"/>
+            </a:solidFill>
+          </a:ln>
+        </p:spPr>
+        <p:style>
+          <a:lnRef idx="2">
+            <a:schemeClr val="accent1">
+              <a:shade val="50000"/>
+            </a:schemeClr>
+          </a:lnRef>
+          <a:fillRef idx="1">
+            <a:schemeClr val="accent1"/>
+          </a:fillRef>
+          <a:effectRef idx="0">
+            <a:schemeClr val="accent1"/>
+          </a:effectRef>
+          <a:fontRef idx="minor">
+            <a:schemeClr val="lt1"/>
+          </a:fontRef>
+        </p:style>
+        <p:txBody>
+          <a:bodyPr rtlCol="0" anchor="ctr"/>
+          <a:lstStyle/>
+          <a:p>
+            <a:pPr algn="ctr"/>
+            <a:endParaRPr lang="zh-CN" altLang="en-US"/>
+          </a:p>
+        </p:txBody>
+      </p:sp>
+      <p:sp>
+        <p:nvSpPr>
+          <p:cNvPr id="7" name="文本框 6">
+            <a:extLst>
+              <a:ext uri="{FF2B5EF4-FFF2-40B4-BE49-F238E27FC236}">
+                <a16:creationId xmlns:a16="http://schemas.microsoft.com/office/drawing/2014/main" id="{654E850C-56BC-43CB-B8B7-1B63C9585629}"/>
+              </a:ext>
+            </a:extLst>
+          </p:cNvPr>
+          <p:cNvSpPr txBox="1"/>
+          <p:nvPr/>
+        </p:nvSpPr>
+        <p:spPr>
+          <a:xfrm>
+            <a:off x="2476500" y="2758470"/>
+            <a:ext cx="228600" cy="1569660"/>
+          </a:xfrm>
+          <a:prstGeom prst="rect">
+            <a:avLst/>
+          </a:prstGeom>
+          <a:noFill/>
+        </p:spPr>
+        <p:txBody>
+          <a:bodyPr wrap="square" rtlCol="0">
+            <a:spAutoFit/>
+          </a:bodyPr>
+          <a:lstStyle/>
+          <a:p>
+            <a:r>
+              <a:rPr lang="zh-CN" altLang="en-US" sz="2400" dirty="0"/>
+              <a:t>项目成功</a:t>
+            </a:r>
+          </a:p>
+        </p:txBody>
+      </p:sp>
+      <p:sp>
+        <p:nvSpPr>
+          <p:cNvPr id="8" name="文本框 7">
+            <a:extLst>
+              <a:ext uri="{FF2B5EF4-FFF2-40B4-BE49-F238E27FC236}">
+                <a16:creationId xmlns:a16="http://schemas.microsoft.com/office/drawing/2014/main" id="{583BF1B5-B185-42F2-80D8-949591140D1F}"/>
+              </a:ext>
+            </a:extLst>
+          </p:cNvPr>
+          <p:cNvSpPr txBox="1"/>
+          <p:nvPr/>
+        </p:nvSpPr>
+        <p:spPr>
+          <a:xfrm>
+            <a:off x="6606540" y="2758470"/>
+            <a:ext cx="228600" cy="1569660"/>
+          </a:xfrm>
+          <a:prstGeom prst="rect">
+            <a:avLst/>
+          </a:prstGeom>
+          <a:noFill/>
+        </p:spPr>
+        <p:txBody>
+          <a:bodyPr wrap="square" rtlCol="0">
+            <a:spAutoFit/>
+          </a:bodyPr>
+          <a:lstStyle/>
+          <a:p>
+            <a:r>
+              <a:rPr lang="zh-CN" altLang="en-US" sz="2400" dirty="0"/>
+              <a:t>项目失败</a:t>
+            </a:r>
+          </a:p>
+        </p:txBody>
+      </p:sp>
+    </p:spTree>
+    <p:extLst>
+      <p:ext uri="{BB962C8B-B14F-4D97-AF65-F5344CB8AC3E}">
+        <p14:creationId xmlns:p14="http://schemas.microsoft.com/office/powerpoint/2010/main" val="2937837171"/>
+      </p:ext>
+    </p:extLst>
+  </p:cSld>
+  <p:clrMapOvr>
+    <a:masterClrMapping/>
+  </p:clrMapOvr>
+</p:sld>
+</file>
+
+<file path=ppt/slides/slide8.xml><?xml version="1.0" encoding="utf-8"?>
+<p:sld xmlns:a="http://schemas.openxmlformats.org/drawingml/2006/main" xmlns:r="http://schemas.openxmlformats.org/officeDocument/2006/relationships" xmlns:p="http://schemas.openxmlformats.org/presentationml/2006/main">
+  <p:cSld>
+    <p:spTree>
+      <p:nvGrpSpPr>
+        <p:cNvPr id="1" name=""/>
+        <p:cNvGrpSpPr/>
+        <p:nvPr/>
+      </p:nvGrpSpPr>
+      <p:grpSpPr>
+        <a:xfrm>
+          <a:off x="0" y="0"/>
+          <a:ext cx="0" cy="0"/>
+          <a:chOff x="0" y="0"/>
+          <a:chExt cx="0" cy="0"/>
+        </a:xfrm>
+      </p:grpSpPr>
+      <p:sp>
+        <p:nvSpPr>
+          <p:cNvPr id="2" name="矩形 1">
+            <a:extLst>
+              <a:ext uri="{FF2B5EF4-FFF2-40B4-BE49-F238E27FC236}">
+                <a16:creationId xmlns:a16="http://schemas.microsoft.com/office/drawing/2014/main" id="{EC254488-3CED-4FBF-8405-65591E4EDFDC}"/>
+              </a:ext>
+            </a:extLst>
+          </p:cNvPr>
+          <p:cNvSpPr/>
+          <p:nvPr/>
+        </p:nvSpPr>
+        <p:spPr>
+          <a:xfrm>
+            <a:off x="655320" y="5654040"/>
+            <a:ext cx="3992880" cy="381000"/>
+          </a:xfrm>
+          <a:prstGeom prst="rect">
+            <a:avLst/>
+          </a:prstGeom>
+          <a:solidFill>
+            <a:srgbClr val="7030A0"/>
+          </a:solidFill>
+          <a:ln>
+            <a:solidFill>
+              <a:schemeClr val="bg1"/>
+            </a:solidFill>
+          </a:ln>
+        </p:spPr>
+        <p:style>
+          <a:lnRef idx="2">
+            <a:schemeClr val="accent1">
+              <a:shade val="50000"/>
+            </a:schemeClr>
+          </a:lnRef>
+          <a:fillRef idx="1">
+            <a:schemeClr val="accent1"/>
+          </a:fillRef>
+          <a:effectRef idx="0">
+            <a:schemeClr val="accent1"/>
+          </a:effectRef>
+          <a:fontRef idx="minor">
+            <a:schemeClr val="lt1"/>
+          </a:fontRef>
+        </p:style>
+        <p:txBody>
+          <a:bodyPr rtlCol="0" anchor="ctr"/>
+          <a:lstStyle/>
+          <a:p>
+            <a:pPr algn="ctr"/>
+            <a:r>
+              <a:rPr lang="en-US" altLang="zh-CN" dirty="0"/>
+              <a:t>2</a:t>
+            </a:r>
+            <a:r>
+              <a:rPr lang="zh-CN" altLang="en-US" dirty="0"/>
+              <a:t>年</a:t>
+            </a:r>
+          </a:p>
+        </p:txBody>
+      </p:sp>
+      <p:sp>
+        <p:nvSpPr>
+          <p:cNvPr id="3" name="矩形 2">
+            <a:extLst>
+              <a:ext uri="{FF2B5EF4-FFF2-40B4-BE49-F238E27FC236}">
+                <a16:creationId xmlns:a16="http://schemas.microsoft.com/office/drawing/2014/main" id="{10A14F8E-50BE-445B-B30F-68E6E91C93BE}"/>
+              </a:ext>
+            </a:extLst>
+          </p:cNvPr>
+          <p:cNvSpPr/>
+          <p:nvPr/>
+        </p:nvSpPr>
+        <p:spPr>
+          <a:xfrm>
+            <a:off x="4648200" y="5654040"/>
+            <a:ext cx="6614160" cy="381000"/>
+          </a:xfrm>
+          <a:prstGeom prst="rect">
+            <a:avLst/>
+          </a:prstGeom>
+          <a:solidFill>
+            <a:srgbClr val="002060"/>
+          </a:solidFill>
+          <a:ln>
+            <a:solidFill>
+              <a:schemeClr val="bg1"/>
+            </a:solidFill>
+          </a:ln>
+        </p:spPr>
+        <p:style>
+          <a:lnRef idx="2">
+            <a:schemeClr val="accent1">
+              <a:shade val="50000"/>
+            </a:schemeClr>
+          </a:lnRef>
+          <a:fillRef idx="1">
+            <a:schemeClr val="accent1"/>
+          </a:fillRef>
+          <a:effectRef idx="0">
+            <a:schemeClr val="accent1"/>
+          </a:effectRef>
+          <a:fontRef idx="minor">
+            <a:schemeClr val="lt1"/>
+          </a:fontRef>
+        </p:style>
+        <p:txBody>
+          <a:bodyPr rtlCol="0" anchor="ctr"/>
+          <a:lstStyle/>
+          <a:p>
+            <a:pPr algn="ctr"/>
+            <a:r>
+              <a:rPr lang="en-US" altLang="zh-CN" dirty="0"/>
+              <a:t>5</a:t>
+            </a:r>
+            <a:r>
+              <a:rPr lang="zh-CN" altLang="en-US" dirty="0"/>
+              <a:t>年</a:t>
+            </a:r>
+          </a:p>
+        </p:txBody>
+      </p:sp>
+      <p:sp>
+        <p:nvSpPr>
+          <p:cNvPr id="4" name="矩形 3">
+            <a:extLst>
+              <a:ext uri="{FF2B5EF4-FFF2-40B4-BE49-F238E27FC236}">
+                <a16:creationId xmlns:a16="http://schemas.microsoft.com/office/drawing/2014/main" id="{571564EF-EA34-47DF-802E-7640537A150C}"/>
+              </a:ext>
+            </a:extLst>
+          </p:cNvPr>
+          <p:cNvSpPr/>
+          <p:nvPr/>
+        </p:nvSpPr>
+        <p:spPr>
+          <a:xfrm>
+            <a:off x="655320" y="5257800"/>
+            <a:ext cx="3992880" cy="396240"/>
+          </a:xfrm>
+          <a:prstGeom prst="rect">
+            <a:avLst/>
+          </a:prstGeom>
+          <a:solidFill>
+            <a:srgbClr val="7030A0"/>
+          </a:solidFill>
+          <a:ln>
+            <a:solidFill>
+              <a:schemeClr val="bg1"/>
+            </a:solidFill>
+          </a:ln>
+        </p:spPr>
+        <p:style>
+          <a:lnRef idx="2">
+            <a:schemeClr val="accent1">
+              <a:shade val="50000"/>
+            </a:schemeClr>
+          </a:lnRef>
+          <a:fillRef idx="1">
+            <a:schemeClr val="accent1"/>
+          </a:fillRef>
+          <a:effectRef idx="0">
+            <a:schemeClr val="accent1"/>
+          </a:effectRef>
+          <a:fontRef idx="minor">
+            <a:schemeClr val="lt1"/>
+          </a:fontRef>
+        </p:style>
+        <p:txBody>
+          <a:bodyPr rtlCol="0" anchor="ctr"/>
+          <a:lstStyle/>
+          <a:p>
+            <a:pPr algn="ctr"/>
+            <a:r>
+              <a:rPr lang="zh-CN" altLang="en-US" dirty="0"/>
+              <a:t>成熟度</a:t>
+            </a:r>
+          </a:p>
+        </p:txBody>
+      </p:sp>
+      <p:sp>
+        <p:nvSpPr>
+          <p:cNvPr id="5" name="矩形 4">
+            <a:extLst>
+              <a:ext uri="{FF2B5EF4-FFF2-40B4-BE49-F238E27FC236}">
+                <a16:creationId xmlns:a16="http://schemas.microsoft.com/office/drawing/2014/main" id="{4B15C434-3CA8-46EA-AC13-6FFD412F7C47}"/>
+              </a:ext>
+            </a:extLst>
+          </p:cNvPr>
+          <p:cNvSpPr/>
+          <p:nvPr/>
+        </p:nvSpPr>
+        <p:spPr>
+          <a:xfrm>
+            <a:off x="4648200" y="5273040"/>
+            <a:ext cx="6614160" cy="381000"/>
+          </a:xfrm>
+          <a:prstGeom prst="rect">
+            <a:avLst/>
+          </a:prstGeom>
+          <a:solidFill>
+            <a:srgbClr val="002060"/>
+          </a:solidFill>
+          <a:ln>
+            <a:solidFill>
+              <a:schemeClr val="bg1"/>
+            </a:solidFill>
+          </a:ln>
+        </p:spPr>
+        <p:style>
+          <a:lnRef idx="2">
+            <a:schemeClr val="accent1">
+              <a:shade val="50000"/>
+            </a:schemeClr>
+          </a:lnRef>
+          <a:fillRef idx="1">
+            <a:schemeClr val="accent1"/>
+          </a:fillRef>
+          <a:effectRef idx="0">
+            <a:schemeClr val="accent1"/>
+          </a:effectRef>
+          <a:fontRef idx="minor">
+            <a:schemeClr val="lt1"/>
+          </a:fontRef>
+        </p:style>
+        <p:txBody>
+          <a:bodyPr rtlCol="0" anchor="ctr"/>
+          <a:lstStyle/>
+          <a:p>
+            <a:pPr algn="ctr"/>
+            <a:r>
+              <a:rPr lang="zh-CN" altLang="en-US" dirty="0"/>
+              <a:t>卓越</a:t>
+            </a:r>
+          </a:p>
+        </p:txBody>
+      </p:sp>
+      <p:sp>
+        <p:nvSpPr>
+          <p:cNvPr id="6" name="矩形 5">
+            <a:extLst>
+              <a:ext uri="{FF2B5EF4-FFF2-40B4-BE49-F238E27FC236}">
+                <a16:creationId xmlns:a16="http://schemas.microsoft.com/office/drawing/2014/main" id="{CBB7B649-9A0C-4CFD-B3BB-9625CB2ABCDC}"/>
+              </a:ext>
+            </a:extLst>
+          </p:cNvPr>
+          <p:cNvSpPr/>
+          <p:nvPr/>
+        </p:nvSpPr>
+        <p:spPr>
+          <a:xfrm>
+            <a:off x="655320" y="1203960"/>
+            <a:ext cx="10607040" cy="4831080"/>
+          </a:xfrm>
+          <a:prstGeom prst="rect">
+            <a:avLst/>
+          </a:prstGeom>
+          <a:noFill/>
+        </p:spPr>
+        <p:style>
+          <a:lnRef idx="2">
+            <a:schemeClr val="accent1">
+              <a:shade val="50000"/>
+            </a:schemeClr>
+          </a:lnRef>
+          <a:fillRef idx="1">
+            <a:schemeClr val="accent1"/>
+          </a:fillRef>
+          <a:effectRef idx="0">
+            <a:schemeClr val="accent1"/>
+          </a:effectRef>
+          <a:fontRef idx="minor">
+            <a:schemeClr val="lt1"/>
+          </a:fontRef>
+        </p:style>
+        <p:txBody>
+          <a:bodyPr rtlCol="0" anchor="ctr"/>
+          <a:lstStyle/>
+          <a:p>
+            <a:pPr algn="ctr"/>
+            <a:endParaRPr lang="zh-CN" altLang="en-US"/>
+          </a:p>
+        </p:txBody>
+      </p:sp>
+      <p:sp>
+        <p:nvSpPr>
+          <p:cNvPr id="7" name="矩形 6">
+            <a:extLst>
+              <a:ext uri="{FF2B5EF4-FFF2-40B4-BE49-F238E27FC236}">
+                <a16:creationId xmlns:a16="http://schemas.microsoft.com/office/drawing/2014/main" id="{4A22AEE2-DC6C-4F12-AC42-B6AC6A29A5C3}"/>
+              </a:ext>
+            </a:extLst>
+          </p:cNvPr>
+          <p:cNvSpPr/>
+          <p:nvPr/>
+        </p:nvSpPr>
+        <p:spPr>
+          <a:xfrm>
+            <a:off x="4648200" y="1203960"/>
+            <a:ext cx="6614160" cy="4069080"/>
+          </a:xfrm>
+          <a:prstGeom prst="rect">
+            <a:avLst/>
+          </a:prstGeom>
+          <a:noFill/>
+        </p:spPr>
+        <p:style>
+          <a:lnRef idx="2">
+            <a:schemeClr val="accent1">
+              <a:shade val="50000"/>
+            </a:schemeClr>
+          </a:lnRef>
+          <a:fillRef idx="1">
+            <a:schemeClr val="accent1"/>
+          </a:fillRef>
+          <a:effectRef idx="0">
+            <a:schemeClr val="accent1"/>
+          </a:effectRef>
+          <a:fontRef idx="minor">
+            <a:schemeClr val="lt1"/>
+          </a:fontRef>
+        </p:style>
+        <p:txBody>
+          <a:bodyPr rtlCol="0" anchor="ctr"/>
+          <a:lstStyle/>
+          <a:p>
+            <a:pPr algn="ctr"/>
+            <a:endParaRPr lang="zh-CN" altLang="en-US"/>
+          </a:p>
+        </p:txBody>
+      </p:sp>
+      <p:sp>
+        <p:nvSpPr>
+          <p:cNvPr id="9" name="任意多边形: 形状 8">
+            <a:extLst>
+              <a:ext uri="{FF2B5EF4-FFF2-40B4-BE49-F238E27FC236}">
+                <a16:creationId xmlns:a16="http://schemas.microsoft.com/office/drawing/2014/main" id="{D02E8C8D-EEF1-46A0-8586-6F31BC0022B2}"/>
+              </a:ext>
+            </a:extLst>
+          </p:cNvPr>
+          <p:cNvSpPr/>
+          <p:nvPr/>
+        </p:nvSpPr>
+        <p:spPr>
+          <a:xfrm>
+            <a:off x="655320" y="1249680"/>
+            <a:ext cx="10591800" cy="4008120"/>
+          </a:xfrm>
+          <a:custGeom>
+            <a:avLst/>
+            <a:gdLst>
+              <a:gd name="connsiteX0" fmla="*/ 0 w 10530840"/>
+              <a:gd name="connsiteY0" fmla="*/ 4008120 h 4008120"/>
+              <a:gd name="connsiteX1" fmla="*/ 2103120 w 10530840"/>
+              <a:gd name="connsiteY1" fmla="*/ 2956560 h 4008120"/>
+              <a:gd name="connsiteX2" fmla="*/ 3048000 w 10530840"/>
+              <a:gd name="connsiteY2" fmla="*/ 883920 h 4008120"/>
+              <a:gd name="connsiteX3" fmla="*/ 6416040 w 10530840"/>
+              <a:gd name="connsiteY3" fmla="*/ 121920 h 4008120"/>
+              <a:gd name="connsiteX4" fmla="*/ 10530840 w 10530840"/>
+              <a:gd name="connsiteY4" fmla="*/ 0 h 4008120"/>
+            </a:gdLst>
+            <a:ahLst/>
+            <a:cxnLst>
+              <a:cxn ang="0">
+                <a:pos x="connsiteX0" y="connsiteY0"/>
+              </a:cxn>
+              <a:cxn ang="0">
+                <a:pos x="connsiteX1" y="connsiteY1"/>
+              </a:cxn>
+              <a:cxn ang="0">
+                <a:pos x="connsiteX2" y="connsiteY2"/>
+              </a:cxn>
+              <a:cxn ang="0">
+                <a:pos x="connsiteX3" y="connsiteY3"/>
+              </a:cxn>
+              <a:cxn ang="0">
+                <a:pos x="connsiteX4" y="connsiteY4"/>
+              </a:cxn>
+            </a:cxnLst>
+            <a:rect l="l" t="t" r="r" b="b"/>
+            <a:pathLst>
+              <a:path w="10530840" h="4008120">
+                <a:moveTo>
+                  <a:pt x="0" y="4008120"/>
+                </a:moveTo>
+                <a:cubicBezTo>
+                  <a:pt x="797560" y="3742690"/>
+                  <a:pt x="1595120" y="3477260"/>
+                  <a:pt x="2103120" y="2956560"/>
+                </a:cubicBezTo>
+                <a:cubicBezTo>
+                  <a:pt x="2611120" y="2435860"/>
+                  <a:pt x="2329180" y="1356360"/>
+                  <a:pt x="3048000" y="883920"/>
+                </a:cubicBezTo>
+                <a:cubicBezTo>
+                  <a:pt x="3766820" y="411480"/>
+                  <a:pt x="5168900" y="269240"/>
+                  <a:pt x="6416040" y="121920"/>
+                </a:cubicBezTo>
+                <a:cubicBezTo>
+                  <a:pt x="7663180" y="-25400"/>
+                  <a:pt x="9839960" y="17780"/>
+                  <a:pt x="10530840" y="0"/>
+                </a:cubicBezTo>
+              </a:path>
+            </a:pathLst>
+          </a:custGeom>
+          <a:noFill/>
+        </p:spPr>
+        <p:style>
+          <a:lnRef idx="2">
+            <a:schemeClr val="accent1">
+              <a:shade val="50000"/>
+            </a:schemeClr>
+          </a:lnRef>
+          <a:fillRef idx="1">
+            <a:schemeClr val="accent1"/>
+          </a:fillRef>
+          <a:effectRef idx="0">
+            <a:schemeClr val="accent1"/>
+          </a:effectRef>
+          <a:fontRef idx="minor">
+            <a:schemeClr val="lt1"/>
+          </a:fontRef>
+        </p:style>
+        <p:txBody>
+          <a:bodyPr rtlCol="0" anchor="ctr"/>
+          <a:lstStyle/>
+          <a:p>
+            <a:pPr algn="ctr"/>
+            <a:endParaRPr lang="zh-CN" altLang="en-US"/>
+          </a:p>
+        </p:txBody>
+      </p:sp>
+      <p:sp>
+        <p:nvSpPr>
+          <p:cNvPr id="11" name="任意多边形: 形状 10">
+            <a:extLst>
+              <a:ext uri="{FF2B5EF4-FFF2-40B4-BE49-F238E27FC236}">
+                <a16:creationId xmlns:a16="http://schemas.microsoft.com/office/drawing/2014/main" id="{CF30F6E0-CFA4-4DE9-9CF5-75D0E0F3BB13}"/>
+              </a:ext>
+            </a:extLst>
+          </p:cNvPr>
+          <p:cNvSpPr/>
+          <p:nvPr/>
+        </p:nvSpPr>
+        <p:spPr>
+          <a:xfrm>
+            <a:off x="655320" y="1203960"/>
+            <a:ext cx="10607040" cy="4069080"/>
+          </a:xfrm>
+          <a:custGeom>
+            <a:avLst/>
+            <a:gdLst>
+              <a:gd name="connsiteX0" fmla="*/ 0 w 10607040"/>
+              <a:gd name="connsiteY0" fmla="*/ 0 h 4069080"/>
+              <a:gd name="connsiteX1" fmla="*/ 10607040 w 10607040"/>
+              <a:gd name="connsiteY1" fmla="*/ 0 h 4069080"/>
+              <a:gd name="connsiteX2" fmla="*/ 10607040 w 10607040"/>
+              <a:gd name="connsiteY2" fmla="*/ 60960 h 4069080"/>
+              <a:gd name="connsiteX3" fmla="*/ 6468421 w 10607040"/>
+              <a:gd name="connsiteY3" fmla="*/ 182880 h 4069080"/>
+              <a:gd name="connsiteX4" fmla="*/ 3080884 w 10607040"/>
+              <a:gd name="connsiteY4" fmla="*/ 944880 h 4069080"/>
+              <a:gd name="connsiteX5" fmla="*/ 2130534 w 10607040"/>
+              <a:gd name="connsiteY5" fmla="*/ 3017520 h 4069080"/>
+              <a:gd name="connsiteX6" fmla="*/ 1448219 w 10607040"/>
+              <a:gd name="connsiteY6" fmla="*/ 3509077 h 4069080"/>
+              <a:gd name="connsiteX7" fmla="*/ 1286803 w 10607040"/>
+              <a:gd name="connsiteY7" fmla="*/ 3587899 h 4069080"/>
+              <a:gd name="connsiteX8" fmla="*/ 15240 w 10607040"/>
+              <a:gd name="connsiteY8" fmla="*/ 4069080 h 4069080"/>
+              <a:gd name="connsiteX9" fmla="*/ 0 w 10607040"/>
+              <a:gd name="connsiteY9" fmla="*/ 4069080 h 4069080"/>
+              <a:gd name="connsiteX10" fmla="*/ 0 w 10607040"/>
+              <a:gd name="connsiteY10" fmla="*/ 0 h 4069080"/>
+            </a:gdLst>
+            <a:ahLst/>
+            <a:cxnLst>
+              <a:cxn ang="0">
+                <a:pos x="connsiteX0" y="connsiteY0"/>
+              </a:cxn>
+              <a:cxn ang="0">
+                <a:pos x="connsiteX1" y="connsiteY1"/>
+              </a:cxn>
+              <a:cxn ang="0">
+                <a:pos x="connsiteX2" y="connsiteY2"/>
+              </a:cxn>
+              <a:cxn ang="0">
+                <a:pos x="connsiteX3" y="connsiteY3"/>
+              </a:cxn>
+              <a:cxn ang="0">
+                <a:pos x="connsiteX4" y="connsiteY4"/>
+              </a:cxn>
+              <a:cxn ang="0">
+                <a:pos x="connsiteX5" y="connsiteY5"/>
+              </a:cxn>
+              <a:cxn ang="0">
+                <a:pos x="connsiteX6" y="connsiteY6"/>
+              </a:cxn>
+              <a:cxn ang="0">
+                <a:pos x="connsiteX7" y="connsiteY7"/>
+              </a:cxn>
+              <a:cxn ang="0">
+                <a:pos x="connsiteX8" y="connsiteY8"/>
+              </a:cxn>
+              <a:cxn ang="0">
+                <a:pos x="connsiteX9" y="connsiteY9"/>
+              </a:cxn>
+              <a:cxn ang="0">
+                <a:pos x="connsiteX10" y="connsiteY10"/>
+              </a:cxn>
+            </a:cxnLst>
+            <a:rect l="l" t="t" r="r" b="b"/>
+            <a:pathLst>
+              <a:path w="10607040" h="4069080">
+                <a:moveTo>
+                  <a:pt x="0" y="0"/>
+                </a:moveTo>
+                <a:lnTo>
+                  <a:pt x="10607040" y="0"/>
+                </a:lnTo>
+                <a:lnTo>
+                  <a:pt x="10607040" y="60960"/>
+                </a:lnTo>
+                <a:cubicBezTo>
+                  <a:pt x="9912161" y="78740"/>
+                  <a:pt x="7722780" y="35560"/>
+                  <a:pt x="6468421" y="182880"/>
+                </a:cubicBezTo>
+                <a:cubicBezTo>
+                  <a:pt x="5214062" y="330200"/>
+                  <a:pt x="3803865" y="472440"/>
+                  <a:pt x="3080884" y="944880"/>
+                </a:cubicBezTo>
+                <a:cubicBezTo>
+                  <a:pt x="2357903" y="1417320"/>
+                  <a:pt x="2641475" y="2496820"/>
+                  <a:pt x="2130534" y="3017520"/>
+                </a:cubicBezTo>
+                <a:cubicBezTo>
+                  <a:pt x="1938932" y="3212783"/>
+                  <a:pt x="1706374" y="3372148"/>
+                  <a:pt x="1448219" y="3509077"/>
+                </a:cubicBezTo>
+                <a:lnTo>
+                  <a:pt x="1286803" y="3587899"/>
+                </a:lnTo>
+                <a:lnTo>
+                  <a:pt x="15240" y="4069080"/>
+                </a:lnTo>
+                <a:lnTo>
+                  <a:pt x="0" y="4069080"/>
+                </a:lnTo>
+                <a:lnTo>
+                  <a:pt x="0" y="0"/>
+                </a:lnTo>
+                <a:close/>
+              </a:path>
+            </a:pathLst>
+          </a:custGeom>
+          <a:solidFill>
+            <a:schemeClr val="bg1">
+              <a:lumMod val="85000"/>
+            </a:schemeClr>
+          </a:solidFill>
+        </p:spPr>
+        <p:style>
+          <a:lnRef idx="2">
+            <a:schemeClr val="accent1">
+              <a:shade val="50000"/>
+            </a:schemeClr>
+          </a:lnRef>
+          <a:fillRef idx="1">
+            <a:schemeClr val="accent1"/>
+          </a:fillRef>
+          <a:effectRef idx="0">
+            <a:schemeClr val="accent1"/>
+          </a:effectRef>
+          <a:fontRef idx="minor">
+            <a:schemeClr val="lt1"/>
+          </a:fontRef>
+        </p:style>
+        <p:txBody>
+          <a:bodyPr rtlCol="0" anchor="ctr"/>
+          <a:lstStyle/>
+          <a:p>
+            <a:pPr algn="ctr"/>
+            <a:r>
+              <a:rPr lang="en-US" altLang="zh-CN" dirty="0" err="1"/>
+              <a:t>i</a:t>
+            </a:r>
+            <a:endParaRPr lang="zh-CN" altLang="en-US" dirty="0"/>
+          </a:p>
+        </p:txBody>
+      </p:sp>
+      <p:sp>
+        <p:nvSpPr>
+          <p:cNvPr id="12" name="文本框 11">
+            <a:extLst>
+              <a:ext uri="{FF2B5EF4-FFF2-40B4-BE49-F238E27FC236}">
+                <a16:creationId xmlns:a16="http://schemas.microsoft.com/office/drawing/2014/main" id="{202C6A05-1C15-47AB-A105-C75FFAD27521}"/>
+              </a:ext>
+            </a:extLst>
+          </p:cNvPr>
+          <p:cNvSpPr txBox="1"/>
+          <p:nvPr/>
+        </p:nvSpPr>
+        <p:spPr>
+          <a:xfrm>
+            <a:off x="1615440" y="2419171"/>
+            <a:ext cx="411480" cy="1569660"/>
+          </a:xfrm>
+          <a:prstGeom prst="rect">
+            <a:avLst/>
+          </a:prstGeom>
+          <a:noFill/>
+        </p:spPr>
+        <p:txBody>
+          <a:bodyPr wrap="square" rtlCol="0">
+            <a:spAutoFit/>
+          </a:bodyPr>
+          <a:lstStyle/>
+          <a:p>
+            <a:r>
+              <a:rPr lang="zh-CN" altLang="en-US" sz="2400" dirty="0"/>
+              <a:t>失败项目</a:t>
+            </a:r>
+          </a:p>
+        </p:txBody>
+      </p:sp>
+      <p:pic>
+        <p:nvPicPr>
+          <p:cNvPr id="14" name="图片 13">
+            <a:extLst>
+              <a:ext uri="{FF2B5EF4-FFF2-40B4-BE49-F238E27FC236}">
+                <a16:creationId xmlns:a16="http://schemas.microsoft.com/office/drawing/2014/main" id="{99AD6B7E-90BE-4DBE-8C85-E551662D5EA4}"/>
+              </a:ext>
+            </a:extLst>
+          </p:cNvPr>
+          <p:cNvPicPr>
+            <a:picLocks noChangeAspect="1"/>
+          </p:cNvPicPr>
+          <p:nvPr/>
+        </p:nvPicPr>
+        <p:blipFill rotWithShape="1">
+          <a:blip r:embed="rId2"/>
+          <a:srcRect b="16241"/>
+          <a:stretch/>
+        </p:blipFill>
+        <p:spPr>
+          <a:xfrm>
+            <a:off x="655320" y="1256885"/>
+            <a:ext cx="10620152" cy="4008535"/>
+          </a:xfrm>
+          <a:prstGeom prst="rect">
+            <a:avLst/>
+          </a:prstGeom>
+        </p:spPr>
+      </p:pic>
+      <p:sp>
+        <p:nvSpPr>
+          <p:cNvPr id="15" name="文本框 14">
+            <a:extLst>
+              <a:ext uri="{FF2B5EF4-FFF2-40B4-BE49-F238E27FC236}">
+                <a16:creationId xmlns:a16="http://schemas.microsoft.com/office/drawing/2014/main" id="{35A88F93-A7A1-496B-BA16-19C741DDBAF0}"/>
+              </a:ext>
+            </a:extLst>
+          </p:cNvPr>
+          <p:cNvSpPr txBox="1"/>
+          <p:nvPr/>
+        </p:nvSpPr>
+        <p:spPr>
+          <a:xfrm>
+            <a:off x="7680960" y="2529840"/>
+            <a:ext cx="533400" cy="1584960"/>
+          </a:xfrm>
+          <a:prstGeom prst="rect">
+            <a:avLst/>
+          </a:prstGeom>
+          <a:noFill/>
+        </p:spPr>
+        <p:txBody>
+          <a:bodyPr wrap="square" rtlCol="0">
+            <a:spAutoFit/>
+          </a:bodyPr>
+          <a:lstStyle/>
+          <a:p>
+            <a:r>
+              <a:rPr lang="zh-CN" altLang="en-US" sz="2400" dirty="0"/>
+              <a:t>成功项目</a:t>
+            </a:r>
+          </a:p>
+        </p:txBody>
+      </p:sp>
+      <p:cxnSp>
+        <p:nvCxnSpPr>
+          <p:cNvPr id="17" name="直接连接符 16">
+            <a:extLst>
+              <a:ext uri="{FF2B5EF4-FFF2-40B4-BE49-F238E27FC236}">
+                <a16:creationId xmlns:a16="http://schemas.microsoft.com/office/drawing/2014/main" id="{925752D1-3CD3-4521-8768-E26AE823E396}"/>
+              </a:ext>
+            </a:extLst>
+          </p:cNvPr>
+          <p:cNvCxnSpPr/>
+          <p:nvPr/>
+        </p:nvCxnSpPr>
+        <p:spPr>
+          <a:xfrm flipV="1">
+            <a:off x="4648200" y="1203960"/>
+            <a:ext cx="0" cy="4053840"/>
+          </a:xfrm>
+          <a:prstGeom prst="line">
+            <a:avLst/>
+          </a:prstGeom>
+          <a:ln w="76200">
+            <a:prstDash val="sysDash"/>
+          </a:ln>
+        </p:spPr>
+        <p:style>
+          <a:lnRef idx="1">
+            <a:schemeClr val="accent1"/>
+          </a:lnRef>
+          <a:fillRef idx="0">
+            <a:schemeClr val="accent1"/>
+          </a:fillRef>
+          <a:effectRef idx="0">
+            <a:schemeClr val="accent1"/>
+          </a:effectRef>
+          <a:fontRef idx="minor">
+            <a:schemeClr val="tx1"/>
+          </a:fontRef>
+        </p:style>
+      </p:cxnSp>
+      <p:sp>
+        <p:nvSpPr>
+          <p:cNvPr id="18" name="箭头: 右 17">
+            <a:extLst>
+              <a:ext uri="{FF2B5EF4-FFF2-40B4-BE49-F238E27FC236}">
+                <a16:creationId xmlns:a16="http://schemas.microsoft.com/office/drawing/2014/main" id="{1669EB96-8E9A-49E7-AD43-78F576073ED6}"/>
+              </a:ext>
+            </a:extLst>
+          </p:cNvPr>
+          <p:cNvSpPr/>
+          <p:nvPr/>
+        </p:nvSpPr>
+        <p:spPr>
+          <a:xfrm>
+            <a:off x="4648200" y="6195060"/>
+            <a:ext cx="2225040" cy="441960"/>
+          </a:xfrm>
+          <a:prstGeom prst="rightArrow">
+            <a:avLst/>
+          </a:prstGeom>
+        </p:spPr>
+        <p:style>
+          <a:lnRef idx="2">
+            <a:schemeClr val="accent1">
+              <a:shade val="50000"/>
+            </a:schemeClr>
+          </a:lnRef>
+          <a:fillRef idx="1">
+            <a:schemeClr val="accent1"/>
+          </a:fillRef>
+          <a:effectRef idx="0">
+            <a:schemeClr val="accent1"/>
+          </a:effectRef>
+          <a:fontRef idx="minor">
+            <a:schemeClr val="lt1"/>
+          </a:fontRef>
+        </p:style>
+        <p:txBody>
+          <a:bodyPr rtlCol="0" anchor="ctr"/>
+          <a:lstStyle/>
+          <a:p>
+            <a:pPr algn="ctr"/>
+            <a:endParaRPr lang="zh-CN" altLang="en-US"/>
+          </a:p>
+        </p:txBody>
+      </p:sp>
+      <p:sp>
+        <p:nvSpPr>
+          <p:cNvPr id="19" name="文本框 18">
+            <a:extLst>
+              <a:ext uri="{FF2B5EF4-FFF2-40B4-BE49-F238E27FC236}">
+                <a16:creationId xmlns:a16="http://schemas.microsoft.com/office/drawing/2014/main" id="{716315FB-E814-4E6C-9ACE-3015C908FE42}"/>
+              </a:ext>
+            </a:extLst>
+          </p:cNvPr>
+          <p:cNvSpPr txBox="1"/>
+          <p:nvPr/>
+        </p:nvSpPr>
+        <p:spPr>
+          <a:xfrm>
+            <a:off x="6995160" y="6175355"/>
+            <a:ext cx="1158240" cy="461665"/>
+          </a:xfrm>
+          <a:prstGeom prst="rect">
+            <a:avLst/>
+          </a:prstGeom>
+          <a:noFill/>
+        </p:spPr>
+        <p:txBody>
+          <a:bodyPr wrap="square" rtlCol="0">
+            <a:spAutoFit/>
+          </a:bodyPr>
+          <a:lstStyle/>
+          <a:p>
+            <a:r>
+              <a:rPr lang="zh-CN" altLang="en-US" sz="2400" dirty="0"/>
+              <a:t>时间</a:t>
+            </a:r>
+          </a:p>
+        </p:txBody>
+      </p:sp>
+    </p:spTree>
+    <p:extLst>
+      <p:ext uri="{BB962C8B-B14F-4D97-AF65-F5344CB8AC3E}">
+        <p14:creationId xmlns:p14="http://schemas.microsoft.com/office/powerpoint/2010/main" val="4026317560"/>
+      </p:ext>
+    </p:extLst>
+  </p:cSld>
+  <p:clrMapOvr>
+    <a:masterClrMapping/>
+  </p:clrMapOvr>
+</p:sld>
+</file>
+
+<file path=ppt/slides/slide9.xml><?xml version="1.0" encoding="utf-8"?>
+<p:sld xmlns:a="http://schemas.openxmlformats.org/drawingml/2006/main" xmlns:r="http://schemas.openxmlformats.org/officeDocument/2006/relationships" xmlns:p="http://schemas.openxmlformats.org/presentationml/2006/main">
+  <p:cSld>
+    <p:spTree>
+      <p:nvGrpSpPr>
+        <p:cNvPr id="1" name=""/>
+        <p:cNvGrpSpPr/>
+        <p:nvPr/>
+      </p:nvGrpSpPr>
+      <p:grpSpPr>
+        <a:xfrm>
+          <a:off x="0" y="0"/>
+          <a:ext cx="0" cy="0"/>
+          <a:chOff x="0" y="0"/>
+          <a:chExt cx="0" cy="0"/>
+        </a:xfrm>
+      </p:grpSpPr>
+      <p:sp>
+        <p:nvSpPr>
+          <p:cNvPr id="19" name="任意多边形: 形状 18">
+            <a:extLst>
+              <a:ext uri="{FF2B5EF4-FFF2-40B4-BE49-F238E27FC236}">
+                <a16:creationId xmlns:a16="http://schemas.microsoft.com/office/drawing/2014/main" id="{3CDB670F-914B-4532-BFD7-67DDAB379E4C}"/>
+              </a:ext>
+            </a:extLst>
+          </p:cNvPr>
+          <p:cNvSpPr/>
+          <p:nvPr/>
+        </p:nvSpPr>
+        <p:spPr>
+          <a:xfrm>
+            <a:off x="655320" y="1264920"/>
+            <a:ext cx="10607040" cy="4770120"/>
+          </a:xfrm>
+          <a:custGeom>
+            <a:avLst/>
+            <a:gdLst>
+              <a:gd name="connsiteX0" fmla="*/ 10607040 w 10607040"/>
+              <a:gd name="connsiteY0" fmla="*/ 0 h 4770120"/>
+              <a:gd name="connsiteX1" fmla="*/ 10607040 w 10607040"/>
+              <a:gd name="connsiteY1" fmla="*/ 4770120 h 4770120"/>
+              <a:gd name="connsiteX2" fmla="*/ 0 w 10607040"/>
+              <a:gd name="connsiteY2" fmla="*/ 4770120 h 4770120"/>
+              <a:gd name="connsiteX3" fmla="*/ 0 w 10607040"/>
+              <a:gd name="connsiteY3" fmla="*/ 4008120 h 4770120"/>
+              <a:gd name="connsiteX4" fmla="*/ 15240 w 10607040"/>
+              <a:gd name="connsiteY4" fmla="*/ 4008120 h 4770120"/>
+              <a:gd name="connsiteX5" fmla="*/ 1286803 w 10607040"/>
+              <a:gd name="connsiteY5" fmla="*/ 3526939 h 4770120"/>
+              <a:gd name="connsiteX6" fmla="*/ 1448219 w 10607040"/>
+              <a:gd name="connsiteY6" fmla="*/ 3448117 h 4770120"/>
+              <a:gd name="connsiteX7" fmla="*/ 2130534 w 10607040"/>
+              <a:gd name="connsiteY7" fmla="*/ 2956560 h 4770120"/>
+              <a:gd name="connsiteX8" fmla="*/ 3080884 w 10607040"/>
+              <a:gd name="connsiteY8" fmla="*/ 883920 h 4770120"/>
+              <a:gd name="connsiteX9" fmla="*/ 6468421 w 10607040"/>
+              <a:gd name="connsiteY9" fmla="*/ 121920 h 4770120"/>
+              <a:gd name="connsiteX10" fmla="*/ 10607040 w 10607040"/>
+              <a:gd name="connsiteY10" fmla="*/ 0 h 4770120"/>
+            </a:gdLst>
+            <a:ahLst/>
+            <a:cxnLst>
+              <a:cxn ang="0">
+                <a:pos x="connsiteX0" y="connsiteY0"/>
+              </a:cxn>
+              <a:cxn ang="0">
+                <a:pos x="connsiteX1" y="connsiteY1"/>
+              </a:cxn>
+              <a:cxn ang="0">
+                <a:pos x="connsiteX2" y="connsiteY2"/>
+              </a:cxn>
+              <a:cxn ang="0">
+                <a:pos x="connsiteX3" y="connsiteY3"/>
+              </a:cxn>
+              <a:cxn ang="0">
+                <a:pos x="connsiteX4" y="connsiteY4"/>
+              </a:cxn>
+              <a:cxn ang="0">
+                <a:pos x="connsiteX5" y="connsiteY5"/>
+              </a:cxn>
+              <a:cxn ang="0">
+                <a:pos x="connsiteX6" y="connsiteY6"/>
+              </a:cxn>
+              <a:cxn ang="0">
+                <a:pos x="connsiteX7" y="connsiteY7"/>
+              </a:cxn>
+              <a:cxn ang="0">
+                <a:pos x="connsiteX8" y="connsiteY8"/>
+              </a:cxn>
+              <a:cxn ang="0">
+                <a:pos x="connsiteX9" y="connsiteY9"/>
+              </a:cxn>
+              <a:cxn ang="0">
+                <a:pos x="connsiteX10" y="connsiteY10"/>
+              </a:cxn>
+            </a:cxnLst>
+            <a:rect l="l" t="t" r="r" b="b"/>
+            <a:pathLst>
+              <a:path w="10607040" h="4770120">
+                <a:moveTo>
+                  <a:pt x="10607040" y="0"/>
+                </a:moveTo>
+                <a:lnTo>
+                  <a:pt x="10607040" y="4770120"/>
+                </a:lnTo>
+                <a:lnTo>
+                  <a:pt x="0" y="4770120"/>
+                </a:lnTo>
+                <a:lnTo>
+                  <a:pt x="0" y="4008120"/>
+                </a:lnTo>
+                <a:lnTo>
+                  <a:pt x="15240" y="4008120"/>
+                </a:lnTo>
+                <a:lnTo>
+                  <a:pt x="1286803" y="3526939"/>
+                </a:lnTo>
+                <a:lnTo>
+                  <a:pt x="1448219" y="3448117"/>
+                </a:lnTo>
+                <a:cubicBezTo>
+                  <a:pt x="1706374" y="3311188"/>
+                  <a:pt x="1938932" y="3151823"/>
+                  <a:pt x="2130534" y="2956560"/>
+                </a:cubicBezTo>
+                <a:cubicBezTo>
+                  <a:pt x="2641475" y="2435860"/>
+                  <a:pt x="2357903" y="1356360"/>
+                  <a:pt x="3080884" y="883920"/>
+                </a:cubicBezTo>
+                <a:cubicBezTo>
+                  <a:pt x="3803865" y="411480"/>
+                  <a:pt x="5214062" y="269240"/>
+                  <a:pt x="6468421" y="121920"/>
+                </a:cubicBezTo>
+                <a:cubicBezTo>
+                  <a:pt x="7722780" y="-25400"/>
+                  <a:pt x="9912161" y="17780"/>
+                  <a:pt x="10607040" y="0"/>
+                </a:cubicBezTo>
+                <a:close/>
+              </a:path>
+            </a:pathLst>
+          </a:custGeom>
+          <a:solidFill>
+            <a:schemeClr val="accent6">
+              <a:lumMod val="40000"/>
+              <a:lumOff val="60000"/>
+            </a:schemeClr>
+          </a:solidFill>
+        </p:spPr>
+        <p:style>
+          <a:lnRef idx="2">
+            <a:schemeClr val="accent1">
+              <a:shade val="50000"/>
+            </a:schemeClr>
+          </a:lnRef>
+          <a:fillRef idx="1">
+            <a:schemeClr val="accent1"/>
+          </a:fillRef>
+          <a:effectRef idx="0">
+            <a:schemeClr val="accent1"/>
+          </a:effectRef>
+          <a:fontRef idx="minor">
+            <a:schemeClr val="lt1"/>
+          </a:fontRef>
+        </p:style>
+        <p:txBody>
+          <a:bodyPr rtlCol="0" anchor="ctr"/>
+          <a:lstStyle/>
+          <a:p>
+            <a:pPr algn="ctr"/>
+            <a:endParaRPr lang="zh-CN" altLang="en-US" dirty="0"/>
+          </a:p>
+        </p:txBody>
+      </p:sp>
+    </p:spTree>
+    <p:extLst>
+      <p:ext uri="{BB962C8B-B14F-4D97-AF65-F5344CB8AC3E}">
+        <p14:creationId xmlns:p14="http://schemas.microsoft.com/office/powerpoint/2010/main" val="4080189142"/>
       </p:ext>
     </p:extLst>
   </p:cSld>

</xml_diff>